<commit_message>
Changes in die and allocation for a better refinement
</commit_message>
<xml_diff>
--- a/doc/Floorplan_picts.pptx
+++ b/doc/Floorplan_picts.pptx
@@ -5647,7 +5647,7 @@
           <a:p>
             <a:fld id="{847A9C85-7208-4140-9A1B-482E74B6EC70}" type="datetimeFigureOut">
               <a:rPr lang="en-US" smtClean="0"/>
-              <a:t>8/18/2022</a:t>
+              <a:t>8/19/2022</a:t>
             </a:fld>
             <a:endParaRPr lang="en-US"/>
           </a:p>
@@ -5807,7 +5807,7 @@
           <a:p>
             <a:fld id="{9EAA3D3F-CA47-4B9D-B6BA-678D85410C0A}" type="datetimeFigureOut">
               <a:rPr lang="en-US" smtClean="0"/>
-              <a:t>8/18/2022</a:t>
+              <a:t>8/19/2022</a:t>
             </a:fld>
             <a:endParaRPr lang="en-US"/>
           </a:p>
@@ -21986,6 +21986,325 @@
           </a:p>
         </p:txBody>
       </p:sp>
+      <p:sp>
+        <p:nvSpPr>
+          <p:cNvPr id="12" name="Rectangle 11">
+            <a:extLst>
+              <a:ext uri="{FF2B5EF4-FFF2-40B4-BE49-F238E27FC236}">
+                <a16:creationId xmlns:a16="http://schemas.microsoft.com/office/drawing/2014/main" id="{0BF1720A-1925-46DF-8B52-4D9C230D87FC}"/>
+              </a:ext>
+            </a:extLst>
+          </p:cNvPr>
+          <p:cNvSpPr/>
+          <p:nvPr/>
+        </p:nvSpPr>
+        <p:spPr>
+          <a:xfrm>
+            <a:off x="914400" y="2895600"/>
+            <a:ext cx="914400" cy="533400"/>
+          </a:xfrm>
+          <a:prstGeom prst="rect">
+            <a:avLst/>
+          </a:prstGeom>
+          <a:solidFill>
+            <a:schemeClr val="tx1"/>
+          </a:solidFill>
+          <a:ln>
+            <a:noFill/>
+          </a:ln>
+        </p:spPr>
+        <p:style>
+          <a:lnRef idx="2">
+            <a:schemeClr val="accent1">
+              <a:shade val="50000"/>
+            </a:schemeClr>
+          </a:lnRef>
+          <a:fillRef idx="1">
+            <a:schemeClr val="accent1"/>
+          </a:fillRef>
+          <a:effectRef idx="0">
+            <a:schemeClr val="accent1"/>
+          </a:effectRef>
+          <a:fontRef idx="minor">
+            <a:schemeClr val="lt1"/>
+          </a:fontRef>
+        </p:style>
+        <p:txBody>
+          <a:bodyPr rtlCol="0" anchor="ctr"/>
+          <a:lstStyle/>
+          <a:p>
+            <a:pPr algn="ctr"/>
+            <a:endParaRPr lang="en-US"/>
+          </a:p>
+        </p:txBody>
+      </p:sp>
+      <p:sp>
+        <p:nvSpPr>
+          <p:cNvPr id="68" name="Rectangle 67">
+            <a:extLst>
+              <a:ext uri="{FF2B5EF4-FFF2-40B4-BE49-F238E27FC236}">
+                <a16:creationId xmlns:a16="http://schemas.microsoft.com/office/drawing/2014/main" id="{698272DA-6943-43DA-B670-17016FE6288E}"/>
+              </a:ext>
+            </a:extLst>
+          </p:cNvPr>
+          <p:cNvSpPr/>
+          <p:nvPr/>
+        </p:nvSpPr>
+        <p:spPr>
+          <a:xfrm>
+            <a:off x="4949004" y="2895600"/>
+            <a:ext cx="914400" cy="533400"/>
+          </a:xfrm>
+          <a:prstGeom prst="rect">
+            <a:avLst/>
+          </a:prstGeom>
+          <a:solidFill>
+            <a:schemeClr val="tx1"/>
+          </a:solidFill>
+          <a:ln>
+            <a:noFill/>
+          </a:ln>
+        </p:spPr>
+        <p:style>
+          <a:lnRef idx="2">
+            <a:schemeClr val="accent1">
+              <a:shade val="50000"/>
+            </a:schemeClr>
+          </a:lnRef>
+          <a:fillRef idx="1">
+            <a:schemeClr val="accent1"/>
+          </a:fillRef>
+          <a:effectRef idx="0">
+            <a:schemeClr val="accent1"/>
+          </a:effectRef>
+          <a:fontRef idx="minor">
+            <a:schemeClr val="lt1"/>
+          </a:fontRef>
+        </p:style>
+        <p:txBody>
+          <a:bodyPr rtlCol="0" anchor="ctr"/>
+          <a:lstStyle/>
+          <a:p>
+            <a:pPr algn="ctr"/>
+            <a:endParaRPr lang="en-US"/>
+          </a:p>
+        </p:txBody>
+      </p:sp>
+      <p:cxnSp>
+        <p:nvCxnSpPr>
+          <p:cNvPr id="69" name="Straight Connector 68">
+            <a:extLst>
+              <a:ext uri="{FF2B5EF4-FFF2-40B4-BE49-F238E27FC236}">
+                <a16:creationId xmlns:a16="http://schemas.microsoft.com/office/drawing/2014/main" id="{0027D06A-60F1-40F6-8FAD-0E1C2737D230}"/>
+              </a:ext>
+            </a:extLst>
+          </p:cNvPr>
+          <p:cNvCxnSpPr/>
+          <p:nvPr/>
+        </p:nvCxnSpPr>
+        <p:spPr>
+          <a:xfrm>
+            <a:off x="4953000" y="2895600"/>
+            <a:ext cx="3276600" cy="0"/>
+          </a:xfrm>
+          <a:prstGeom prst="line">
+            <a:avLst/>
+          </a:prstGeom>
+          <a:ln w="12700">
+            <a:solidFill>
+              <a:schemeClr val="tx1"/>
+            </a:solidFill>
+          </a:ln>
+        </p:spPr>
+        <p:style>
+          <a:lnRef idx="1">
+            <a:schemeClr val="accent1"/>
+          </a:lnRef>
+          <a:fillRef idx="0">
+            <a:schemeClr val="accent1"/>
+          </a:fillRef>
+          <a:effectRef idx="0">
+            <a:schemeClr val="accent1"/>
+          </a:effectRef>
+          <a:fontRef idx="minor">
+            <a:schemeClr val="tx1"/>
+          </a:fontRef>
+        </p:style>
+      </p:cxnSp>
+      <p:sp>
+        <p:nvSpPr>
+          <p:cNvPr id="70" name="Rectangle 69">
+            <a:extLst>
+              <a:ext uri="{FF2B5EF4-FFF2-40B4-BE49-F238E27FC236}">
+                <a16:creationId xmlns:a16="http://schemas.microsoft.com/office/drawing/2014/main" id="{EAAC9CDB-8FAB-4B0C-AC36-7BE24B3B0DFF}"/>
+              </a:ext>
+            </a:extLst>
+          </p:cNvPr>
+          <p:cNvSpPr/>
+          <p:nvPr/>
+        </p:nvSpPr>
+        <p:spPr>
+          <a:xfrm>
+            <a:off x="4956974" y="6013805"/>
+            <a:ext cx="914400" cy="533400"/>
+          </a:xfrm>
+          <a:prstGeom prst="rect">
+            <a:avLst/>
+          </a:prstGeom>
+          <a:solidFill>
+            <a:schemeClr val="tx1"/>
+          </a:solidFill>
+          <a:ln>
+            <a:noFill/>
+          </a:ln>
+        </p:spPr>
+        <p:style>
+          <a:lnRef idx="2">
+            <a:schemeClr val="accent1">
+              <a:shade val="50000"/>
+            </a:schemeClr>
+          </a:lnRef>
+          <a:fillRef idx="1">
+            <a:schemeClr val="accent1"/>
+          </a:fillRef>
+          <a:effectRef idx="0">
+            <a:schemeClr val="accent1"/>
+          </a:effectRef>
+          <a:fontRef idx="minor">
+            <a:schemeClr val="lt1"/>
+          </a:fontRef>
+        </p:style>
+        <p:txBody>
+          <a:bodyPr rtlCol="0" anchor="ctr"/>
+          <a:lstStyle/>
+          <a:p>
+            <a:pPr algn="ctr"/>
+            <a:endParaRPr lang="en-US"/>
+          </a:p>
+        </p:txBody>
+      </p:sp>
+      <p:sp>
+        <p:nvSpPr>
+          <p:cNvPr id="71" name="Rectangle 70">
+            <a:extLst>
+              <a:ext uri="{FF2B5EF4-FFF2-40B4-BE49-F238E27FC236}">
+                <a16:creationId xmlns:a16="http://schemas.microsoft.com/office/drawing/2014/main" id="{4BE8B0CF-5825-49E0-A3B2-F28D3A005FB9}"/>
+              </a:ext>
+            </a:extLst>
+          </p:cNvPr>
+          <p:cNvSpPr/>
+          <p:nvPr/>
+        </p:nvSpPr>
+        <p:spPr>
+          <a:xfrm>
+            <a:off x="914400" y="4417428"/>
+            <a:ext cx="533399" cy="229286"/>
+          </a:xfrm>
+          <a:prstGeom prst="rect">
+            <a:avLst/>
+          </a:prstGeom>
+          <a:solidFill>
+            <a:schemeClr val="tx1"/>
+          </a:solidFill>
+          <a:ln>
+            <a:noFill/>
+          </a:ln>
+        </p:spPr>
+        <p:style>
+          <a:lnRef idx="2">
+            <a:schemeClr val="accent1">
+              <a:shade val="50000"/>
+            </a:schemeClr>
+          </a:lnRef>
+          <a:fillRef idx="1">
+            <a:schemeClr val="accent1"/>
+          </a:fillRef>
+          <a:effectRef idx="0">
+            <a:schemeClr val="accent1"/>
+          </a:effectRef>
+          <a:fontRef idx="minor">
+            <a:schemeClr val="lt1"/>
+          </a:fontRef>
+        </p:style>
+        <p:txBody>
+          <a:bodyPr rtlCol="0" anchor="ctr"/>
+          <a:lstStyle/>
+          <a:p>
+            <a:pPr algn="ctr"/>
+            <a:endParaRPr lang="en-US"/>
+          </a:p>
+        </p:txBody>
+      </p:sp>
+      <p:sp>
+        <p:nvSpPr>
+          <p:cNvPr id="72" name="TextBox 71">
+            <a:extLst>
+              <a:ext uri="{FF2B5EF4-FFF2-40B4-BE49-F238E27FC236}">
+                <a16:creationId xmlns:a16="http://schemas.microsoft.com/office/drawing/2014/main" id="{353F8F3F-1A6D-4C2F-9C13-08A8A32E6609}"/>
+              </a:ext>
+            </a:extLst>
+          </p:cNvPr>
+          <p:cNvSpPr txBox="1"/>
+          <p:nvPr/>
+        </p:nvSpPr>
+        <p:spPr>
+          <a:xfrm>
+            <a:off x="1447800" y="4349416"/>
+            <a:ext cx="1330685" cy="307777"/>
+          </a:xfrm>
+          <a:prstGeom prst="rect">
+            <a:avLst/>
+          </a:prstGeom>
+          <a:noFill/>
+        </p:spPr>
+        <p:txBody>
+          <a:bodyPr wrap="none" rtlCol="0">
+            <a:spAutoFit/>
+          </a:bodyPr>
+          <a:lstStyle/>
+          <a:p>
+            <a:r>
+              <a:rPr lang="en-US" sz="1400" dirty="0"/>
+              <a:t>Blocked regions</a:t>
+            </a:r>
+          </a:p>
+        </p:txBody>
+      </p:sp>
+      <p:sp>
+        <p:nvSpPr>
+          <p:cNvPr id="20" name="TextBox 19">
+            <a:extLst>
+              <a:ext uri="{FF2B5EF4-FFF2-40B4-BE49-F238E27FC236}">
+                <a16:creationId xmlns:a16="http://schemas.microsoft.com/office/drawing/2014/main" id="{A31F50EF-AE9B-4152-B5E5-9DFB8992636A}"/>
+              </a:ext>
+            </a:extLst>
+          </p:cNvPr>
+          <p:cNvSpPr txBox="1"/>
+          <p:nvPr/>
+        </p:nvSpPr>
+        <p:spPr>
+          <a:xfrm>
+            <a:off x="2190543" y="2907249"/>
+            <a:ext cx="894284" cy="369332"/>
+          </a:xfrm>
+          <a:prstGeom prst="rect">
+            <a:avLst/>
+          </a:prstGeom>
+          <a:noFill/>
+        </p:spPr>
+        <p:txBody>
+          <a:bodyPr wrap="none" rtlCol="0">
+            <a:spAutoFit/>
+          </a:bodyPr>
+          <a:lstStyle/>
+          <a:p>
+            <a:r>
+              <a:rPr lang="en-US" dirty="0"/>
+              <a:t>Ground</a:t>
+            </a:r>
+          </a:p>
+        </p:txBody>
+      </p:sp>
     </p:spTree>
     <p:extLst>
       <p:ext uri="{BB962C8B-B14F-4D97-AF65-F5344CB8AC3E}">

</xml_diff>

<commit_message>
minor changes to STROP doc
</commit_message>
<xml_diff>
--- a/doc/Floorplan_picts.pptx
+++ b/doc/Floorplan_picts.pptx
@@ -5651,7 +5651,7 @@
           <a:p>
             <a:fld id="{847A9C85-7208-4140-9A1B-482E74B6EC70}" type="datetimeFigureOut">
               <a:rPr lang="en-US" smtClean="0"/>
-              <a:t>8/26/2022</a:t>
+              <a:t>7/22/2025</a:t>
             </a:fld>
             <a:endParaRPr lang="en-US"/>
           </a:p>
@@ -5811,7 +5811,7 @@
           <a:p>
             <a:fld id="{9EAA3D3F-CA47-4B9D-B6BA-678D85410C0A}" type="datetimeFigureOut">
               <a:rPr lang="en-US" smtClean="0"/>
-              <a:t>8/26/2022</a:t>
+              <a:t>7/22/2025</a:t>
             </a:fld>
             <a:endParaRPr lang="en-US"/>
           </a:p>
@@ -13485,382 +13485,361 @@
           </a:p>
         </p:txBody>
       </p:sp>
-      <p:grpSp>
-        <p:nvGrpSpPr>
-          <p:cNvPr id="67" name="Group 66">
+      <p:sp>
+        <p:nvSpPr>
+          <p:cNvPr id="8" name="Rectangle 7">
             <a:extLst>
               <a:ext uri="{FF2B5EF4-FFF2-40B4-BE49-F238E27FC236}">
-                <a16:creationId xmlns:a16="http://schemas.microsoft.com/office/drawing/2014/main" id="{646B82F8-EC8D-4067-9CF2-0D46E6302734}"/>
+                <a16:creationId xmlns:a16="http://schemas.microsoft.com/office/drawing/2014/main" id="{C4978252-AFA1-4CDD-8C34-AAE6E5F405E3}"/>
               </a:ext>
             </a:extLst>
           </p:cNvPr>
-          <p:cNvGrpSpPr/>
+          <p:cNvSpPr/>
           <p:nvPr/>
-        </p:nvGrpSpPr>
-        <p:grpSpPr>
+        </p:nvSpPr>
+        <p:spPr>
           <a:xfrm>
-            <a:off x="1447800" y="1600200"/>
-            <a:ext cx="1143000" cy="840866"/>
-            <a:chOff x="1447800" y="1600200"/>
-            <a:chExt cx="1143000" cy="840866"/>
+            <a:off x="1828800" y="1600200"/>
+            <a:ext cx="381000" cy="609600"/>
           </a:xfrm>
-        </p:grpSpPr>
-        <p:sp>
-          <p:nvSpPr>
-            <p:cNvPr id="8" name="Rectangle 7">
-              <a:extLst>
-                <a:ext uri="{FF2B5EF4-FFF2-40B4-BE49-F238E27FC236}">
-                  <a16:creationId xmlns:a16="http://schemas.microsoft.com/office/drawing/2014/main" id="{C4978252-AFA1-4CDD-8C34-AAE6E5F405E3}"/>
-                </a:ext>
-              </a:extLst>
-            </p:cNvPr>
-            <p:cNvSpPr/>
-            <p:nvPr/>
-          </p:nvSpPr>
-          <p:spPr>
-            <a:xfrm>
-              <a:off x="1828800" y="1600200"/>
-              <a:ext cx="381000" cy="609600"/>
-            </a:xfrm>
-            <a:prstGeom prst="rect">
-              <a:avLst/>
-            </a:prstGeom>
+          <a:prstGeom prst="rect">
+            <a:avLst/>
+          </a:prstGeom>
+          <a:solidFill>
+            <a:srgbClr val="0066FF"/>
+          </a:solidFill>
+          <a:ln>
+            <a:noFill/>
+          </a:ln>
+        </p:spPr>
+        <p:style>
+          <a:lnRef idx="2">
+            <a:schemeClr val="accent1">
+              <a:shade val="50000"/>
+            </a:schemeClr>
+          </a:lnRef>
+          <a:fillRef idx="1">
+            <a:schemeClr val="accent1"/>
+          </a:fillRef>
+          <a:effectRef idx="0">
+            <a:schemeClr val="accent1"/>
+          </a:effectRef>
+          <a:fontRef idx="minor">
+            <a:schemeClr val="lt1"/>
+          </a:fontRef>
+        </p:style>
+        <p:txBody>
+          <a:bodyPr lIns="0" rIns="0" rtlCol="0" anchor="ctr"/>
+          <a:lstStyle/>
+          <a:p>
+            <a:pPr algn="ctr"/>
+            <a:r>
+              <a:rPr lang="en-US" sz="1000" dirty="0"/>
+              <a:t>trunk</a:t>
+            </a:r>
+          </a:p>
+        </p:txBody>
+      </p:sp>
+      <p:sp>
+        <p:nvSpPr>
+          <p:cNvPr id="9" name="Rectangle 8">
+            <a:extLst>
+              <a:ext uri="{FF2B5EF4-FFF2-40B4-BE49-F238E27FC236}">
+                <a16:creationId xmlns:a16="http://schemas.microsoft.com/office/drawing/2014/main" id="{54971E89-5EF2-4ACF-B859-354B12152963}"/>
+              </a:ext>
+            </a:extLst>
+          </p:cNvPr>
+          <p:cNvSpPr/>
+          <p:nvPr/>
+        </p:nvSpPr>
+        <p:spPr>
+          <a:xfrm>
+            <a:off x="2209800" y="1600200"/>
+            <a:ext cx="381000" cy="231266"/>
+          </a:xfrm>
+          <a:prstGeom prst="rect">
+            <a:avLst/>
+          </a:prstGeom>
+          <a:solidFill>
+            <a:srgbClr val="FF0000"/>
+          </a:solidFill>
+          <a:ln>
+            <a:noFill/>
+          </a:ln>
+        </p:spPr>
+        <p:style>
+          <a:lnRef idx="2">
+            <a:schemeClr val="accent1">
+              <a:shade val="50000"/>
+            </a:schemeClr>
+          </a:lnRef>
+          <a:fillRef idx="1">
+            <a:schemeClr val="accent1"/>
+          </a:fillRef>
+          <a:effectRef idx="0">
+            <a:schemeClr val="accent1"/>
+          </a:effectRef>
+          <a:fontRef idx="minor">
+            <a:schemeClr val="lt1"/>
+          </a:fontRef>
+        </p:style>
+        <p:txBody>
+          <a:bodyPr lIns="0" rIns="0" rtlCol="0" anchor="ctr"/>
+          <a:lstStyle/>
+          <a:p>
+            <a:pPr algn="ctr"/>
+            <a:r>
+              <a:rPr lang="en-US" sz="800" dirty="0"/>
+              <a:t>branch</a:t>
+            </a:r>
+          </a:p>
+        </p:txBody>
+      </p:sp>
+      <p:sp>
+        <p:nvSpPr>
+          <p:cNvPr id="10" name="Rectangle 9">
+            <a:extLst>
+              <a:ext uri="{FF2B5EF4-FFF2-40B4-BE49-F238E27FC236}">
+                <a16:creationId xmlns:a16="http://schemas.microsoft.com/office/drawing/2014/main" id="{C4E9E2BE-D673-41E3-88C4-2631AD491523}"/>
+              </a:ext>
+            </a:extLst>
+          </p:cNvPr>
+          <p:cNvSpPr/>
+          <p:nvPr/>
+        </p:nvSpPr>
+        <p:spPr>
+          <a:xfrm>
+            <a:off x="1447800" y="1828800"/>
+            <a:ext cx="381000" cy="228600"/>
+          </a:xfrm>
+          <a:prstGeom prst="rect">
+            <a:avLst/>
+          </a:prstGeom>
+          <a:solidFill>
+            <a:srgbClr val="FF0000"/>
+          </a:solidFill>
+          <a:ln>
+            <a:noFill/>
+          </a:ln>
+        </p:spPr>
+        <p:style>
+          <a:lnRef idx="2">
+            <a:schemeClr val="accent1">
+              <a:shade val="50000"/>
+            </a:schemeClr>
+          </a:lnRef>
+          <a:fillRef idx="1">
+            <a:schemeClr val="accent1"/>
+          </a:fillRef>
+          <a:effectRef idx="0">
+            <a:schemeClr val="accent1"/>
+          </a:effectRef>
+          <a:fontRef idx="minor">
+            <a:schemeClr val="lt1"/>
+          </a:fontRef>
+        </p:style>
+        <p:txBody>
+          <a:bodyPr lIns="0" rIns="0" rtlCol="0" anchor="ctr"/>
+          <a:lstStyle/>
+          <a:p>
+            <a:pPr algn="ctr"/>
+            <a:r>
+              <a:rPr lang="en-US" sz="800" dirty="0"/>
+              <a:t>branch</a:t>
+            </a:r>
+          </a:p>
+        </p:txBody>
+      </p:sp>
+      <p:cxnSp>
+        <p:nvCxnSpPr>
+          <p:cNvPr id="12" name="Straight Connector 11">
+            <a:extLst>
+              <a:ext uri="{FF2B5EF4-FFF2-40B4-BE49-F238E27FC236}">
+                <a16:creationId xmlns:a16="http://schemas.microsoft.com/office/drawing/2014/main" id="{2F89B487-1223-4EB3-B5DA-B7F0E5A4FEDD}"/>
+              </a:ext>
+            </a:extLst>
+          </p:cNvPr>
+          <p:cNvCxnSpPr>
+            <a:cxnSpLocks/>
+          </p:cNvCxnSpPr>
+          <p:nvPr/>
+        </p:nvCxnSpPr>
+        <p:spPr>
+          <a:xfrm>
+            <a:off x="2209800" y="1600200"/>
+            <a:ext cx="222" cy="231266"/>
+          </a:xfrm>
+          <a:prstGeom prst="line">
+            <a:avLst/>
+          </a:prstGeom>
+          <a:ln w="19050" cap="flat">
             <a:solidFill>
-              <a:srgbClr val="0066FF"/>
+              <a:schemeClr val="tx1"/>
             </a:solidFill>
-            <a:ln>
-              <a:noFill/>
-            </a:ln>
-          </p:spPr>
-          <p:style>
-            <a:lnRef idx="2">
-              <a:schemeClr val="accent1">
-                <a:shade val="50000"/>
-              </a:schemeClr>
-            </a:lnRef>
-            <a:fillRef idx="1">
-              <a:schemeClr val="accent1"/>
-            </a:fillRef>
-            <a:effectRef idx="0">
-              <a:schemeClr val="accent1"/>
-            </a:effectRef>
-            <a:fontRef idx="minor">
-              <a:schemeClr val="lt1"/>
-            </a:fontRef>
-          </p:style>
-          <p:txBody>
-            <a:bodyPr lIns="0" rIns="0" rtlCol="0" anchor="ctr"/>
-            <a:lstStyle/>
-            <a:p>
-              <a:pPr algn="ctr"/>
-              <a:r>
-                <a:rPr lang="en-US" sz="1000" dirty="0"/>
-                <a:t>trunk</a:t>
-              </a:r>
-            </a:p>
-          </p:txBody>
-        </p:sp>
-        <p:sp>
-          <p:nvSpPr>
-            <p:cNvPr id="9" name="Rectangle 8">
-              <a:extLst>
-                <a:ext uri="{FF2B5EF4-FFF2-40B4-BE49-F238E27FC236}">
-                  <a16:creationId xmlns:a16="http://schemas.microsoft.com/office/drawing/2014/main" id="{54971E89-5EF2-4ACF-B859-354B12152963}"/>
-                </a:ext>
-              </a:extLst>
-            </p:cNvPr>
-            <p:cNvSpPr/>
-            <p:nvPr/>
-          </p:nvSpPr>
-          <p:spPr>
-            <a:xfrm>
-              <a:off x="2209800" y="1600200"/>
-              <a:ext cx="381000" cy="231266"/>
-            </a:xfrm>
-            <a:prstGeom prst="rect">
-              <a:avLst/>
-            </a:prstGeom>
+          </a:ln>
+        </p:spPr>
+        <p:style>
+          <a:lnRef idx="1">
+            <a:schemeClr val="accent1"/>
+          </a:lnRef>
+          <a:fillRef idx="0">
+            <a:schemeClr val="accent1"/>
+          </a:fillRef>
+          <a:effectRef idx="0">
+            <a:schemeClr val="accent1"/>
+          </a:effectRef>
+          <a:fontRef idx="minor">
+            <a:schemeClr val="tx1"/>
+          </a:fontRef>
+        </p:style>
+      </p:cxnSp>
+      <p:cxnSp>
+        <p:nvCxnSpPr>
+          <p:cNvPr id="15" name="Straight Connector 14">
+            <a:extLst>
+              <a:ext uri="{FF2B5EF4-FFF2-40B4-BE49-F238E27FC236}">
+                <a16:creationId xmlns:a16="http://schemas.microsoft.com/office/drawing/2014/main" id="{9D61B4C6-C104-413E-BB50-3C89F8494D5B}"/>
+              </a:ext>
+            </a:extLst>
+          </p:cNvPr>
+          <p:cNvCxnSpPr>
+            <a:cxnSpLocks/>
+          </p:cNvCxnSpPr>
+          <p:nvPr/>
+        </p:nvCxnSpPr>
+        <p:spPr>
+          <a:xfrm>
+            <a:off x="1828578" y="1826134"/>
+            <a:ext cx="222" cy="231266"/>
+          </a:xfrm>
+          <a:prstGeom prst="line">
+            <a:avLst/>
+          </a:prstGeom>
+          <a:ln w="19050" cap="flat">
             <a:solidFill>
-              <a:srgbClr val="FF0000"/>
+              <a:schemeClr val="tx1"/>
             </a:solidFill>
-            <a:ln>
-              <a:noFill/>
-            </a:ln>
-          </p:spPr>
-          <p:style>
-            <a:lnRef idx="2">
-              <a:schemeClr val="accent1">
-                <a:shade val="50000"/>
-              </a:schemeClr>
-            </a:lnRef>
-            <a:fillRef idx="1">
-              <a:schemeClr val="accent1"/>
-            </a:fillRef>
-            <a:effectRef idx="0">
-              <a:schemeClr val="accent1"/>
-            </a:effectRef>
-            <a:fontRef idx="minor">
-              <a:schemeClr val="lt1"/>
-            </a:fontRef>
-          </p:style>
-          <p:txBody>
-            <a:bodyPr lIns="0" rIns="0" rtlCol="0" anchor="ctr"/>
-            <a:lstStyle/>
-            <a:p>
-              <a:pPr algn="ctr"/>
-              <a:r>
-                <a:rPr lang="en-US" sz="800" dirty="0"/>
-                <a:t>branch</a:t>
-              </a:r>
-            </a:p>
-          </p:txBody>
-        </p:sp>
-        <p:sp>
-          <p:nvSpPr>
-            <p:cNvPr id="10" name="Rectangle 9">
-              <a:extLst>
-                <a:ext uri="{FF2B5EF4-FFF2-40B4-BE49-F238E27FC236}">
-                  <a16:creationId xmlns:a16="http://schemas.microsoft.com/office/drawing/2014/main" id="{C4E9E2BE-D673-41E3-88C4-2631AD491523}"/>
-                </a:ext>
-              </a:extLst>
-            </p:cNvPr>
-            <p:cNvSpPr/>
-            <p:nvPr/>
-          </p:nvSpPr>
-          <p:spPr>
-            <a:xfrm>
-              <a:off x="1447800" y="1828800"/>
-              <a:ext cx="381000" cy="228600"/>
-            </a:xfrm>
-            <a:prstGeom prst="rect">
-              <a:avLst/>
-            </a:prstGeom>
+          </a:ln>
+        </p:spPr>
+        <p:style>
+          <a:lnRef idx="1">
+            <a:schemeClr val="accent1"/>
+          </a:lnRef>
+          <a:fillRef idx="0">
+            <a:schemeClr val="accent1"/>
+          </a:fillRef>
+          <a:effectRef idx="0">
+            <a:schemeClr val="accent1"/>
+          </a:effectRef>
+          <a:fontRef idx="minor">
+            <a:schemeClr val="tx1"/>
+          </a:fontRef>
+        </p:style>
+      </p:cxnSp>
+      <p:sp>
+        <p:nvSpPr>
+          <p:cNvPr id="16" name="Rectangle 15">
+            <a:extLst>
+              <a:ext uri="{FF2B5EF4-FFF2-40B4-BE49-F238E27FC236}">
+                <a16:creationId xmlns:a16="http://schemas.microsoft.com/office/drawing/2014/main" id="{6A5D7A8F-7D62-48CE-85BD-9B25ACD2A0B2}"/>
+              </a:ext>
+            </a:extLst>
+          </p:cNvPr>
+          <p:cNvSpPr/>
+          <p:nvPr/>
+        </p:nvSpPr>
+        <p:spPr>
+          <a:xfrm>
+            <a:off x="2019300" y="2209800"/>
+            <a:ext cx="381000" cy="231266"/>
+          </a:xfrm>
+          <a:prstGeom prst="rect">
+            <a:avLst/>
+          </a:prstGeom>
+          <a:solidFill>
+            <a:srgbClr val="FF0000"/>
+          </a:solidFill>
+          <a:ln>
+            <a:noFill/>
+          </a:ln>
+        </p:spPr>
+        <p:style>
+          <a:lnRef idx="2">
+            <a:schemeClr val="accent1">
+              <a:shade val="50000"/>
+            </a:schemeClr>
+          </a:lnRef>
+          <a:fillRef idx="1">
+            <a:schemeClr val="accent1"/>
+          </a:fillRef>
+          <a:effectRef idx="0">
+            <a:schemeClr val="accent1"/>
+          </a:effectRef>
+          <a:fontRef idx="minor">
+            <a:schemeClr val="lt1"/>
+          </a:fontRef>
+        </p:style>
+        <p:txBody>
+          <a:bodyPr lIns="0" rIns="0" rtlCol="0" anchor="ctr"/>
+          <a:lstStyle/>
+          <a:p>
+            <a:pPr algn="ctr">
+              <a:lnSpc>
+                <a:spcPts val="700"/>
+              </a:lnSpc>
+            </a:pPr>
+            <a:r>
+              <a:rPr lang="en-US" sz="800" dirty="0"/>
+              <a:t>not a branch</a:t>
+            </a:r>
+          </a:p>
+        </p:txBody>
+      </p:sp>
+      <p:cxnSp>
+        <p:nvCxnSpPr>
+          <p:cNvPr id="17" name="Straight Connector 16">
+            <a:extLst>
+              <a:ext uri="{FF2B5EF4-FFF2-40B4-BE49-F238E27FC236}">
+                <a16:creationId xmlns:a16="http://schemas.microsoft.com/office/drawing/2014/main" id="{995490EF-1958-456C-94D9-1C122273763F}"/>
+              </a:ext>
+            </a:extLst>
+          </p:cNvPr>
+          <p:cNvCxnSpPr>
+            <a:cxnSpLocks/>
+            <a:stCxn id="16" idx="0"/>
+            <a:endCxn id="8" idx="2"/>
+          </p:cNvCxnSpPr>
+          <p:nvPr/>
+        </p:nvCxnSpPr>
+        <p:spPr>
+          <a:xfrm flipH="1">
+            <a:off x="2019300" y="2209800"/>
+            <a:ext cx="190500" cy="0"/>
+          </a:xfrm>
+          <a:prstGeom prst="line">
+            <a:avLst/>
+          </a:prstGeom>
+          <a:ln w="19050" cap="flat">
             <a:solidFill>
-              <a:srgbClr val="FF0000"/>
+              <a:schemeClr val="tx1"/>
             </a:solidFill>
-            <a:ln>
-              <a:noFill/>
-            </a:ln>
-          </p:spPr>
-          <p:style>
-            <a:lnRef idx="2">
-              <a:schemeClr val="accent1">
-                <a:shade val="50000"/>
-              </a:schemeClr>
-            </a:lnRef>
-            <a:fillRef idx="1">
-              <a:schemeClr val="accent1"/>
-            </a:fillRef>
-            <a:effectRef idx="0">
-              <a:schemeClr val="accent1"/>
-            </a:effectRef>
-            <a:fontRef idx="minor">
-              <a:schemeClr val="lt1"/>
-            </a:fontRef>
-          </p:style>
-          <p:txBody>
-            <a:bodyPr lIns="0" rIns="0" rtlCol="0" anchor="ctr"/>
-            <a:lstStyle/>
-            <a:p>
-              <a:pPr algn="ctr"/>
-              <a:r>
-                <a:rPr lang="en-US" sz="800" dirty="0"/>
-                <a:t>branch</a:t>
-              </a:r>
-            </a:p>
-          </p:txBody>
-        </p:sp>
-        <p:cxnSp>
-          <p:nvCxnSpPr>
-            <p:cNvPr id="12" name="Straight Connector 11">
-              <a:extLst>
-                <a:ext uri="{FF2B5EF4-FFF2-40B4-BE49-F238E27FC236}">
-                  <a16:creationId xmlns:a16="http://schemas.microsoft.com/office/drawing/2014/main" id="{2F89B487-1223-4EB3-B5DA-B7F0E5A4FEDD}"/>
-                </a:ext>
-              </a:extLst>
-            </p:cNvPr>
-            <p:cNvCxnSpPr>
-              <a:cxnSpLocks/>
-            </p:cNvCxnSpPr>
-            <p:nvPr/>
-          </p:nvCxnSpPr>
-          <p:spPr>
-            <a:xfrm>
-              <a:off x="2209800" y="1600200"/>
-              <a:ext cx="222" cy="231266"/>
-            </a:xfrm>
-            <a:prstGeom prst="line">
-              <a:avLst/>
-            </a:prstGeom>
-            <a:ln w="19050" cap="flat">
-              <a:solidFill>
-                <a:schemeClr val="tx1"/>
-              </a:solidFill>
-            </a:ln>
-          </p:spPr>
-          <p:style>
-            <a:lnRef idx="1">
-              <a:schemeClr val="accent1"/>
-            </a:lnRef>
-            <a:fillRef idx="0">
-              <a:schemeClr val="accent1"/>
-            </a:fillRef>
-            <a:effectRef idx="0">
-              <a:schemeClr val="accent1"/>
-            </a:effectRef>
-            <a:fontRef idx="minor">
-              <a:schemeClr val="tx1"/>
-            </a:fontRef>
-          </p:style>
-        </p:cxnSp>
-        <p:cxnSp>
-          <p:nvCxnSpPr>
-            <p:cNvPr id="15" name="Straight Connector 14">
-              <a:extLst>
-                <a:ext uri="{FF2B5EF4-FFF2-40B4-BE49-F238E27FC236}">
-                  <a16:creationId xmlns:a16="http://schemas.microsoft.com/office/drawing/2014/main" id="{9D61B4C6-C104-413E-BB50-3C89F8494D5B}"/>
-                </a:ext>
-              </a:extLst>
-            </p:cNvPr>
-            <p:cNvCxnSpPr>
-              <a:cxnSpLocks/>
-            </p:cNvCxnSpPr>
-            <p:nvPr/>
-          </p:nvCxnSpPr>
-          <p:spPr>
-            <a:xfrm>
-              <a:off x="1828578" y="1826134"/>
-              <a:ext cx="222" cy="231266"/>
-            </a:xfrm>
-            <a:prstGeom prst="line">
-              <a:avLst/>
-            </a:prstGeom>
-            <a:ln w="19050" cap="flat">
-              <a:solidFill>
-                <a:schemeClr val="tx1"/>
-              </a:solidFill>
-            </a:ln>
-          </p:spPr>
-          <p:style>
-            <a:lnRef idx="1">
-              <a:schemeClr val="accent1"/>
-            </a:lnRef>
-            <a:fillRef idx="0">
-              <a:schemeClr val="accent1"/>
-            </a:fillRef>
-            <a:effectRef idx="0">
-              <a:schemeClr val="accent1"/>
-            </a:effectRef>
-            <a:fontRef idx="minor">
-              <a:schemeClr val="tx1"/>
-            </a:fontRef>
-          </p:style>
-        </p:cxnSp>
-        <p:sp>
-          <p:nvSpPr>
-            <p:cNvPr id="16" name="Rectangle 15">
-              <a:extLst>
-                <a:ext uri="{FF2B5EF4-FFF2-40B4-BE49-F238E27FC236}">
-                  <a16:creationId xmlns:a16="http://schemas.microsoft.com/office/drawing/2014/main" id="{6A5D7A8F-7D62-48CE-85BD-9B25ACD2A0B2}"/>
-                </a:ext>
-              </a:extLst>
-            </p:cNvPr>
-            <p:cNvSpPr/>
-            <p:nvPr/>
-          </p:nvSpPr>
-          <p:spPr>
-            <a:xfrm>
-              <a:off x="2019300" y="2209800"/>
-              <a:ext cx="381000" cy="231266"/>
-            </a:xfrm>
-            <a:prstGeom prst="rect">
-              <a:avLst/>
-            </a:prstGeom>
-            <a:solidFill>
-              <a:srgbClr val="FF0000"/>
-            </a:solidFill>
-            <a:ln>
-              <a:noFill/>
-            </a:ln>
-          </p:spPr>
-          <p:style>
-            <a:lnRef idx="2">
-              <a:schemeClr val="accent1">
-                <a:shade val="50000"/>
-              </a:schemeClr>
-            </a:lnRef>
-            <a:fillRef idx="1">
-              <a:schemeClr val="accent1"/>
-            </a:fillRef>
-            <a:effectRef idx="0">
-              <a:schemeClr val="accent1"/>
-            </a:effectRef>
-            <a:fontRef idx="minor">
-              <a:schemeClr val="lt1"/>
-            </a:fontRef>
-          </p:style>
-          <p:txBody>
-            <a:bodyPr lIns="0" rIns="0" rtlCol="0" anchor="ctr"/>
-            <a:lstStyle/>
-            <a:p>
-              <a:pPr algn="ctr">
-                <a:lnSpc>
-                  <a:spcPts val="700"/>
-                </a:lnSpc>
-              </a:pPr>
-              <a:r>
-                <a:rPr lang="en-US" sz="800" dirty="0"/>
-                <a:t>not a branch</a:t>
-              </a:r>
-            </a:p>
-          </p:txBody>
-        </p:sp>
-        <p:cxnSp>
-          <p:nvCxnSpPr>
-            <p:cNvPr id="17" name="Straight Connector 16">
-              <a:extLst>
-                <a:ext uri="{FF2B5EF4-FFF2-40B4-BE49-F238E27FC236}">
-                  <a16:creationId xmlns:a16="http://schemas.microsoft.com/office/drawing/2014/main" id="{995490EF-1958-456C-94D9-1C122273763F}"/>
-                </a:ext>
-              </a:extLst>
-            </p:cNvPr>
-            <p:cNvCxnSpPr>
-              <a:cxnSpLocks/>
-              <a:stCxn id="16" idx="0"/>
-              <a:endCxn id="8" idx="2"/>
-            </p:cNvCxnSpPr>
-            <p:nvPr/>
-          </p:nvCxnSpPr>
-          <p:spPr>
-            <a:xfrm flipH="1">
-              <a:off x="2019300" y="2209800"/>
-              <a:ext cx="190500" cy="0"/>
-            </a:xfrm>
-            <a:prstGeom prst="line">
-              <a:avLst/>
-            </a:prstGeom>
-            <a:ln w="19050" cap="flat">
-              <a:solidFill>
-                <a:schemeClr val="tx1"/>
-              </a:solidFill>
-            </a:ln>
-          </p:spPr>
-          <p:style>
-            <a:lnRef idx="1">
-              <a:schemeClr val="accent1"/>
-            </a:lnRef>
-            <a:fillRef idx="0">
-              <a:schemeClr val="accent1"/>
-            </a:fillRef>
-            <a:effectRef idx="0">
-              <a:schemeClr val="accent1"/>
-            </a:effectRef>
-            <a:fontRef idx="minor">
-              <a:schemeClr val="tx1"/>
-            </a:fontRef>
-          </p:style>
-        </p:cxnSp>
-      </p:grpSp>
+          </a:ln>
+        </p:spPr>
+        <p:style>
+          <a:lnRef idx="1">
+            <a:schemeClr val="accent1"/>
+          </a:lnRef>
+          <a:fillRef idx="0">
+            <a:schemeClr val="accent1"/>
+          </a:fillRef>
+          <a:effectRef idx="0">
+            <a:schemeClr val="accent1"/>
+          </a:effectRef>
+          <a:fontRef idx="minor">
+            <a:schemeClr val="tx1"/>
+          </a:fontRef>
+        </p:style>
+      </p:cxnSp>
       <p:sp>
         <p:nvSpPr>
           <p:cNvPr id="21" name="TextBox 20">
@@ -16229,6 +16208,196 @@
           </p:sp>
         </p:grpSp>
       </p:grpSp>
+      <p:grpSp>
+        <p:nvGrpSpPr>
+          <p:cNvPr id="63" name="Group 62">
+            <a:extLst>
+              <a:ext uri="{FF2B5EF4-FFF2-40B4-BE49-F238E27FC236}">
+                <a16:creationId xmlns:a16="http://schemas.microsoft.com/office/drawing/2014/main" id="{BB0F86AF-6F3D-4317-B4F4-0962074715DE}"/>
+              </a:ext>
+            </a:extLst>
+          </p:cNvPr>
+          <p:cNvGrpSpPr/>
+          <p:nvPr/>
+        </p:nvGrpSpPr>
+        <p:grpSpPr>
+          <a:xfrm>
+            <a:off x="3505200" y="1502545"/>
+            <a:ext cx="1143000" cy="707255"/>
+            <a:chOff x="3505200" y="1502545"/>
+            <a:chExt cx="1143000" cy="707255"/>
+          </a:xfrm>
+        </p:grpSpPr>
+        <p:sp>
+          <p:nvSpPr>
+            <p:cNvPr id="70" name="Rectangle 69">
+              <a:extLst>
+                <a:ext uri="{FF2B5EF4-FFF2-40B4-BE49-F238E27FC236}">
+                  <a16:creationId xmlns:a16="http://schemas.microsoft.com/office/drawing/2014/main" id="{D98E595E-7A6C-44A9-BBAD-FD59359FEFF6}"/>
+                </a:ext>
+              </a:extLst>
+            </p:cNvPr>
+            <p:cNvSpPr/>
+            <p:nvPr/>
+          </p:nvSpPr>
+          <p:spPr>
+            <a:xfrm>
+              <a:off x="3886200" y="1600200"/>
+              <a:ext cx="381000" cy="609600"/>
+            </a:xfrm>
+            <a:prstGeom prst="rect">
+              <a:avLst/>
+            </a:prstGeom>
+            <a:solidFill>
+              <a:srgbClr val="0066FF"/>
+            </a:solidFill>
+            <a:ln>
+              <a:noFill/>
+            </a:ln>
+          </p:spPr>
+          <p:style>
+            <a:lnRef idx="2">
+              <a:schemeClr val="accent1">
+                <a:shade val="50000"/>
+              </a:schemeClr>
+            </a:lnRef>
+            <a:fillRef idx="1">
+              <a:schemeClr val="accent1"/>
+            </a:fillRef>
+            <a:effectRef idx="0">
+              <a:schemeClr val="accent1"/>
+            </a:effectRef>
+            <a:fontRef idx="minor">
+              <a:schemeClr val="lt1"/>
+            </a:fontRef>
+          </p:style>
+          <p:txBody>
+            <a:bodyPr lIns="0" rIns="0" rtlCol="0" anchor="ctr"/>
+            <a:lstStyle/>
+            <a:p>
+              <a:pPr algn="ctr"/>
+              <a:r>
+                <a:rPr lang="en-US" sz="1000" dirty="0"/>
+                <a:t>trunk</a:t>
+              </a:r>
+            </a:p>
+          </p:txBody>
+        </p:sp>
+        <p:sp>
+          <p:nvSpPr>
+            <p:cNvPr id="71" name="Rectangle 70">
+              <a:extLst>
+                <a:ext uri="{FF2B5EF4-FFF2-40B4-BE49-F238E27FC236}">
+                  <a16:creationId xmlns:a16="http://schemas.microsoft.com/office/drawing/2014/main" id="{385FDDC3-1764-42BA-8382-E0900711A86C}"/>
+                </a:ext>
+              </a:extLst>
+            </p:cNvPr>
+            <p:cNvSpPr/>
+            <p:nvPr/>
+          </p:nvSpPr>
+          <p:spPr>
+            <a:xfrm>
+              <a:off x="3505200" y="1828800"/>
+              <a:ext cx="381000" cy="228600"/>
+            </a:xfrm>
+            <a:prstGeom prst="rect">
+              <a:avLst/>
+            </a:prstGeom>
+            <a:solidFill>
+              <a:srgbClr val="FF0000"/>
+            </a:solidFill>
+            <a:ln>
+              <a:noFill/>
+            </a:ln>
+          </p:spPr>
+          <p:style>
+            <a:lnRef idx="2">
+              <a:schemeClr val="accent1">
+                <a:shade val="50000"/>
+              </a:schemeClr>
+            </a:lnRef>
+            <a:fillRef idx="1">
+              <a:schemeClr val="accent1"/>
+            </a:fillRef>
+            <a:effectRef idx="0">
+              <a:schemeClr val="accent1"/>
+            </a:effectRef>
+            <a:fontRef idx="minor">
+              <a:schemeClr val="lt1"/>
+            </a:fontRef>
+          </p:style>
+          <p:txBody>
+            <a:bodyPr lIns="0" rIns="0" rtlCol="0" anchor="ctr"/>
+            <a:lstStyle/>
+            <a:p>
+              <a:pPr algn="ctr"/>
+              <a:r>
+                <a:rPr lang="en-US" sz="800" dirty="0"/>
+                <a:t>branch</a:t>
+              </a:r>
+            </a:p>
+          </p:txBody>
+        </p:sp>
+        <p:sp>
+          <p:nvSpPr>
+            <p:cNvPr id="73" name="Rectangle 72">
+              <a:extLst>
+                <a:ext uri="{FF2B5EF4-FFF2-40B4-BE49-F238E27FC236}">
+                  <a16:creationId xmlns:a16="http://schemas.microsoft.com/office/drawing/2014/main" id="{AF77DE1C-A460-4ACE-8FE7-B78611617ACD}"/>
+                </a:ext>
+              </a:extLst>
+            </p:cNvPr>
+            <p:cNvSpPr/>
+            <p:nvPr/>
+          </p:nvSpPr>
+          <p:spPr>
+            <a:xfrm>
+              <a:off x="4267200" y="1502545"/>
+              <a:ext cx="381000" cy="231266"/>
+            </a:xfrm>
+            <a:prstGeom prst="rect">
+              <a:avLst/>
+            </a:prstGeom>
+            <a:solidFill>
+              <a:srgbClr val="FF0000"/>
+            </a:solidFill>
+            <a:ln>
+              <a:noFill/>
+            </a:ln>
+          </p:spPr>
+          <p:style>
+            <a:lnRef idx="2">
+              <a:schemeClr val="accent1">
+                <a:shade val="50000"/>
+              </a:schemeClr>
+            </a:lnRef>
+            <a:fillRef idx="1">
+              <a:schemeClr val="accent1"/>
+            </a:fillRef>
+            <a:effectRef idx="0">
+              <a:schemeClr val="accent1"/>
+            </a:effectRef>
+            <a:fontRef idx="minor">
+              <a:schemeClr val="lt1"/>
+            </a:fontRef>
+          </p:style>
+          <p:txBody>
+            <a:bodyPr lIns="0" rIns="0" rtlCol="0" anchor="ctr"/>
+            <a:lstStyle/>
+            <a:p>
+              <a:pPr algn="ctr">
+                <a:lnSpc>
+                  <a:spcPts val="700"/>
+                </a:lnSpc>
+              </a:pPr>
+              <a:r>
+                <a:rPr lang="en-US" sz="800" dirty="0"/>
+                <a:t>not a branch</a:t>
+              </a:r>
+            </a:p>
+          </p:txBody>
+        </p:sp>
+      </p:grpSp>
     </p:spTree>
     <p:extLst>
       <p:ext uri="{BB962C8B-B14F-4D97-AF65-F5344CB8AC3E}">
@@ -20284,8 +20453,8 @@
             </a:p>
           </p:txBody>
         </p:sp>
-        <mc:AlternateContent xmlns:mc="http://schemas.openxmlformats.org/markup-compatibility/2006">
-          <mc:Choice xmlns:a14="http://schemas.microsoft.com/office/drawing/2010/main" Requires="a14">
+        <mc:AlternateContent xmlns:mc="http://schemas.openxmlformats.org/markup-compatibility/2006" xmlns:a14="http://schemas.microsoft.com/office/drawing/2010/main">
+          <mc:Choice Requires="a14">
             <p:sp>
               <p:nvSpPr>
                 <p:cNvPr id="9" name="TextBox 8">
@@ -20314,6 +20483,7 @@
                 </a:bodyPr>
                 <a:lstStyle/>
                 <a:p>
+                  <a:pPr/>
                   <a14:m>
                     <m:oMathPara xmlns:m="http://schemas.openxmlformats.org/officeDocument/2006/math">
                       <m:oMathParaPr>
@@ -20427,7 +20597,7 @@
               </p:txBody>
             </p:sp>
           </mc:Choice>
-          <mc:Fallback>
+          <mc:Fallback xmlns="">
             <p:sp>
               <p:nvSpPr>
                 <p:cNvPr id="9" name="TextBox 8">
@@ -20472,8 +20642,8 @@
             </p:sp>
           </mc:Fallback>
         </mc:AlternateContent>
-        <mc:AlternateContent xmlns:mc="http://schemas.openxmlformats.org/markup-compatibility/2006">
-          <mc:Choice xmlns:a14="http://schemas.microsoft.com/office/drawing/2010/main" Requires="a14">
+        <mc:AlternateContent xmlns:mc="http://schemas.openxmlformats.org/markup-compatibility/2006" xmlns:a14="http://schemas.microsoft.com/office/drawing/2010/main">
+          <mc:Choice Requires="a14">
             <p:sp>
               <p:nvSpPr>
                 <p:cNvPr id="10" name="TextBox 9">
@@ -20502,6 +20672,7 @@
                 </a:bodyPr>
                 <a:lstStyle/>
                 <a:p>
+                  <a:pPr/>
                   <a14:m>
                     <m:oMathPara xmlns:m="http://schemas.openxmlformats.org/officeDocument/2006/math">
                       <m:oMathParaPr>
@@ -20615,7 +20786,7 @@
               </p:txBody>
             </p:sp>
           </mc:Choice>
-          <mc:Fallback>
+          <mc:Fallback xmlns="">
             <p:sp>
               <p:nvSpPr>
                 <p:cNvPr id="10" name="TextBox 9">
@@ -20703,8 +20874,8 @@
             </a:fontRef>
           </p:style>
         </p:cxnSp>
-        <mc:AlternateContent xmlns:mc="http://schemas.openxmlformats.org/markup-compatibility/2006">
-          <mc:Choice xmlns:a14="http://schemas.microsoft.com/office/drawing/2010/main" Requires="a14">
+        <mc:AlternateContent xmlns:mc="http://schemas.openxmlformats.org/markup-compatibility/2006" xmlns:a14="http://schemas.microsoft.com/office/drawing/2010/main">
+          <mc:Choice Requires="a14">
             <p:sp>
               <p:nvSpPr>
                 <p:cNvPr id="14" name="TextBox 13">
@@ -20735,6 +20906,7 @@
                 </a:bodyPr>
                 <a:lstStyle/>
                 <a:p>
+                  <a:pPr/>
                   <a14:m>
                     <m:oMathPara xmlns:m="http://schemas.openxmlformats.org/officeDocument/2006/math">
                       <m:oMathParaPr>
@@ -20774,7 +20946,7 @@
               </p:txBody>
             </p:sp>
           </mc:Choice>
-          <mc:Fallback>
+          <mc:Fallback xmlns="">
             <p:sp>
               <p:nvSpPr>
                 <p:cNvPr id="14" name="TextBox 13">
@@ -20864,8 +21036,8 @@
             </a:fontRef>
           </p:style>
         </p:cxnSp>
-        <mc:AlternateContent xmlns:mc="http://schemas.openxmlformats.org/markup-compatibility/2006">
-          <mc:Choice xmlns:a14="http://schemas.microsoft.com/office/drawing/2010/main" Requires="a14">
+        <mc:AlternateContent xmlns:mc="http://schemas.openxmlformats.org/markup-compatibility/2006" xmlns:a14="http://schemas.microsoft.com/office/drawing/2010/main">
+          <mc:Choice Requires="a14">
             <p:sp>
               <p:nvSpPr>
                 <p:cNvPr id="18" name="TextBox 17">
@@ -20896,6 +21068,7 @@
                 </a:bodyPr>
                 <a:lstStyle/>
                 <a:p>
+                  <a:pPr/>
                   <a14:m>
                     <m:oMathPara xmlns:m="http://schemas.openxmlformats.org/officeDocument/2006/math">
                       <m:oMathParaPr>
@@ -20935,7 +21108,7 @@
               </p:txBody>
             </p:sp>
           </mc:Choice>
-          <mc:Fallback>
+          <mc:Fallback xmlns="">
             <p:sp>
               <p:nvSpPr>
                 <p:cNvPr id="18" name="TextBox 17">
@@ -21025,8 +21198,8 @@
             </a:fontRef>
           </p:style>
         </p:cxnSp>
-        <mc:AlternateContent xmlns:mc="http://schemas.openxmlformats.org/markup-compatibility/2006">
-          <mc:Choice xmlns:a14="http://schemas.microsoft.com/office/drawing/2010/main" Requires="a14">
+        <mc:AlternateContent xmlns:mc="http://schemas.openxmlformats.org/markup-compatibility/2006" xmlns:a14="http://schemas.microsoft.com/office/drawing/2010/main">
+          <mc:Choice Requires="a14">
             <p:sp>
               <p:nvSpPr>
                 <p:cNvPr id="22" name="TextBox 21">
@@ -21057,6 +21230,7 @@
                 </a:bodyPr>
                 <a:lstStyle/>
                 <a:p>
+                  <a:pPr/>
                   <a14:m>
                     <m:oMathPara xmlns:m="http://schemas.openxmlformats.org/officeDocument/2006/math">
                       <m:oMathParaPr>
@@ -21096,7 +21270,7 @@
               </p:txBody>
             </p:sp>
           </mc:Choice>
-          <mc:Fallback>
+          <mc:Fallback xmlns="">
             <p:sp>
               <p:nvSpPr>
                 <p:cNvPr id="22" name="TextBox 21">
@@ -21186,8 +21360,8 @@
             </a:fontRef>
           </p:style>
         </p:cxnSp>
-        <mc:AlternateContent xmlns:mc="http://schemas.openxmlformats.org/markup-compatibility/2006">
-          <mc:Choice xmlns:a14="http://schemas.microsoft.com/office/drawing/2010/main" Requires="a14">
+        <mc:AlternateContent xmlns:mc="http://schemas.openxmlformats.org/markup-compatibility/2006" xmlns:a14="http://schemas.microsoft.com/office/drawing/2010/main">
+          <mc:Choice Requires="a14">
             <p:sp>
               <p:nvSpPr>
                 <p:cNvPr id="24" name="TextBox 23">
@@ -21218,6 +21392,7 @@
                 </a:bodyPr>
                 <a:lstStyle/>
                 <a:p>
+                  <a:pPr/>
                   <a14:m>
                     <m:oMathPara xmlns:m="http://schemas.openxmlformats.org/officeDocument/2006/math">
                       <m:oMathParaPr>
@@ -21257,7 +21432,7 @@
               </p:txBody>
             </p:sp>
           </mc:Choice>
-          <mc:Fallback>
+          <mc:Fallback xmlns="">
             <p:sp>
               <p:nvSpPr>
                 <p:cNvPr id="24" name="TextBox 23">

</xml_diff>

<commit_message>
minor changes t STROP doc
</commit_message>
<xml_diff>
--- a/doc/Floorplan_picts.pptx
+++ b/doc/Floorplan_picts.pptx
@@ -5,10 +5,10 @@
     <p:sldMasterId id="2147483648" r:id="rId1"/>
   </p:sldMasterIdLst>
   <p:notesMasterIdLst>
-    <p:notesMasterId r:id="rId13"/>
+    <p:notesMasterId r:id="rId14"/>
   </p:notesMasterIdLst>
   <p:handoutMasterIdLst>
-    <p:handoutMasterId r:id="rId14"/>
+    <p:handoutMasterId r:id="rId15"/>
   </p:handoutMasterIdLst>
   <p:sldIdLst>
     <p:sldId id="613" r:id="rId2"/>
@@ -22,6 +22,7 @@
     <p:sldId id="614" r:id="rId10"/>
     <p:sldId id="615" r:id="rId11"/>
     <p:sldId id="616" r:id="rId12"/>
+    <p:sldId id="619" r:id="rId13"/>
   </p:sldIdLst>
   <p:sldSz cx="9144000" cy="6858000" type="screen4x3"/>
   <p:notesSz cx="7315200" cy="9601200"/>
@@ -13343,7 +13344,7 @@
           <a:p>
             <a:r>
               <a:rPr lang="en-US" dirty="0"/>
-              <a:t>STOGs</a:t>
+              <a:t>STROPs</a:t>
             </a:r>
           </a:p>
         </p:txBody>
@@ -16402,6 +16403,3060 @@
     <p:extLst>
       <p:ext uri="{BB962C8B-B14F-4D97-AF65-F5344CB8AC3E}">
         <p14:creationId xmlns:p14="http://schemas.microsoft.com/office/powerpoint/2010/main" val="625782385"/>
+      </p:ext>
+    </p:extLst>
+  </p:cSld>
+  <p:clrMapOvr>
+    <a:masterClrMapping/>
+  </p:clrMapOvr>
+</p:sld>
+</file>
+
+<file path=ppt/slides/slide12.xml><?xml version="1.0" encoding="utf-8"?>
+<p:sld xmlns:a="http://schemas.openxmlformats.org/drawingml/2006/main" xmlns:r="http://schemas.openxmlformats.org/officeDocument/2006/relationships" xmlns:p="http://schemas.openxmlformats.org/presentationml/2006/main">
+  <p:cSld>
+    <p:spTree>
+      <p:nvGrpSpPr>
+        <p:cNvPr id="1" name=""/>
+        <p:cNvGrpSpPr/>
+        <p:nvPr/>
+      </p:nvGrpSpPr>
+      <p:grpSpPr>
+        <a:xfrm>
+          <a:off x="0" y="0"/>
+          <a:ext cx="0" cy="0"/>
+          <a:chOff x="0" y="0"/>
+          <a:chExt cx="0" cy="0"/>
+        </a:xfrm>
+      </p:grpSpPr>
+      <p:sp>
+        <p:nvSpPr>
+          <p:cNvPr id="2" name="Title 1">
+            <a:extLst>
+              <a:ext uri="{FF2B5EF4-FFF2-40B4-BE49-F238E27FC236}">
+                <a16:creationId xmlns:a16="http://schemas.microsoft.com/office/drawing/2014/main" id="{6EBB164A-02E1-472D-983B-D4D892C98B9C}"/>
+              </a:ext>
+            </a:extLst>
+          </p:cNvPr>
+          <p:cNvSpPr>
+            <a:spLocks noGrp="1"/>
+          </p:cNvSpPr>
+          <p:nvPr>
+            <p:ph type="title"/>
+          </p:nvPr>
+        </p:nvSpPr>
+        <p:spPr/>
+        <p:txBody>
+          <a:bodyPr>
+            <a:normAutofit fontScale="90000"/>
+          </a:bodyPr>
+          <a:lstStyle/>
+          <a:p>
+            <a:r>
+              <a:rPr lang="en-US" dirty="0"/>
+              <a:t>STROP decomposition</a:t>
+            </a:r>
+          </a:p>
+        </p:txBody>
+      </p:sp>
+      <p:sp>
+        <p:nvSpPr>
+          <p:cNvPr id="3" name="Date Placeholder 2">
+            <a:extLst>
+              <a:ext uri="{FF2B5EF4-FFF2-40B4-BE49-F238E27FC236}">
+                <a16:creationId xmlns:a16="http://schemas.microsoft.com/office/drawing/2014/main" id="{39F93342-4FC6-4F2D-80F9-DE2BCB4D9968}"/>
+              </a:ext>
+            </a:extLst>
+          </p:cNvPr>
+          <p:cNvSpPr>
+            <a:spLocks noGrp="1"/>
+          </p:cNvSpPr>
+          <p:nvPr>
+            <p:ph type="dt" sz="half" idx="10"/>
+          </p:nvPr>
+        </p:nvSpPr>
+        <p:spPr/>
+        <p:txBody>
+          <a:bodyPr/>
+          <a:lstStyle/>
+          <a:p>
+            <a:r>
+              <a:rPr lang="en-US"/>
+              <a:t>Whiteboard</a:t>
+            </a:r>
+          </a:p>
+        </p:txBody>
+      </p:sp>
+      <p:sp>
+        <p:nvSpPr>
+          <p:cNvPr id="4" name="Footer Placeholder 3">
+            <a:extLst>
+              <a:ext uri="{FF2B5EF4-FFF2-40B4-BE49-F238E27FC236}">
+                <a16:creationId xmlns:a16="http://schemas.microsoft.com/office/drawing/2014/main" id="{E233B044-20C8-4F0D-A38C-01658C1AEDB1}"/>
+              </a:ext>
+            </a:extLst>
+          </p:cNvPr>
+          <p:cNvSpPr>
+            <a:spLocks noGrp="1"/>
+          </p:cNvSpPr>
+          <p:nvPr>
+            <p:ph type="ftr" sz="quarter" idx="11"/>
+          </p:nvPr>
+        </p:nvSpPr>
+        <p:spPr/>
+        <p:txBody>
+          <a:bodyPr/>
+          <a:lstStyle/>
+          <a:p>
+            <a:r>
+              <a:rPr lang="en-US"/>
+              <a:t>JC</a:t>
+            </a:r>
+          </a:p>
+        </p:txBody>
+      </p:sp>
+      <p:sp>
+        <p:nvSpPr>
+          <p:cNvPr id="5" name="Slide Number Placeholder 4">
+            <a:extLst>
+              <a:ext uri="{FF2B5EF4-FFF2-40B4-BE49-F238E27FC236}">
+                <a16:creationId xmlns:a16="http://schemas.microsoft.com/office/drawing/2014/main" id="{D3F06439-3827-4634-B41B-D46C5D1FF664}"/>
+              </a:ext>
+            </a:extLst>
+          </p:cNvPr>
+          <p:cNvSpPr>
+            <a:spLocks noGrp="1"/>
+          </p:cNvSpPr>
+          <p:nvPr>
+            <p:ph type="sldNum" sz="quarter" idx="12"/>
+          </p:nvPr>
+        </p:nvSpPr>
+        <p:spPr/>
+        <p:txBody>
+          <a:bodyPr/>
+          <a:lstStyle/>
+          <a:p>
+            <a:fld id="{B6F15528-21DE-4FAA-801E-634DDDAF4B2B}" type="slidenum">
+              <a:rPr lang="en-US" smtClean="0"/>
+              <a:t>12</a:t>
+            </a:fld>
+            <a:endParaRPr lang="en-US"/>
+          </a:p>
+        </p:txBody>
+      </p:sp>
+      <p:grpSp>
+        <p:nvGrpSpPr>
+          <p:cNvPr id="72" name="Group 71">
+            <a:extLst>
+              <a:ext uri="{FF2B5EF4-FFF2-40B4-BE49-F238E27FC236}">
+                <a16:creationId xmlns:a16="http://schemas.microsoft.com/office/drawing/2014/main" id="{ED493FC1-F541-49CA-B20A-05B902EBAF4D}"/>
+              </a:ext>
+            </a:extLst>
+          </p:cNvPr>
+          <p:cNvGrpSpPr/>
+          <p:nvPr/>
+        </p:nvGrpSpPr>
+        <p:grpSpPr>
+          <a:xfrm>
+            <a:off x="1828800" y="4724400"/>
+            <a:ext cx="5257800" cy="537184"/>
+            <a:chOff x="1828800" y="4724400"/>
+            <a:chExt cx="5257800" cy="537184"/>
+          </a:xfrm>
+        </p:grpSpPr>
+        <p:grpSp>
+          <p:nvGrpSpPr>
+            <p:cNvPr id="11" name="Group 10">
+              <a:extLst>
+                <a:ext uri="{FF2B5EF4-FFF2-40B4-BE49-F238E27FC236}">
+                  <a16:creationId xmlns:a16="http://schemas.microsoft.com/office/drawing/2014/main" id="{FD6F7620-730E-4F0C-A141-4B0074E713EB}"/>
+                </a:ext>
+              </a:extLst>
+            </p:cNvPr>
+            <p:cNvGrpSpPr/>
+            <p:nvPr/>
+          </p:nvGrpSpPr>
+          <p:grpSpPr>
+            <a:xfrm>
+              <a:off x="1828800" y="4724400"/>
+              <a:ext cx="762000" cy="533400"/>
+              <a:chOff x="1828800" y="4724400"/>
+              <a:chExt cx="762000" cy="533400"/>
+            </a:xfrm>
+          </p:grpSpPr>
+          <p:sp>
+            <p:nvSpPr>
+              <p:cNvPr id="27" name="Rectangle 26">
+                <a:extLst>
+                  <a:ext uri="{FF2B5EF4-FFF2-40B4-BE49-F238E27FC236}">
+                    <a16:creationId xmlns:a16="http://schemas.microsoft.com/office/drawing/2014/main" id="{CAEBA943-172D-41B0-A682-B9A27C1B936F}"/>
+                  </a:ext>
+                </a:extLst>
+              </p:cNvPr>
+              <p:cNvSpPr/>
+              <p:nvPr/>
+            </p:nvSpPr>
+            <p:spPr>
+              <a:xfrm>
+                <a:off x="1828800" y="4724400"/>
+                <a:ext cx="304800" cy="533400"/>
+              </a:xfrm>
+              <a:prstGeom prst="rect">
+                <a:avLst/>
+              </a:prstGeom>
+              <a:solidFill>
+                <a:srgbClr val="0066FF"/>
+              </a:solidFill>
+              <a:ln>
+                <a:noFill/>
+              </a:ln>
+            </p:spPr>
+            <p:style>
+              <a:lnRef idx="2">
+                <a:schemeClr val="accent1">
+                  <a:shade val="50000"/>
+                </a:schemeClr>
+              </a:lnRef>
+              <a:fillRef idx="1">
+                <a:schemeClr val="accent1"/>
+              </a:fillRef>
+              <a:effectRef idx="0">
+                <a:schemeClr val="accent1"/>
+              </a:effectRef>
+              <a:fontRef idx="minor">
+                <a:schemeClr val="lt1"/>
+              </a:fontRef>
+            </p:style>
+            <p:txBody>
+              <a:bodyPr rtlCol="0" anchor="ctr"/>
+              <a:lstStyle/>
+              <a:p>
+                <a:pPr algn="ctr"/>
+                <a:r>
+                  <a:rPr lang="en-US" sz="1000" b="1" dirty="0"/>
+                  <a:t>T</a:t>
+                </a:r>
+              </a:p>
+            </p:txBody>
+          </p:sp>
+          <p:sp>
+            <p:nvSpPr>
+              <p:cNvPr id="28" name="Rectangle 27">
+                <a:extLst>
+                  <a:ext uri="{FF2B5EF4-FFF2-40B4-BE49-F238E27FC236}">
+                    <a16:creationId xmlns:a16="http://schemas.microsoft.com/office/drawing/2014/main" id="{599793CA-34A8-4E63-B7A3-2104B74413ED}"/>
+                  </a:ext>
+                </a:extLst>
+              </p:cNvPr>
+              <p:cNvSpPr/>
+              <p:nvPr/>
+            </p:nvSpPr>
+            <p:spPr>
+              <a:xfrm>
+                <a:off x="2133378" y="5032984"/>
+                <a:ext cx="305022" cy="224816"/>
+              </a:xfrm>
+              <a:prstGeom prst="rect">
+                <a:avLst/>
+              </a:prstGeom>
+              <a:solidFill>
+                <a:srgbClr val="FF0000"/>
+              </a:solidFill>
+              <a:ln>
+                <a:noFill/>
+              </a:ln>
+            </p:spPr>
+            <p:style>
+              <a:lnRef idx="2">
+                <a:schemeClr val="accent1">
+                  <a:shade val="50000"/>
+                </a:schemeClr>
+              </a:lnRef>
+              <a:fillRef idx="1">
+                <a:schemeClr val="accent1"/>
+              </a:fillRef>
+              <a:effectRef idx="0">
+                <a:schemeClr val="accent1"/>
+              </a:effectRef>
+              <a:fontRef idx="minor">
+                <a:schemeClr val="lt1"/>
+              </a:fontRef>
+            </p:style>
+            <p:txBody>
+              <a:bodyPr rtlCol="0" anchor="ctr"/>
+              <a:lstStyle/>
+              <a:p>
+                <a:pPr algn="ctr"/>
+                <a:r>
+                  <a:rPr lang="en-US" sz="1000" b="1" dirty="0"/>
+                  <a:t>E</a:t>
+                </a:r>
+              </a:p>
+            </p:txBody>
+          </p:sp>
+          <p:sp>
+            <p:nvSpPr>
+              <p:cNvPr id="29" name="Rectangle 28">
+                <a:extLst>
+                  <a:ext uri="{FF2B5EF4-FFF2-40B4-BE49-F238E27FC236}">
+                    <a16:creationId xmlns:a16="http://schemas.microsoft.com/office/drawing/2014/main" id="{A18D25D7-6E5B-49D5-AEBE-01CE7B8D9C1C}"/>
+                  </a:ext>
+                </a:extLst>
+              </p:cNvPr>
+              <p:cNvSpPr/>
+              <p:nvPr/>
+            </p:nvSpPr>
+            <p:spPr>
+              <a:xfrm>
+                <a:off x="2133378" y="4724400"/>
+                <a:ext cx="457422" cy="170941"/>
+              </a:xfrm>
+              <a:prstGeom prst="rect">
+                <a:avLst/>
+              </a:prstGeom>
+              <a:solidFill>
+                <a:srgbClr val="FF0000"/>
+              </a:solidFill>
+              <a:ln>
+                <a:noFill/>
+              </a:ln>
+            </p:spPr>
+            <p:style>
+              <a:lnRef idx="2">
+                <a:schemeClr val="accent1">
+                  <a:shade val="50000"/>
+                </a:schemeClr>
+              </a:lnRef>
+              <a:fillRef idx="1">
+                <a:schemeClr val="accent1"/>
+              </a:fillRef>
+              <a:effectRef idx="0">
+                <a:schemeClr val="accent1"/>
+              </a:effectRef>
+              <a:fontRef idx="minor">
+                <a:schemeClr val="lt1"/>
+              </a:fontRef>
+            </p:style>
+            <p:txBody>
+              <a:bodyPr rtlCol="0" anchor="ctr"/>
+              <a:lstStyle/>
+              <a:p>
+                <a:pPr algn="ctr"/>
+                <a:r>
+                  <a:rPr lang="en-US" sz="1000" b="1" dirty="0"/>
+                  <a:t>E</a:t>
+                </a:r>
+              </a:p>
+            </p:txBody>
+          </p:sp>
+        </p:grpSp>
+        <p:grpSp>
+          <p:nvGrpSpPr>
+            <p:cNvPr id="13" name="Group 12">
+              <a:extLst>
+                <a:ext uri="{FF2B5EF4-FFF2-40B4-BE49-F238E27FC236}">
+                  <a16:creationId xmlns:a16="http://schemas.microsoft.com/office/drawing/2014/main" id="{1C274088-C3EF-418D-9F2F-6340C24C541D}"/>
+                </a:ext>
+              </a:extLst>
+            </p:cNvPr>
+            <p:cNvGrpSpPr/>
+            <p:nvPr/>
+          </p:nvGrpSpPr>
+          <p:grpSpPr>
+            <a:xfrm>
+              <a:off x="2952667" y="4724400"/>
+              <a:ext cx="838533" cy="533400"/>
+              <a:chOff x="2819400" y="4724400"/>
+              <a:chExt cx="838533" cy="533400"/>
+            </a:xfrm>
+          </p:grpSpPr>
+          <p:sp>
+            <p:nvSpPr>
+              <p:cNvPr id="30" name="Rectangle 29">
+                <a:extLst>
+                  <a:ext uri="{FF2B5EF4-FFF2-40B4-BE49-F238E27FC236}">
+                    <a16:creationId xmlns:a16="http://schemas.microsoft.com/office/drawing/2014/main" id="{D1F2B0D7-5C05-4FEA-88D7-750E076F2588}"/>
+                  </a:ext>
+                </a:extLst>
+              </p:cNvPr>
+              <p:cNvSpPr/>
+              <p:nvPr/>
+            </p:nvSpPr>
+            <p:spPr>
+              <a:xfrm>
+                <a:off x="3048222" y="4724400"/>
+                <a:ext cx="304800" cy="533400"/>
+              </a:xfrm>
+              <a:prstGeom prst="rect">
+                <a:avLst/>
+              </a:prstGeom>
+              <a:solidFill>
+                <a:srgbClr val="0066FF"/>
+              </a:solidFill>
+              <a:ln>
+                <a:noFill/>
+              </a:ln>
+            </p:spPr>
+            <p:style>
+              <a:lnRef idx="2">
+                <a:schemeClr val="accent1">
+                  <a:shade val="50000"/>
+                </a:schemeClr>
+              </a:lnRef>
+              <a:fillRef idx="1">
+                <a:schemeClr val="accent1"/>
+              </a:fillRef>
+              <a:effectRef idx="0">
+                <a:schemeClr val="accent1"/>
+              </a:effectRef>
+              <a:fontRef idx="minor">
+                <a:schemeClr val="lt1"/>
+              </a:fontRef>
+            </p:style>
+            <p:txBody>
+              <a:bodyPr rtlCol="0" anchor="ctr"/>
+              <a:lstStyle/>
+              <a:p>
+                <a:pPr algn="ctr"/>
+                <a:r>
+                  <a:rPr lang="en-US" sz="1000" b="1" dirty="0"/>
+                  <a:t>T</a:t>
+                </a:r>
+              </a:p>
+            </p:txBody>
+          </p:sp>
+          <p:sp>
+            <p:nvSpPr>
+              <p:cNvPr id="31" name="Rectangle 30">
+                <a:extLst>
+                  <a:ext uri="{FF2B5EF4-FFF2-40B4-BE49-F238E27FC236}">
+                    <a16:creationId xmlns:a16="http://schemas.microsoft.com/office/drawing/2014/main" id="{43306DF5-621F-4E24-B75A-4BD4A3FF9CEE}"/>
+                  </a:ext>
+                </a:extLst>
+              </p:cNvPr>
+              <p:cNvSpPr/>
+              <p:nvPr/>
+            </p:nvSpPr>
+            <p:spPr>
+              <a:xfrm>
+                <a:off x="3352911" y="4724400"/>
+                <a:ext cx="305022" cy="224816"/>
+              </a:xfrm>
+              <a:prstGeom prst="rect">
+                <a:avLst/>
+              </a:prstGeom>
+              <a:solidFill>
+                <a:srgbClr val="FF0000"/>
+              </a:solidFill>
+              <a:ln>
+                <a:noFill/>
+              </a:ln>
+            </p:spPr>
+            <p:style>
+              <a:lnRef idx="2">
+                <a:schemeClr val="accent1">
+                  <a:shade val="50000"/>
+                </a:schemeClr>
+              </a:lnRef>
+              <a:fillRef idx="1">
+                <a:schemeClr val="accent1"/>
+              </a:fillRef>
+              <a:effectRef idx="0">
+                <a:schemeClr val="accent1"/>
+              </a:effectRef>
+              <a:fontRef idx="minor">
+                <a:schemeClr val="lt1"/>
+              </a:fontRef>
+            </p:style>
+            <p:txBody>
+              <a:bodyPr rtlCol="0" anchor="ctr"/>
+              <a:lstStyle/>
+              <a:p>
+                <a:pPr algn="ctr"/>
+                <a:r>
+                  <a:rPr lang="en-US" sz="1000" b="1" dirty="0"/>
+                  <a:t>E</a:t>
+                </a:r>
+              </a:p>
+            </p:txBody>
+          </p:sp>
+          <p:sp>
+            <p:nvSpPr>
+              <p:cNvPr id="32" name="Rectangle 31">
+                <a:extLst>
+                  <a:ext uri="{FF2B5EF4-FFF2-40B4-BE49-F238E27FC236}">
+                    <a16:creationId xmlns:a16="http://schemas.microsoft.com/office/drawing/2014/main" id="{7ECAC8D1-B381-40D4-89AE-CEFE0B9A7B4A}"/>
+                  </a:ext>
+                </a:extLst>
+              </p:cNvPr>
+              <p:cNvSpPr/>
+              <p:nvPr/>
+            </p:nvSpPr>
+            <p:spPr>
+              <a:xfrm>
+                <a:off x="2819400" y="5084365"/>
+                <a:ext cx="228600" cy="170941"/>
+              </a:xfrm>
+              <a:prstGeom prst="rect">
+                <a:avLst/>
+              </a:prstGeom>
+              <a:solidFill>
+                <a:srgbClr val="FF0000"/>
+              </a:solidFill>
+              <a:ln>
+                <a:noFill/>
+              </a:ln>
+            </p:spPr>
+            <p:style>
+              <a:lnRef idx="2">
+                <a:schemeClr val="accent1">
+                  <a:shade val="50000"/>
+                </a:schemeClr>
+              </a:lnRef>
+              <a:fillRef idx="1">
+                <a:schemeClr val="accent1"/>
+              </a:fillRef>
+              <a:effectRef idx="0">
+                <a:schemeClr val="accent1"/>
+              </a:effectRef>
+              <a:fontRef idx="minor">
+                <a:schemeClr val="lt1"/>
+              </a:fontRef>
+            </p:style>
+            <p:txBody>
+              <a:bodyPr rtlCol="0" anchor="ctr"/>
+              <a:lstStyle/>
+              <a:p>
+                <a:pPr algn="ctr"/>
+                <a:r>
+                  <a:rPr lang="en-US" sz="1000" b="1" dirty="0"/>
+                  <a:t>W</a:t>
+                </a:r>
+              </a:p>
+            </p:txBody>
+          </p:sp>
+        </p:grpSp>
+        <p:grpSp>
+          <p:nvGrpSpPr>
+            <p:cNvPr id="14" name="Group 13">
+              <a:extLst>
+                <a:ext uri="{FF2B5EF4-FFF2-40B4-BE49-F238E27FC236}">
+                  <a16:creationId xmlns:a16="http://schemas.microsoft.com/office/drawing/2014/main" id="{1ACAEAC0-206B-4E55-9193-06B2008E351F}"/>
+                </a:ext>
+              </a:extLst>
+            </p:cNvPr>
+            <p:cNvGrpSpPr/>
+            <p:nvPr/>
+          </p:nvGrpSpPr>
+          <p:grpSpPr>
+            <a:xfrm>
+              <a:off x="4153067" y="4800600"/>
+              <a:ext cx="685800" cy="457200"/>
+              <a:chOff x="3962067" y="4800600"/>
+              <a:chExt cx="685800" cy="457200"/>
+            </a:xfrm>
+          </p:grpSpPr>
+          <p:sp>
+            <p:nvSpPr>
+              <p:cNvPr id="33" name="Rectangle 32">
+                <a:extLst>
+                  <a:ext uri="{FF2B5EF4-FFF2-40B4-BE49-F238E27FC236}">
+                    <a16:creationId xmlns:a16="http://schemas.microsoft.com/office/drawing/2014/main" id="{53739274-9297-4A86-B96D-5160D98B52A5}"/>
+                  </a:ext>
+                </a:extLst>
+              </p:cNvPr>
+              <p:cNvSpPr/>
+              <p:nvPr/>
+            </p:nvSpPr>
+            <p:spPr>
+              <a:xfrm>
+                <a:off x="4190889" y="4949216"/>
+                <a:ext cx="456978" cy="308584"/>
+              </a:xfrm>
+              <a:prstGeom prst="rect">
+                <a:avLst/>
+              </a:prstGeom>
+              <a:solidFill>
+                <a:srgbClr val="0066FF"/>
+              </a:solidFill>
+              <a:ln>
+                <a:noFill/>
+              </a:ln>
+            </p:spPr>
+            <p:style>
+              <a:lnRef idx="2">
+                <a:schemeClr val="accent1">
+                  <a:shade val="50000"/>
+                </a:schemeClr>
+              </a:lnRef>
+              <a:fillRef idx="1">
+                <a:schemeClr val="accent1"/>
+              </a:fillRef>
+              <a:effectRef idx="0">
+                <a:schemeClr val="accent1"/>
+              </a:effectRef>
+              <a:fontRef idx="minor">
+                <a:schemeClr val="lt1"/>
+              </a:fontRef>
+            </p:style>
+            <p:txBody>
+              <a:bodyPr rtlCol="0" anchor="ctr"/>
+              <a:lstStyle/>
+              <a:p>
+                <a:pPr algn="ctr"/>
+                <a:r>
+                  <a:rPr lang="en-US" sz="1000" b="1" dirty="0"/>
+                  <a:t>T</a:t>
+                </a:r>
+              </a:p>
+            </p:txBody>
+          </p:sp>
+          <p:sp>
+            <p:nvSpPr>
+              <p:cNvPr id="34" name="Rectangle 33">
+                <a:extLst>
+                  <a:ext uri="{FF2B5EF4-FFF2-40B4-BE49-F238E27FC236}">
+                    <a16:creationId xmlns:a16="http://schemas.microsoft.com/office/drawing/2014/main" id="{F1F2EA8A-6D20-4BE5-B485-1878742A64D4}"/>
+                  </a:ext>
+                </a:extLst>
+              </p:cNvPr>
+              <p:cNvSpPr/>
+              <p:nvPr/>
+            </p:nvSpPr>
+            <p:spPr>
+              <a:xfrm>
+                <a:off x="4290366" y="4800600"/>
+                <a:ext cx="281634" cy="148616"/>
+              </a:xfrm>
+              <a:prstGeom prst="rect">
+                <a:avLst/>
+              </a:prstGeom>
+              <a:solidFill>
+                <a:srgbClr val="FF0000"/>
+              </a:solidFill>
+              <a:ln>
+                <a:noFill/>
+              </a:ln>
+            </p:spPr>
+            <p:style>
+              <a:lnRef idx="2">
+                <a:schemeClr val="accent1">
+                  <a:shade val="50000"/>
+                </a:schemeClr>
+              </a:lnRef>
+              <a:fillRef idx="1">
+                <a:schemeClr val="accent1"/>
+              </a:fillRef>
+              <a:effectRef idx="0">
+                <a:schemeClr val="accent1"/>
+              </a:effectRef>
+              <a:fontRef idx="minor">
+                <a:schemeClr val="lt1"/>
+              </a:fontRef>
+            </p:style>
+            <p:txBody>
+              <a:bodyPr rtlCol="0" anchor="ctr"/>
+              <a:lstStyle/>
+              <a:p>
+                <a:pPr algn="ctr"/>
+                <a:r>
+                  <a:rPr lang="en-US" sz="1000" b="1" dirty="0"/>
+                  <a:t>N</a:t>
+                </a:r>
+              </a:p>
+            </p:txBody>
+          </p:sp>
+          <p:sp>
+            <p:nvSpPr>
+              <p:cNvPr id="35" name="Rectangle 34">
+                <a:extLst>
+                  <a:ext uri="{FF2B5EF4-FFF2-40B4-BE49-F238E27FC236}">
+                    <a16:creationId xmlns:a16="http://schemas.microsoft.com/office/drawing/2014/main" id="{E0CA41BB-E141-436F-B16B-C0BDB384ED0E}"/>
+                  </a:ext>
+                </a:extLst>
+              </p:cNvPr>
+              <p:cNvSpPr/>
+              <p:nvPr/>
+            </p:nvSpPr>
+            <p:spPr>
+              <a:xfrm>
+                <a:off x="3962067" y="5084365"/>
+                <a:ext cx="228600" cy="170941"/>
+              </a:xfrm>
+              <a:prstGeom prst="rect">
+                <a:avLst/>
+              </a:prstGeom>
+              <a:solidFill>
+                <a:srgbClr val="FF0000"/>
+              </a:solidFill>
+              <a:ln>
+                <a:noFill/>
+              </a:ln>
+            </p:spPr>
+            <p:style>
+              <a:lnRef idx="2">
+                <a:schemeClr val="accent1">
+                  <a:shade val="50000"/>
+                </a:schemeClr>
+              </a:lnRef>
+              <a:fillRef idx="1">
+                <a:schemeClr val="accent1"/>
+              </a:fillRef>
+              <a:effectRef idx="0">
+                <a:schemeClr val="accent1"/>
+              </a:effectRef>
+              <a:fontRef idx="minor">
+                <a:schemeClr val="lt1"/>
+              </a:fontRef>
+            </p:style>
+            <p:txBody>
+              <a:bodyPr rtlCol="0" anchor="ctr"/>
+              <a:lstStyle/>
+              <a:p>
+                <a:pPr algn="ctr"/>
+                <a:r>
+                  <a:rPr lang="en-US" sz="1000" b="1" dirty="0"/>
+                  <a:t>W</a:t>
+                </a:r>
+              </a:p>
+            </p:txBody>
+          </p:sp>
+        </p:grpSp>
+        <p:grpSp>
+          <p:nvGrpSpPr>
+            <p:cNvPr id="69" name="Group 68">
+              <a:extLst>
+                <a:ext uri="{FF2B5EF4-FFF2-40B4-BE49-F238E27FC236}">
+                  <a16:creationId xmlns:a16="http://schemas.microsoft.com/office/drawing/2014/main" id="{B6D19139-649E-4467-A3B7-C33FE0CFCA01}"/>
+                </a:ext>
+              </a:extLst>
+            </p:cNvPr>
+            <p:cNvGrpSpPr/>
+            <p:nvPr/>
+          </p:nvGrpSpPr>
+          <p:grpSpPr>
+            <a:xfrm>
+              <a:off x="5200734" y="4731774"/>
+              <a:ext cx="762000" cy="529810"/>
+              <a:chOff x="5200734" y="4731774"/>
+              <a:chExt cx="762000" cy="529810"/>
+            </a:xfrm>
+          </p:grpSpPr>
+          <p:sp>
+            <p:nvSpPr>
+              <p:cNvPr id="37" name="Rectangle 36">
+                <a:extLst>
+                  <a:ext uri="{FF2B5EF4-FFF2-40B4-BE49-F238E27FC236}">
+                    <a16:creationId xmlns:a16="http://schemas.microsoft.com/office/drawing/2014/main" id="{02DB8E13-7A0A-46AC-ACE2-FFF221A5622F}"/>
+                  </a:ext>
+                </a:extLst>
+              </p:cNvPr>
+              <p:cNvSpPr/>
+              <p:nvPr/>
+            </p:nvSpPr>
+            <p:spPr>
+              <a:xfrm>
+                <a:off x="5200734" y="4953000"/>
+                <a:ext cx="762000" cy="308584"/>
+              </a:xfrm>
+              <a:prstGeom prst="rect">
+                <a:avLst/>
+              </a:prstGeom>
+              <a:solidFill>
+                <a:srgbClr val="0066FF"/>
+              </a:solidFill>
+              <a:ln>
+                <a:noFill/>
+              </a:ln>
+            </p:spPr>
+            <p:style>
+              <a:lnRef idx="2">
+                <a:schemeClr val="accent1">
+                  <a:shade val="50000"/>
+                </a:schemeClr>
+              </a:lnRef>
+              <a:fillRef idx="1">
+                <a:schemeClr val="accent1"/>
+              </a:fillRef>
+              <a:effectRef idx="0">
+                <a:schemeClr val="accent1"/>
+              </a:effectRef>
+              <a:fontRef idx="minor">
+                <a:schemeClr val="lt1"/>
+              </a:fontRef>
+            </p:style>
+            <p:txBody>
+              <a:bodyPr rtlCol="0" anchor="ctr"/>
+              <a:lstStyle/>
+              <a:p>
+                <a:pPr algn="ctr"/>
+                <a:r>
+                  <a:rPr lang="en-US" sz="1000" b="1" dirty="0"/>
+                  <a:t>T</a:t>
+                </a:r>
+              </a:p>
+            </p:txBody>
+          </p:sp>
+          <p:sp>
+            <p:nvSpPr>
+              <p:cNvPr id="38" name="Rectangle 37">
+                <a:extLst>
+                  <a:ext uri="{FF2B5EF4-FFF2-40B4-BE49-F238E27FC236}">
+                    <a16:creationId xmlns:a16="http://schemas.microsoft.com/office/drawing/2014/main" id="{C54259D6-B621-4F33-ACC8-23CC72B93DCB}"/>
+                  </a:ext>
+                </a:extLst>
+              </p:cNvPr>
+              <p:cNvSpPr/>
+              <p:nvPr/>
+            </p:nvSpPr>
+            <p:spPr>
+              <a:xfrm>
+                <a:off x="5352912" y="4731774"/>
+                <a:ext cx="152622" cy="224816"/>
+              </a:xfrm>
+              <a:prstGeom prst="rect">
+                <a:avLst/>
+              </a:prstGeom>
+              <a:solidFill>
+                <a:srgbClr val="FF0000"/>
+              </a:solidFill>
+              <a:ln>
+                <a:noFill/>
+              </a:ln>
+            </p:spPr>
+            <p:style>
+              <a:lnRef idx="2">
+                <a:schemeClr val="accent1">
+                  <a:shade val="50000"/>
+                </a:schemeClr>
+              </a:lnRef>
+              <a:fillRef idx="1">
+                <a:schemeClr val="accent1"/>
+              </a:fillRef>
+              <a:effectRef idx="0">
+                <a:schemeClr val="accent1"/>
+              </a:effectRef>
+              <a:fontRef idx="minor">
+                <a:schemeClr val="lt1"/>
+              </a:fontRef>
+            </p:style>
+            <p:txBody>
+              <a:bodyPr rtlCol="0" anchor="t"/>
+              <a:lstStyle/>
+              <a:p>
+                <a:pPr algn="ctr"/>
+                <a:r>
+                  <a:rPr lang="en-US" sz="1000" b="1" dirty="0"/>
+                  <a:t>N</a:t>
+                </a:r>
+              </a:p>
+            </p:txBody>
+          </p:sp>
+          <p:sp>
+            <p:nvSpPr>
+              <p:cNvPr id="39" name="Rectangle 38">
+                <a:extLst>
+                  <a:ext uri="{FF2B5EF4-FFF2-40B4-BE49-F238E27FC236}">
+                    <a16:creationId xmlns:a16="http://schemas.microsoft.com/office/drawing/2014/main" id="{841B68C4-1C59-48A0-B1F1-F75B94100BA0}"/>
+                  </a:ext>
+                </a:extLst>
+              </p:cNvPr>
+              <p:cNvSpPr/>
+              <p:nvPr/>
+            </p:nvSpPr>
+            <p:spPr>
+              <a:xfrm>
+                <a:off x="5505534" y="4807974"/>
+                <a:ext cx="380778" cy="148616"/>
+              </a:xfrm>
+              <a:prstGeom prst="rect">
+                <a:avLst/>
+              </a:prstGeom>
+              <a:solidFill>
+                <a:srgbClr val="FF0000"/>
+              </a:solidFill>
+              <a:ln>
+                <a:noFill/>
+              </a:ln>
+            </p:spPr>
+            <p:style>
+              <a:lnRef idx="2">
+                <a:schemeClr val="accent1">
+                  <a:shade val="50000"/>
+                </a:schemeClr>
+              </a:lnRef>
+              <a:fillRef idx="1">
+                <a:schemeClr val="accent1"/>
+              </a:fillRef>
+              <a:effectRef idx="0">
+                <a:schemeClr val="accent1"/>
+              </a:effectRef>
+              <a:fontRef idx="minor">
+                <a:schemeClr val="lt1"/>
+              </a:fontRef>
+            </p:style>
+            <p:txBody>
+              <a:bodyPr rtlCol="0" anchor="ctr"/>
+              <a:lstStyle/>
+              <a:p>
+                <a:pPr algn="ctr"/>
+                <a:r>
+                  <a:rPr lang="en-US" sz="1000" b="1" dirty="0"/>
+                  <a:t>N</a:t>
+                </a:r>
+              </a:p>
+            </p:txBody>
+          </p:sp>
+        </p:grpSp>
+        <p:grpSp>
+          <p:nvGrpSpPr>
+            <p:cNvPr id="19" name="Group 18">
+              <a:extLst>
+                <a:ext uri="{FF2B5EF4-FFF2-40B4-BE49-F238E27FC236}">
+                  <a16:creationId xmlns:a16="http://schemas.microsoft.com/office/drawing/2014/main" id="{B0F4BBFC-D05A-4E00-BF72-9824132DEA87}"/>
+                </a:ext>
+              </a:extLst>
+            </p:cNvPr>
+            <p:cNvGrpSpPr/>
+            <p:nvPr/>
+          </p:nvGrpSpPr>
+          <p:grpSpPr>
+            <a:xfrm>
+              <a:off x="6324600" y="4730416"/>
+              <a:ext cx="762000" cy="518874"/>
+              <a:chOff x="6019800" y="4730416"/>
+              <a:chExt cx="762000" cy="518874"/>
+            </a:xfrm>
+          </p:grpSpPr>
+          <p:sp>
+            <p:nvSpPr>
+              <p:cNvPr id="41" name="Rectangle 40">
+                <a:extLst>
+                  <a:ext uri="{FF2B5EF4-FFF2-40B4-BE49-F238E27FC236}">
+                    <a16:creationId xmlns:a16="http://schemas.microsoft.com/office/drawing/2014/main" id="{830AE4C8-394D-4229-A017-73C315F7B618}"/>
+                  </a:ext>
+                </a:extLst>
+              </p:cNvPr>
+              <p:cNvSpPr/>
+              <p:nvPr/>
+            </p:nvSpPr>
+            <p:spPr>
+              <a:xfrm>
+                <a:off x="6096000" y="4730416"/>
+                <a:ext cx="380778" cy="148616"/>
+              </a:xfrm>
+              <a:prstGeom prst="rect">
+                <a:avLst/>
+              </a:prstGeom>
+              <a:solidFill>
+                <a:srgbClr val="FF0000"/>
+              </a:solidFill>
+              <a:ln>
+                <a:noFill/>
+              </a:ln>
+            </p:spPr>
+            <p:style>
+              <a:lnRef idx="2">
+                <a:schemeClr val="accent1">
+                  <a:shade val="50000"/>
+                </a:schemeClr>
+              </a:lnRef>
+              <a:fillRef idx="1">
+                <a:schemeClr val="accent1"/>
+              </a:fillRef>
+              <a:effectRef idx="0">
+                <a:schemeClr val="accent1"/>
+              </a:effectRef>
+              <a:fontRef idx="minor">
+                <a:schemeClr val="lt1"/>
+              </a:fontRef>
+            </p:style>
+            <p:txBody>
+              <a:bodyPr rtlCol="0" anchor="ctr"/>
+              <a:lstStyle/>
+              <a:p>
+                <a:pPr algn="ctr"/>
+                <a:r>
+                  <a:rPr lang="en-US" sz="1000" b="1" dirty="0"/>
+                  <a:t>N</a:t>
+                </a:r>
+              </a:p>
+            </p:txBody>
+          </p:sp>
+          <p:sp>
+            <p:nvSpPr>
+              <p:cNvPr id="42" name="Rectangle 41">
+                <a:extLst>
+                  <a:ext uri="{FF2B5EF4-FFF2-40B4-BE49-F238E27FC236}">
+                    <a16:creationId xmlns:a16="http://schemas.microsoft.com/office/drawing/2014/main" id="{B2E5D9B7-BA75-475F-BE21-84F2C5AA0D59}"/>
+                  </a:ext>
+                </a:extLst>
+              </p:cNvPr>
+              <p:cNvSpPr/>
+              <p:nvPr/>
+            </p:nvSpPr>
+            <p:spPr>
+              <a:xfrm>
+                <a:off x="6324600" y="5093104"/>
+                <a:ext cx="380778" cy="156186"/>
+              </a:xfrm>
+              <a:prstGeom prst="rect">
+                <a:avLst/>
+              </a:prstGeom>
+              <a:solidFill>
+                <a:srgbClr val="FF0000"/>
+              </a:solidFill>
+              <a:ln>
+                <a:noFill/>
+              </a:ln>
+            </p:spPr>
+            <p:style>
+              <a:lnRef idx="2">
+                <a:schemeClr val="accent1">
+                  <a:shade val="50000"/>
+                </a:schemeClr>
+              </a:lnRef>
+              <a:fillRef idx="1">
+                <a:schemeClr val="accent1"/>
+              </a:fillRef>
+              <a:effectRef idx="0">
+                <a:schemeClr val="accent1"/>
+              </a:effectRef>
+              <a:fontRef idx="minor">
+                <a:schemeClr val="lt1"/>
+              </a:fontRef>
+            </p:style>
+            <p:txBody>
+              <a:bodyPr rtlCol="0" anchor="ctr"/>
+              <a:lstStyle/>
+              <a:p>
+                <a:pPr algn="ctr"/>
+                <a:r>
+                  <a:rPr lang="en-US" sz="1000" b="1" dirty="0"/>
+                  <a:t>S</a:t>
+                </a:r>
+              </a:p>
+            </p:txBody>
+          </p:sp>
+          <p:sp>
+            <p:nvSpPr>
+              <p:cNvPr id="40" name="Rectangle 39">
+                <a:extLst>
+                  <a:ext uri="{FF2B5EF4-FFF2-40B4-BE49-F238E27FC236}">
+                    <a16:creationId xmlns:a16="http://schemas.microsoft.com/office/drawing/2014/main" id="{6BA9CDC8-50FA-4ED3-9945-45290008CCE9}"/>
+                  </a:ext>
+                </a:extLst>
+              </p:cNvPr>
+              <p:cNvSpPr/>
+              <p:nvPr/>
+            </p:nvSpPr>
+            <p:spPr>
+              <a:xfrm>
+                <a:off x="6019800" y="4876799"/>
+                <a:ext cx="762000" cy="222321"/>
+              </a:xfrm>
+              <a:prstGeom prst="rect">
+                <a:avLst/>
+              </a:prstGeom>
+              <a:solidFill>
+                <a:srgbClr val="0066FF"/>
+              </a:solidFill>
+              <a:ln>
+                <a:noFill/>
+              </a:ln>
+            </p:spPr>
+            <p:style>
+              <a:lnRef idx="2">
+                <a:schemeClr val="accent1">
+                  <a:shade val="50000"/>
+                </a:schemeClr>
+              </a:lnRef>
+              <a:fillRef idx="1">
+                <a:schemeClr val="accent1"/>
+              </a:fillRef>
+              <a:effectRef idx="0">
+                <a:schemeClr val="accent1"/>
+              </a:effectRef>
+              <a:fontRef idx="minor">
+                <a:schemeClr val="lt1"/>
+              </a:fontRef>
+            </p:style>
+            <p:txBody>
+              <a:bodyPr rtlCol="0" anchor="ctr"/>
+              <a:lstStyle/>
+              <a:p>
+                <a:pPr algn="ctr"/>
+                <a:r>
+                  <a:rPr lang="en-US" sz="1000" b="1" dirty="0"/>
+                  <a:t>T</a:t>
+                </a:r>
+              </a:p>
+            </p:txBody>
+          </p:sp>
+        </p:grpSp>
+      </p:grpSp>
+      <p:grpSp>
+        <p:nvGrpSpPr>
+          <p:cNvPr id="62" name="Group 61">
+            <a:extLst>
+              <a:ext uri="{FF2B5EF4-FFF2-40B4-BE49-F238E27FC236}">
+                <a16:creationId xmlns:a16="http://schemas.microsoft.com/office/drawing/2014/main" id="{85A6061C-C142-4BAD-8248-D56C0281CAC5}"/>
+              </a:ext>
+            </a:extLst>
+          </p:cNvPr>
+          <p:cNvGrpSpPr/>
+          <p:nvPr/>
+        </p:nvGrpSpPr>
+        <p:grpSpPr>
+          <a:xfrm>
+            <a:off x="1828800" y="5486400"/>
+            <a:ext cx="5257800" cy="535564"/>
+            <a:chOff x="1828800" y="5486400"/>
+            <a:chExt cx="5257800" cy="535564"/>
+          </a:xfrm>
+        </p:grpSpPr>
+        <p:grpSp>
+          <p:nvGrpSpPr>
+            <p:cNvPr id="61" name="Group 60">
+              <a:extLst>
+                <a:ext uri="{FF2B5EF4-FFF2-40B4-BE49-F238E27FC236}">
+                  <a16:creationId xmlns:a16="http://schemas.microsoft.com/office/drawing/2014/main" id="{82902083-F792-4568-A227-8C3C1D3B90BF}"/>
+                </a:ext>
+              </a:extLst>
+            </p:cNvPr>
+            <p:cNvGrpSpPr/>
+            <p:nvPr/>
+          </p:nvGrpSpPr>
+          <p:grpSpPr>
+            <a:xfrm>
+              <a:off x="1828800" y="5486400"/>
+              <a:ext cx="762000" cy="533400"/>
+              <a:chOff x="1828800" y="5486400"/>
+              <a:chExt cx="762000" cy="533400"/>
+            </a:xfrm>
+          </p:grpSpPr>
+          <p:sp>
+            <p:nvSpPr>
+              <p:cNvPr id="46" name="Rectangle 45">
+                <a:extLst>
+                  <a:ext uri="{FF2B5EF4-FFF2-40B4-BE49-F238E27FC236}">
+                    <a16:creationId xmlns:a16="http://schemas.microsoft.com/office/drawing/2014/main" id="{75BBA248-1977-432F-A01A-725EA75188E5}"/>
+                  </a:ext>
+                </a:extLst>
+              </p:cNvPr>
+              <p:cNvSpPr/>
+              <p:nvPr/>
+            </p:nvSpPr>
+            <p:spPr>
+              <a:xfrm>
+                <a:off x="1828800" y="5486400"/>
+                <a:ext cx="304800" cy="533400"/>
+              </a:xfrm>
+              <a:prstGeom prst="rect">
+                <a:avLst/>
+              </a:prstGeom>
+              <a:solidFill>
+                <a:srgbClr val="0066FF"/>
+              </a:solidFill>
+              <a:ln>
+                <a:noFill/>
+              </a:ln>
+            </p:spPr>
+            <p:style>
+              <a:lnRef idx="2">
+                <a:schemeClr val="accent1">
+                  <a:shade val="50000"/>
+                </a:schemeClr>
+              </a:lnRef>
+              <a:fillRef idx="1">
+                <a:schemeClr val="accent1"/>
+              </a:fillRef>
+              <a:effectRef idx="0">
+                <a:schemeClr val="accent1"/>
+              </a:effectRef>
+              <a:fontRef idx="minor">
+                <a:schemeClr val="lt1"/>
+              </a:fontRef>
+            </p:style>
+            <p:txBody>
+              <a:bodyPr rtlCol="0" anchor="ctr"/>
+              <a:lstStyle/>
+              <a:p>
+                <a:pPr algn="ctr"/>
+                <a:endParaRPr lang="en-US" sz="1000" b="1" dirty="0"/>
+              </a:p>
+            </p:txBody>
+          </p:sp>
+          <p:sp>
+            <p:nvSpPr>
+              <p:cNvPr id="47" name="Rectangle 46">
+                <a:extLst>
+                  <a:ext uri="{FF2B5EF4-FFF2-40B4-BE49-F238E27FC236}">
+                    <a16:creationId xmlns:a16="http://schemas.microsoft.com/office/drawing/2014/main" id="{507D2080-CC2D-4923-AE04-2C8E85E8060D}"/>
+                  </a:ext>
+                </a:extLst>
+              </p:cNvPr>
+              <p:cNvSpPr/>
+              <p:nvPr/>
+            </p:nvSpPr>
+            <p:spPr>
+              <a:xfrm>
+                <a:off x="2133378" y="5794984"/>
+                <a:ext cx="305022" cy="224816"/>
+              </a:xfrm>
+              <a:prstGeom prst="rect">
+                <a:avLst/>
+              </a:prstGeom>
+              <a:solidFill>
+                <a:srgbClr val="0066FF"/>
+              </a:solidFill>
+              <a:ln>
+                <a:noFill/>
+              </a:ln>
+            </p:spPr>
+            <p:style>
+              <a:lnRef idx="2">
+                <a:schemeClr val="accent1">
+                  <a:shade val="50000"/>
+                </a:schemeClr>
+              </a:lnRef>
+              <a:fillRef idx="1">
+                <a:schemeClr val="accent1"/>
+              </a:fillRef>
+              <a:effectRef idx="0">
+                <a:schemeClr val="accent1"/>
+              </a:effectRef>
+              <a:fontRef idx="minor">
+                <a:schemeClr val="lt1"/>
+              </a:fontRef>
+            </p:style>
+            <p:txBody>
+              <a:bodyPr rtlCol="0" anchor="ctr"/>
+              <a:lstStyle/>
+              <a:p>
+                <a:pPr algn="ctr"/>
+                <a:endParaRPr lang="en-US" sz="1000" b="1" dirty="0"/>
+              </a:p>
+            </p:txBody>
+          </p:sp>
+          <p:sp>
+            <p:nvSpPr>
+              <p:cNvPr id="48" name="Rectangle 47">
+                <a:extLst>
+                  <a:ext uri="{FF2B5EF4-FFF2-40B4-BE49-F238E27FC236}">
+                    <a16:creationId xmlns:a16="http://schemas.microsoft.com/office/drawing/2014/main" id="{7EDCD2C1-9D68-433A-BAF5-9B58DBB6605A}"/>
+                  </a:ext>
+                </a:extLst>
+              </p:cNvPr>
+              <p:cNvSpPr/>
+              <p:nvPr/>
+            </p:nvSpPr>
+            <p:spPr>
+              <a:xfrm>
+                <a:off x="2133378" y="5486400"/>
+                <a:ext cx="457422" cy="170941"/>
+              </a:xfrm>
+              <a:prstGeom prst="rect">
+                <a:avLst/>
+              </a:prstGeom>
+              <a:solidFill>
+                <a:srgbClr val="0066FF"/>
+              </a:solidFill>
+              <a:ln>
+                <a:noFill/>
+              </a:ln>
+            </p:spPr>
+            <p:style>
+              <a:lnRef idx="2">
+                <a:schemeClr val="accent1">
+                  <a:shade val="50000"/>
+                </a:schemeClr>
+              </a:lnRef>
+              <a:fillRef idx="1">
+                <a:schemeClr val="accent1"/>
+              </a:fillRef>
+              <a:effectRef idx="0">
+                <a:schemeClr val="accent1"/>
+              </a:effectRef>
+              <a:fontRef idx="minor">
+                <a:schemeClr val="lt1"/>
+              </a:fontRef>
+            </p:style>
+            <p:txBody>
+              <a:bodyPr rtlCol="0" anchor="ctr"/>
+              <a:lstStyle/>
+              <a:p>
+                <a:pPr algn="ctr"/>
+                <a:endParaRPr lang="en-US" sz="1000" b="1" dirty="0"/>
+              </a:p>
+            </p:txBody>
+          </p:sp>
+        </p:grpSp>
+        <p:grpSp>
+          <p:nvGrpSpPr>
+            <p:cNvPr id="18" name="Group 17">
+              <a:extLst>
+                <a:ext uri="{FF2B5EF4-FFF2-40B4-BE49-F238E27FC236}">
+                  <a16:creationId xmlns:a16="http://schemas.microsoft.com/office/drawing/2014/main" id="{E962D273-86E3-4132-BF57-B1CAAF68AA58}"/>
+                </a:ext>
+              </a:extLst>
+            </p:cNvPr>
+            <p:cNvGrpSpPr/>
+            <p:nvPr/>
+          </p:nvGrpSpPr>
+          <p:grpSpPr>
+            <a:xfrm>
+              <a:off x="2952667" y="5486400"/>
+              <a:ext cx="838533" cy="535564"/>
+              <a:chOff x="2952667" y="5486400"/>
+              <a:chExt cx="838533" cy="535564"/>
+            </a:xfrm>
+          </p:grpSpPr>
+          <p:sp>
+            <p:nvSpPr>
+              <p:cNvPr id="49" name="Rectangle 48">
+                <a:extLst>
+                  <a:ext uri="{FF2B5EF4-FFF2-40B4-BE49-F238E27FC236}">
+                    <a16:creationId xmlns:a16="http://schemas.microsoft.com/office/drawing/2014/main" id="{DCE0FA56-4071-457A-8ED2-C83F9A0E2093}"/>
+                  </a:ext>
+                </a:extLst>
+              </p:cNvPr>
+              <p:cNvSpPr/>
+              <p:nvPr/>
+            </p:nvSpPr>
+            <p:spPr>
+              <a:xfrm>
+                <a:off x="3181489" y="5486400"/>
+                <a:ext cx="304800" cy="533400"/>
+              </a:xfrm>
+              <a:prstGeom prst="rect">
+                <a:avLst/>
+              </a:prstGeom>
+              <a:solidFill>
+                <a:srgbClr val="0066FF"/>
+              </a:solidFill>
+              <a:ln>
+                <a:noFill/>
+              </a:ln>
+            </p:spPr>
+            <p:style>
+              <a:lnRef idx="2">
+                <a:schemeClr val="accent1">
+                  <a:shade val="50000"/>
+                </a:schemeClr>
+              </a:lnRef>
+              <a:fillRef idx="1">
+                <a:schemeClr val="accent1"/>
+              </a:fillRef>
+              <a:effectRef idx="0">
+                <a:schemeClr val="accent1"/>
+              </a:effectRef>
+              <a:fontRef idx="minor">
+                <a:schemeClr val="lt1"/>
+              </a:fontRef>
+            </p:style>
+            <p:txBody>
+              <a:bodyPr rtlCol="0" anchor="ctr"/>
+              <a:lstStyle/>
+              <a:p>
+                <a:pPr algn="ctr"/>
+                <a:endParaRPr lang="en-US" sz="1000" b="1" dirty="0"/>
+              </a:p>
+            </p:txBody>
+          </p:sp>
+          <p:sp>
+            <p:nvSpPr>
+              <p:cNvPr id="50" name="Rectangle 49">
+                <a:extLst>
+                  <a:ext uri="{FF2B5EF4-FFF2-40B4-BE49-F238E27FC236}">
+                    <a16:creationId xmlns:a16="http://schemas.microsoft.com/office/drawing/2014/main" id="{8519ED68-E8AB-474F-9DF4-D12F74627582}"/>
+                  </a:ext>
+                </a:extLst>
+              </p:cNvPr>
+              <p:cNvSpPr/>
+              <p:nvPr/>
+            </p:nvSpPr>
+            <p:spPr>
+              <a:xfrm>
+                <a:off x="3486178" y="5486400"/>
+                <a:ext cx="305022" cy="224816"/>
+              </a:xfrm>
+              <a:prstGeom prst="rect">
+                <a:avLst/>
+              </a:prstGeom>
+              <a:solidFill>
+                <a:srgbClr val="0066FF"/>
+              </a:solidFill>
+              <a:ln>
+                <a:noFill/>
+              </a:ln>
+            </p:spPr>
+            <p:style>
+              <a:lnRef idx="2">
+                <a:schemeClr val="accent1">
+                  <a:shade val="50000"/>
+                </a:schemeClr>
+              </a:lnRef>
+              <a:fillRef idx="1">
+                <a:schemeClr val="accent1"/>
+              </a:fillRef>
+              <a:effectRef idx="0">
+                <a:schemeClr val="accent1"/>
+              </a:effectRef>
+              <a:fontRef idx="minor">
+                <a:schemeClr val="lt1"/>
+              </a:fontRef>
+            </p:style>
+            <p:txBody>
+              <a:bodyPr rtlCol="0" anchor="ctr"/>
+              <a:lstStyle/>
+              <a:p>
+                <a:pPr algn="ctr"/>
+                <a:endParaRPr lang="en-US" sz="1000" b="1" dirty="0"/>
+              </a:p>
+            </p:txBody>
+          </p:sp>
+          <p:sp>
+            <p:nvSpPr>
+              <p:cNvPr id="51" name="Rectangle 50">
+                <a:extLst>
+                  <a:ext uri="{FF2B5EF4-FFF2-40B4-BE49-F238E27FC236}">
+                    <a16:creationId xmlns:a16="http://schemas.microsoft.com/office/drawing/2014/main" id="{9A6EF44D-2F8B-4B14-823F-93CDB4B294B8}"/>
+                  </a:ext>
+                </a:extLst>
+              </p:cNvPr>
+              <p:cNvSpPr/>
+              <p:nvPr/>
+            </p:nvSpPr>
+            <p:spPr>
+              <a:xfrm>
+                <a:off x="2952667" y="5851023"/>
+                <a:ext cx="228600" cy="170941"/>
+              </a:xfrm>
+              <a:prstGeom prst="rect">
+                <a:avLst/>
+              </a:prstGeom>
+              <a:solidFill>
+                <a:srgbClr val="0066FF"/>
+              </a:solidFill>
+              <a:ln>
+                <a:noFill/>
+              </a:ln>
+            </p:spPr>
+            <p:style>
+              <a:lnRef idx="2">
+                <a:schemeClr val="accent1">
+                  <a:shade val="50000"/>
+                </a:schemeClr>
+              </a:lnRef>
+              <a:fillRef idx="1">
+                <a:schemeClr val="accent1"/>
+              </a:fillRef>
+              <a:effectRef idx="0">
+                <a:schemeClr val="accent1"/>
+              </a:effectRef>
+              <a:fontRef idx="minor">
+                <a:schemeClr val="lt1"/>
+              </a:fontRef>
+            </p:style>
+            <p:txBody>
+              <a:bodyPr rtlCol="0" anchor="ctr"/>
+              <a:lstStyle/>
+              <a:p>
+                <a:pPr algn="ctr"/>
+                <a:endParaRPr lang="en-US" sz="1000" b="1" dirty="0"/>
+              </a:p>
+            </p:txBody>
+          </p:sp>
+        </p:grpSp>
+        <p:grpSp>
+          <p:nvGrpSpPr>
+            <p:cNvPr id="20" name="Group 19">
+              <a:extLst>
+                <a:ext uri="{FF2B5EF4-FFF2-40B4-BE49-F238E27FC236}">
+                  <a16:creationId xmlns:a16="http://schemas.microsoft.com/office/drawing/2014/main" id="{B941ED70-F722-40CB-99A2-8E66E5EC6088}"/>
+                </a:ext>
+              </a:extLst>
+            </p:cNvPr>
+            <p:cNvGrpSpPr/>
+            <p:nvPr/>
+          </p:nvGrpSpPr>
+          <p:grpSpPr>
+            <a:xfrm>
+              <a:off x="4153067" y="5562600"/>
+              <a:ext cx="685800" cy="459364"/>
+              <a:chOff x="4153067" y="5562600"/>
+              <a:chExt cx="685800" cy="459364"/>
+            </a:xfrm>
+          </p:grpSpPr>
+          <p:sp>
+            <p:nvSpPr>
+              <p:cNvPr id="52" name="Rectangle 51">
+                <a:extLst>
+                  <a:ext uri="{FF2B5EF4-FFF2-40B4-BE49-F238E27FC236}">
+                    <a16:creationId xmlns:a16="http://schemas.microsoft.com/office/drawing/2014/main" id="{18095660-B184-46CE-A5C6-784E1F596A25}"/>
+                  </a:ext>
+                </a:extLst>
+              </p:cNvPr>
+              <p:cNvSpPr/>
+              <p:nvPr/>
+            </p:nvSpPr>
+            <p:spPr>
+              <a:xfrm>
+                <a:off x="4381889" y="5711216"/>
+                <a:ext cx="456978" cy="308584"/>
+              </a:xfrm>
+              <a:prstGeom prst="rect">
+                <a:avLst/>
+              </a:prstGeom>
+              <a:solidFill>
+                <a:srgbClr val="0066FF"/>
+              </a:solidFill>
+              <a:ln>
+                <a:noFill/>
+              </a:ln>
+            </p:spPr>
+            <p:style>
+              <a:lnRef idx="2">
+                <a:schemeClr val="accent1">
+                  <a:shade val="50000"/>
+                </a:schemeClr>
+              </a:lnRef>
+              <a:fillRef idx="1">
+                <a:schemeClr val="accent1"/>
+              </a:fillRef>
+              <a:effectRef idx="0">
+                <a:schemeClr val="accent1"/>
+              </a:effectRef>
+              <a:fontRef idx="minor">
+                <a:schemeClr val="lt1"/>
+              </a:fontRef>
+            </p:style>
+            <p:txBody>
+              <a:bodyPr rtlCol="0" anchor="ctr"/>
+              <a:lstStyle/>
+              <a:p>
+                <a:pPr algn="ctr"/>
+                <a:endParaRPr lang="en-US" sz="1000" b="1" dirty="0"/>
+              </a:p>
+            </p:txBody>
+          </p:sp>
+          <p:sp>
+            <p:nvSpPr>
+              <p:cNvPr id="53" name="Rectangle 52">
+                <a:extLst>
+                  <a:ext uri="{FF2B5EF4-FFF2-40B4-BE49-F238E27FC236}">
+                    <a16:creationId xmlns:a16="http://schemas.microsoft.com/office/drawing/2014/main" id="{7A46CFEE-0031-4772-94B3-428C8C122AE8}"/>
+                  </a:ext>
+                </a:extLst>
+              </p:cNvPr>
+              <p:cNvSpPr/>
+              <p:nvPr/>
+            </p:nvSpPr>
+            <p:spPr>
+              <a:xfrm>
+                <a:off x="4481366" y="5562600"/>
+                <a:ext cx="281634" cy="148616"/>
+              </a:xfrm>
+              <a:prstGeom prst="rect">
+                <a:avLst/>
+              </a:prstGeom>
+              <a:solidFill>
+                <a:srgbClr val="0066FF"/>
+              </a:solidFill>
+              <a:ln>
+                <a:noFill/>
+              </a:ln>
+            </p:spPr>
+            <p:style>
+              <a:lnRef idx="2">
+                <a:schemeClr val="accent1">
+                  <a:shade val="50000"/>
+                </a:schemeClr>
+              </a:lnRef>
+              <a:fillRef idx="1">
+                <a:schemeClr val="accent1"/>
+              </a:fillRef>
+              <a:effectRef idx="0">
+                <a:schemeClr val="accent1"/>
+              </a:effectRef>
+              <a:fontRef idx="minor">
+                <a:schemeClr val="lt1"/>
+              </a:fontRef>
+            </p:style>
+            <p:txBody>
+              <a:bodyPr rtlCol="0" anchor="ctr"/>
+              <a:lstStyle/>
+              <a:p>
+                <a:pPr algn="ctr"/>
+                <a:endParaRPr lang="en-US" sz="1000" b="1" dirty="0"/>
+              </a:p>
+            </p:txBody>
+          </p:sp>
+          <p:sp>
+            <p:nvSpPr>
+              <p:cNvPr id="54" name="Rectangle 53">
+                <a:extLst>
+                  <a:ext uri="{FF2B5EF4-FFF2-40B4-BE49-F238E27FC236}">
+                    <a16:creationId xmlns:a16="http://schemas.microsoft.com/office/drawing/2014/main" id="{7875F2B9-D011-4FBD-A06D-78C11A23BF69}"/>
+                  </a:ext>
+                </a:extLst>
+              </p:cNvPr>
+              <p:cNvSpPr/>
+              <p:nvPr/>
+            </p:nvSpPr>
+            <p:spPr>
+              <a:xfrm>
+                <a:off x="4153067" y="5851023"/>
+                <a:ext cx="228600" cy="170941"/>
+              </a:xfrm>
+              <a:prstGeom prst="rect">
+                <a:avLst/>
+              </a:prstGeom>
+              <a:solidFill>
+                <a:srgbClr val="0066FF"/>
+              </a:solidFill>
+              <a:ln>
+                <a:noFill/>
+              </a:ln>
+            </p:spPr>
+            <p:style>
+              <a:lnRef idx="2">
+                <a:schemeClr val="accent1">
+                  <a:shade val="50000"/>
+                </a:schemeClr>
+              </a:lnRef>
+              <a:fillRef idx="1">
+                <a:schemeClr val="accent1"/>
+              </a:fillRef>
+              <a:effectRef idx="0">
+                <a:schemeClr val="accent1"/>
+              </a:effectRef>
+              <a:fontRef idx="minor">
+                <a:schemeClr val="lt1"/>
+              </a:fontRef>
+            </p:style>
+            <p:txBody>
+              <a:bodyPr rtlCol="0" anchor="ctr"/>
+              <a:lstStyle/>
+              <a:p>
+                <a:pPr algn="ctr"/>
+                <a:endParaRPr lang="en-US" sz="1000" b="1" dirty="0"/>
+              </a:p>
+            </p:txBody>
+          </p:sp>
+        </p:grpSp>
+        <p:grpSp>
+          <p:nvGrpSpPr>
+            <p:cNvPr id="64" name="Group 63">
+              <a:extLst>
+                <a:ext uri="{FF2B5EF4-FFF2-40B4-BE49-F238E27FC236}">
+                  <a16:creationId xmlns:a16="http://schemas.microsoft.com/office/drawing/2014/main" id="{E57F82EE-D7ED-4D9B-B7B0-794E52AD1651}"/>
+                </a:ext>
+              </a:extLst>
+            </p:cNvPr>
+            <p:cNvGrpSpPr/>
+            <p:nvPr/>
+          </p:nvGrpSpPr>
+          <p:grpSpPr>
+            <a:xfrm>
+              <a:off x="5200734" y="5486400"/>
+              <a:ext cx="762000" cy="531168"/>
+              <a:chOff x="4876800" y="5486400"/>
+              <a:chExt cx="762000" cy="531168"/>
+            </a:xfrm>
+          </p:grpSpPr>
+          <p:sp>
+            <p:nvSpPr>
+              <p:cNvPr id="55" name="Rectangle 54">
+                <a:extLst>
+                  <a:ext uri="{FF2B5EF4-FFF2-40B4-BE49-F238E27FC236}">
+                    <a16:creationId xmlns:a16="http://schemas.microsoft.com/office/drawing/2014/main" id="{FCE79EC6-CE30-409C-A404-22F8C6EE8978}"/>
+                  </a:ext>
+                </a:extLst>
+              </p:cNvPr>
+              <p:cNvSpPr/>
+              <p:nvPr/>
+            </p:nvSpPr>
+            <p:spPr>
+              <a:xfrm>
+                <a:off x="4876800" y="5708984"/>
+                <a:ext cx="762000" cy="308584"/>
+              </a:xfrm>
+              <a:prstGeom prst="rect">
+                <a:avLst/>
+              </a:prstGeom>
+              <a:solidFill>
+                <a:srgbClr val="0066FF"/>
+              </a:solidFill>
+              <a:ln>
+                <a:noFill/>
+              </a:ln>
+            </p:spPr>
+            <p:style>
+              <a:lnRef idx="2">
+                <a:schemeClr val="accent1">
+                  <a:shade val="50000"/>
+                </a:schemeClr>
+              </a:lnRef>
+              <a:fillRef idx="1">
+                <a:schemeClr val="accent1"/>
+              </a:fillRef>
+              <a:effectRef idx="0">
+                <a:schemeClr val="accent1"/>
+              </a:effectRef>
+              <a:fontRef idx="minor">
+                <a:schemeClr val="lt1"/>
+              </a:fontRef>
+            </p:style>
+            <p:txBody>
+              <a:bodyPr rtlCol="0" anchor="ctr"/>
+              <a:lstStyle/>
+              <a:p>
+                <a:pPr algn="ctr"/>
+                <a:endParaRPr lang="en-US" sz="1000" b="1" dirty="0"/>
+              </a:p>
+            </p:txBody>
+          </p:sp>
+          <p:sp>
+            <p:nvSpPr>
+              <p:cNvPr id="56" name="Rectangle 55">
+                <a:extLst>
+                  <a:ext uri="{FF2B5EF4-FFF2-40B4-BE49-F238E27FC236}">
+                    <a16:creationId xmlns:a16="http://schemas.microsoft.com/office/drawing/2014/main" id="{02A16AE6-3605-449F-8AAA-EE28EC6A1D60}"/>
+                  </a:ext>
+                </a:extLst>
+              </p:cNvPr>
+              <p:cNvSpPr/>
+              <p:nvPr/>
+            </p:nvSpPr>
+            <p:spPr>
+              <a:xfrm>
+                <a:off x="5028978" y="5486400"/>
+                <a:ext cx="152622" cy="224816"/>
+              </a:xfrm>
+              <a:prstGeom prst="rect">
+                <a:avLst/>
+              </a:prstGeom>
+              <a:solidFill>
+                <a:srgbClr val="0066FF"/>
+              </a:solidFill>
+              <a:ln>
+                <a:noFill/>
+              </a:ln>
+            </p:spPr>
+            <p:style>
+              <a:lnRef idx="2">
+                <a:schemeClr val="accent1">
+                  <a:shade val="50000"/>
+                </a:schemeClr>
+              </a:lnRef>
+              <a:fillRef idx="1">
+                <a:schemeClr val="accent1"/>
+              </a:fillRef>
+              <a:effectRef idx="0">
+                <a:schemeClr val="accent1"/>
+              </a:effectRef>
+              <a:fontRef idx="minor">
+                <a:schemeClr val="lt1"/>
+              </a:fontRef>
+            </p:style>
+            <p:txBody>
+              <a:bodyPr rtlCol="0" anchor="t"/>
+              <a:lstStyle/>
+              <a:p>
+                <a:pPr algn="ctr"/>
+                <a:endParaRPr lang="en-US" sz="1000" b="1" dirty="0"/>
+              </a:p>
+            </p:txBody>
+          </p:sp>
+          <p:sp>
+            <p:nvSpPr>
+              <p:cNvPr id="57" name="Rectangle 56">
+                <a:extLst>
+                  <a:ext uri="{FF2B5EF4-FFF2-40B4-BE49-F238E27FC236}">
+                    <a16:creationId xmlns:a16="http://schemas.microsoft.com/office/drawing/2014/main" id="{73EC7B73-DAC9-41FA-B13B-CAA963FA8F4A}"/>
+                  </a:ext>
+                </a:extLst>
+              </p:cNvPr>
+              <p:cNvSpPr/>
+              <p:nvPr/>
+            </p:nvSpPr>
+            <p:spPr>
+              <a:xfrm>
+                <a:off x="5181600" y="5562600"/>
+                <a:ext cx="380778" cy="148616"/>
+              </a:xfrm>
+              <a:prstGeom prst="rect">
+                <a:avLst/>
+              </a:prstGeom>
+              <a:solidFill>
+                <a:srgbClr val="0066FF"/>
+              </a:solidFill>
+              <a:ln>
+                <a:noFill/>
+              </a:ln>
+            </p:spPr>
+            <p:style>
+              <a:lnRef idx="2">
+                <a:schemeClr val="accent1">
+                  <a:shade val="50000"/>
+                </a:schemeClr>
+              </a:lnRef>
+              <a:fillRef idx="1">
+                <a:schemeClr val="accent1"/>
+              </a:fillRef>
+              <a:effectRef idx="0">
+                <a:schemeClr val="accent1"/>
+              </a:effectRef>
+              <a:fontRef idx="minor">
+                <a:schemeClr val="lt1"/>
+              </a:fontRef>
+            </p:style>
+            <p:txBody>
+              <a:bodyPr rtlCol="0" anchor="ctr"/>
+              <a:lstStyle/>
+              <a:p>
+                <a:pPr algn="ctr"/>
+                <a:endParaRPr lang="en-US" sz="1000" b="1" dirty="0"/>
+              </a:p>
+            </p:txBody>
+          </p:sp>
+        </p:grpSp>
+        <p:grpSp>
+          <p:nvGrpSpPr>
+            <p:cNvPr id="65" name="Group 64">
+              <a:extLst>
+                <a:ext uri="{FF2B5EF4-FFF2-40B4-BE49-F238E27FC236}">
+                  <a16:creationId xmlns:a16="http://schemas.microsoft.com/office/drawing/2014/main" id="{01E3D661-082D-4B16-920E-9D06B22B3182}"/>
+                </a:ext>
+              </a:extLst>
+            </p:cNvPr>
+            <p:cNvGrpSpPr/>
+            <p:nvPr/>
+          </p:nvGrpSpPr>
+          <p:grpSpPr>
+            <a:xfrm>
+              <a:off x="6324600" y="5492416"/>
+              <a:ext cx="762000" cy="524890"/>
+              <a:chOff x="6019800" y="5492416"/>
+              <a:chExt cx="762000" cy="524890"/>
+            </a:xfrm>
+          </p:grpSpPr>
+          <p:sp>
+            <p:nvSpPr>
+              <p:cNvPr id="58" name="Rectangle 57">
+                <a:extLst>
+                  <a:ext uri="{FF2B5EF4-FFF2-40B4-BE49-F238E27FC236}">
+                    <a16:creationId xmlns:a16="http://schemas.microsoft.com/office/drawing/2014/main" id="{AD95FF57-13AF-4548-9ED3-FD340A907B89}"/>
+                  </a:ext>
+                </a:extLst>
+              </p:cNvPr>
+              <p:cNvSpPr/>
+              <p:nvPr/>
+            </p:nvSpPr>
+            <p:spPr>
+              <a:xfrm>
+                <a:off x="6096000" y="5492416"/>
+                <a:ext cx="380778" cy="148616"/>
+              </a:xfrm>
+              <a:prstGeom prst="rect">
+                <a:avLst/>
+              </a:prstGeom>
+              <a:solidFill>
+                <a:srgbClr val="0066FF"/>
+              </a:solidFill>
+              <a:ln>
+                <a:noFill/>
+              </a:ln>
+            </p:spPr>
+            <p:style>
+              <a:lnRef idx="2">
+                <a:schemeClr val="accent1">
+                  <a:shade val="50000"/>
+                </a:schemeClr>
+              </a:lnRef>
+              <a:fillRef idx="1">
+                <a:schemeClr val="accent1"/>
+              </a:fillRef>
+              <a:effectRef idx="0">
+                <a:schemeClr val="accent1"/>
+              </a:effectRef>
+              <a:fontRef idx="minor">
+                <a:schemeClr val="lt1"/>
+              </a:fontRef>
+            </p:style>
+            <p:txBody>
+              <a:bodyPr rtlCol="0" anchor="ctr"/>
+              <a:lstStyle/>
+              <a:p>
+                <a:pPr algn="ctr"/>
+                <a:endParaRPr lang="en-US" sz="1000" b="1" dirty="0"/>
+              </a:p>
+            </p:txBody>
+          </p:sp>
+          <p:sp>
+            <p:nvSpPr>
+              <p:cNvPr id="59" name="Rectangle 58">
+                <a:extLst>
+                  <a:ext uri="{FF2B5EF4-FFF2-40B4-BE49-F238E27FC236}">
+                    <a16:creationId xmlns:a16="http://schemas.microsoft.com/office/drawing/2014/main" id="{76E6B6A0-67E6-46F2-A9E0-FD25A52BB29F}"/>
+                  </a:ext>
+                </a:extLst>
+              </p:cNvPr>
+              <p:cNvSpPr/>
+              <p:nvPr/>
+            </p:nvSpPr>
+            <p:spPr>
+              <a:xfrm>
+                <a:off x="6324600" y="5861120"/>
+                <a:ext cx="380778" cy="156186"/>
+              </a:xfrm>
+              <a:prstGeom prst="rect">
+                <a:avLst/>
+              </a:prstGeom>
+              <a:solidFill>
+                <a:srgbClr val="0066FF"/>
+              </a:solidFill>
+              <a:ln>
+                <a:noFill/>
+              </a:ln>
+            </p:spPr>
+            <p:style>
+              <a:lnRef idx="2">
+                <a:schemeClr val="accent1">
+                  <a:shade val="50000"/>
+                </a:schemeClr>
+              </a:lnRef>
+              <a:fillRef idx="1">
+                <a:schemeClr val="accent1"/>
+              </a:fillRef>
+              <a:effectRef idx="0">
+                <a:schemeClr val="accent1"/>
+              </a:effectRef>
+              <a:fontRef idx="minor">
+                <a:schemeClr val="lt1"/>
+              </a:fontRef>
+            </p:style>
+            <p:txBody>
+              <a:bodyPr rtlCol="0" anchor="ctr"/>
+              <a:lstStyle/>
+              <a:p>
+                <a:pPr algn="ctr"/>
+                <a:endParaRPr lang="en-US" sz="1000" b="1" dirty="0"/>
+              </a:p>
+            </p:txBody>
+          </p:sp>
+          <p:sp>
+            <p:nvSpPr>
+              <p:cNvPr id="60" name="Rectangle 59">
+                <a:extLst>
+                  <a:ext uri="{FF2B5EF4-FFF2-40B4-BE49-F238E27FC236}">
+                    <a16:creationId xmlns:a16="http://schemas.microsoft.com/office/drawing/2014/main" id="{178B9C5D-3CF5-4521-8B0E-EB282BCE608D}"/>
+                  </a:ext>
+                </a:extLst>
+              </p:cNvPr>
+              <p:cNvSpPr/>
+              <p:nvPr/>
+            </p:nvSpPr>
+            <p:spPr>
+              <a:xfrm>
+                <a:off x="6019800" y="5638799"/>
+                <a:ext cx="762000" cy="222321"/>
+              </a:xfrm>
+              <a:prstGeom prst="rect">
+                <a:avLst/>
+              </a:prstGeom>
+              <a:solidFill>
+                <a:srgbClr val="0066FF"/>
+              </a:solidFill>
+              <a:ln>
+                <a:noFill/>
+              </a:ln>
+            </p:spPr>
+            <p:style>
+              <a:lnRef idx="2">
+                <a:schemeClr val="accent1">
+                  <a:shade val="50000"/>
+                </a:schemeClr>
+              </a:lnRef>
+              <a:fillRef idx="1">
+                <a:schemeClr val="accent1"/>
+              </a:fillRef>
+              <a:effectRef idx="0">
+                <a:schemeClr val="accent1"/>
+              </a:effectRef>
+              <a:fontRef idx="minor">
+                <a:schemeClr val="lt1"/>
+              </a:fontRef>
+            </p:style>
+            <p:txBody>
+              <a:bodyPr rtlCol="0" anchor="ctr"/>
+              <a:lstStyle/>
+              <a:p>
+                <a:pPr algn="ctr"/>
+                <a:endParaRPr lang="en-US" sz="1000" b="1" dirty="0"/>
+              </a:p>
+            </p:txBody>
+          </p:sp>
+        </p:grpSp>
+      </p:grpSp>
+      <p:grpSp>
+        <p:nvGrpSpPr>
+          <p:cNvPr id="95" name="Group 94">
+            <a:extLst>
+              <a:ext uri="{FF2B5EF4-FFF2-40B4-BE49-F238E27FC236}">
+                <a16:creationId xmlns:a16="http://schemas.microsoft.com/office/drawing/2014/main" id="{45FBC1D0-CC70-4A4C-BD34-940EF80757EA}"/>
+              </a:ext>
+            </a:extLst>
+          </p:cNvPr>
+          <p:cNvGrpSpPr/>
+          <p:nvPr/>
+        </p:nvGrpSpPr>
+        <p:grpSpPr>
+          <a:xfrm>
+            <a:off x="228600" y="1371600"/>
+            <a:ext cx="8686800" cy="1371600"/>
+            <a:chOff x="228600" y="1371600"/>
+            <a:chExt cx="8686800" cy="1371600"/>
+          </a:xfrm>
+        </p:grpSpPr>
+        <p:grpSp>
+          <p:nvGrpSpPr>
+            <p:cNvPr id="84" name="Group 83">
+              <a:extLst>
+                <a:ext uri="{FF2B5EF4-FFF2-40B4-BE49-F238E27FC236}">
+                  <a16:creationId xmlns:a16="http://schemas.microsoft.com/office/drawing/2014/main" id="{8E0E0DA8-6306-48A1-A3F4-E67C78E2B10E}"/>
+                </a:ext>
+              </a:extLst>
+            </p:cNvPr>
+            <p:cNvGrpSpPr/>
+            <p:nvPr/>
+          </p:nvGrpSpPr>
+          <p:grpSpPr>
+            <a:xfrm>
+              <a:off x="228600" y="1371600"/>
+              <a:ext cx="1866900" cy="1371600"/>
+              <a:chOff x="571500" y="1371600"/>
+              <a:chExt cx="1866900" cy="1371600"/>
+            </a:xfrm>
+          </p:grpSpPr>
+          <p:sp>
+            <p:nvSpPr>
+              <p:cNvPr id="67" name="Rectangle 66">
+                <a:extLst>
+                  <a:ext uri="{FF2B5EF4-FFF2-40B4-BE49-F238E27FC236}">
+                    <a16:creationId xmlns:a16="http://schemas.microsoft.com/office/drawing/2014/main" id="{797494D0-9AE8-4EEE-900A-C44497F79131}"/>
+                  </a:ext>
+                </a:extLst>
+              </p:cNvPr>
+              <p:cNvSpPr/>
+              <p:nvPr/>
+            </p:nvSpPr>
+            <p:spPr>
+              <a:xfrm>
+                <a:off x="1143000" y="1371600"/>
+                <a:ext cx="685800" cy="1371600"/>
+              </a:xfrm>
+              <a:prstGeom prst="rect">
+                <a:avLst/>
+              </a:prstGeom>
+              <a:solidFill>
+                <a:srgbClr val="0066FF"/>
+              </a:solidFill>
+              <a:ln>
+                <a:noFill/>
+              </a:ln>
+            </p:spPr>
+            <p:style>
+              <a:lnRef idx="2">
+                <a:schemeClr val="accent1">
+                  <a:shade val="50000"/>
+                </a:schemeClr>
+              </a:lnRef>
+              <a:fillRef idx="1">
+                <a:schemeClr val="accent1"/>
+              </a:fillRef>
+              <a:effectRef idx="0">
+                <a:schemeClr val="accent1"/>
+              </a:effectRef>
+              <a:fontRef idx="minor">
+                <a:schemeClr val="lt1"/>
+              </a:fontRef>
+            </p:style>
+            <p:txBody>
+              <a:bodyPr rtlCol="0" anchor="ctr"/>
+              <a:lstStyle/>
+              <a:p>
+                <a:pPr algn="ctr"/>
+                <a:endParaRPr lang="ca-ES"/>
+              </a:p>
+            </p:txBody>
+          </p:sp>
+          <p:sp>
+            <p:nvSpPr>
+              <p:cNvPr id="74" name="Rectangle 73">
+                <a:extLst>
+                  <a:ext uri="{FF2B5EF4-FFF2-40B4-BE49-F238E27FC236}">
+                    <a16:creationId xmlns:a16="http://schemas.microsoft.com/office/drawing/2014/main" id="{66369AA8-588C-4093-8EA6-B4D90272E003}"/>
+                  </a:ext>
+                </a:extLst>
+              </p:cNvPr>
+              <p:cNvSpPr/>
+              <p:nvPr/>
+            </p:nvSpPr>
+            <p:spPr>
+              <a:xfrm>
+                <a:off x="1828800" y="1371600"/>
+                <a:ext cx="609600" cy="914400"/>
+              </a:xfrm>
+              <a:prstGeom prst="rect">
+                <a:avLst/>
+              </a:prstGeom>
+              <a:solidFill>
+                <a:srgbClr val="0066FF"/>
+              </a:solidFill>
+              <a:ln>
+                <a:noFill/>
+              </a:ln>
+            </p:spPr>
+            <p:style>
+              <a:lnRef idx="2">
+                <a:schemeClr val="accent1">
+                  <a:shade val="50000"/>
+                </a:schemeClr>
+              </a:lnRef>
+              <a:fillRef idx="1">
+                <a:schemeClr val="accent1"/>
+              </a:fillRef>
+              <a:effectRef idx="0">
+                <a:schemeClr val="accent1"/>
+              </a:effectRef>
+              <a:fontRef idx="minor">
+                <a:schemeClr val="lt1"/>
+              </a:fontRef>
+            </p:style>
+            <p:txBody>
+              <a:bodyPr rtlCol="0" anchor="ctr"/>
+              <a:lstStyle/>
+              <a:p>
+                <a:pPr algn="ctr"/>
+                <a:endParaRPr lang="ca-ES"/>
+              </a:p>
+            </p:txBody>
+          </p:sp>
+          <p:sp>
+            <p:nvSpPr>
+              <p:cNvPr id="75" name="Rectangle 74">
+                <a:extLst>
+                  <a:ext uri="{FF2B5EF4-FFF2-40B4-BE49-F238E27FC236}">
+                    <a16:creationId xmlns:a16="http://schemas.microsoft.com/office/drawing/2014/main" id="{79520148-E652-4128-9394-0C9240D8E53C}"/>
+                  </a:ext>
+                </a:extLst>
+              </p:cNvPr>
+              <p:cNvSpPr/>
+              <p:nvPr/>
+            </p:nvSpPr>
+            <p:spPr>
+              <a:xfrm>
+                <a:off x="571500" y="1646237"/>
+                <a:ext cx="609600" cy="914400"/>
+              </a:xfrm>
+              <a:prstGeom prst="rect">
+                <a:avLst/>
+              </a:prstGeom>
+              <a:solidFill>
+                <a:srgbClr val="0066FF"/>
+              </a:solidFill>
+              <a:ln>
+                <a:noFill/>
+              </a:ln>
+            </p:spPr>
+            <p:style>
+              <a:lnRef idx="2">
+                <a:schemeClr val="accent1">
+                  <a:shade val="50000"/>
+                </a:schemeClr>
+              </a:lnRef>
+              <a:fillRef idx="1">
+                <a:schemeClr val="accent1"/>
+              </a:fillRef>
+              <a:effectRef idx="0">
+                <a:schemeClr val="accent1"/>
+              </a:effectRef>
+              <a:fontRef idx="minor">
+                <a:schemeClr val="lt1"/>
+              </a:fontRef>
+            </p:style>
+            <p:txBody>
+              <a:bodyPr rtlCol="0" anchor="ctr"/>
+              <a:lstStyle/>
+              <a:p>
+                <a:pPr algn="ctr"/>
+                <a:endParaRPr lang="ca-ES"/>
+              </a:p>
+            </p:txBody>
+          </p:sp>
+        </p:grpSp>
+        <p:sp>
+          <p:nvSpPr>
+            <p:cNvPr id="78" name="Rectangle 77">
+              <a:extLst>
+                <a:ext uri="{FF2B5EF4-FFF2-40B4-BE49-F238E27FC236}">
+                  <a16:creationId xmlns:a16="http://schemas.microsoft.com/office/drawing/2014/main" id="{A334D778-7D9C-4CBE-9615-6C9D32B36D81}"/>
+                </a:ext>
+              </a:extLst>
+            </p:cNvPr>
+            <p:cNvSpPr/>
+            <p:nvPr/>
+          </p:nvSpPr>
+          <p:spPr>
+            <a:xfrm>
+              <a:off x="2514600" y="1646237"/>
+              <a:ext cx="571500" cy="914400"/>
+            </a:xfrm>
+            <a:prstGeom prst="rect">
+              <a:avLst/>
+            </a:prstGeom>
+            <a:solidFill>
+              <a:srgbClr val="FF0000"/>
+            </a:solidFill>
+            <a:ln>
+              <a:solidFill>
+                <a:schemeClr val="tx1"/>
+              </a:solidFill>
+            </a:ln>
+          </p:spPr>
+          <p:style>
+            <a:lnRef idx="2">
+              <a:schemeClr val="accent1">
+                <a:shade val="50000"/>
+              </a:schemeClr>
+            </a:lnRef>
+            <a:fillRef idx="1">
+              <a:schemeClr val="accent1"/>
+            </a:fillRef>
+            <a:effectRef idx="0">
+              <a:schemeClr val="accent1"/>
+            </a:effectRef>
+            <a:fontRef idx="minor">
+              <a:schemeClr val="lt1"/>
+            </a:fontRef>
+          </p:style>
+          <p:txBody>
+            <a:bodyPr rtlCol="0" anchor="ctr"/>
+            <a:lstStyle/>
+            <a:p>
+              <a:pPr algn="ctr"/>
+              <a:endParaRPr lang="ca-ES"/>
+            </a:p>
+          </p:txBody>
+        </p:sp>
+        <p:sp>
+          <p:nvSpPr>
+            <p:cNvPr id="76" name="Rectangle 75">
+              <a:extLst>
+                <a:ext uri="{FF2B5EF4-FFF2-40B4-BE49-F238E27FC236}">
+                  <a16:creationId xmlns:a16="http://schemas.microsoft.com/office/drawing/2014/main" id="{4B8E8DD3-201A-43AA-B621-89F81917108F}"/>
+                </a:ext>
+              </a:extLst>
+            </p:cNvPr>
+            <p:cNvSpPr/>
+            <p:nvPr/>
+          </p:nvSpPr>
+          <p:spPr>
+            <a:xfrm>
+              <a:off x="3086100" y="1371600"/>
+              <a:ext cx="685800" cy="1371600"/>
+            </a:xfrm>
+            <a:prstGeom prst="rect">
+              <a:avLst/>
+            </a:prstGeom>
+            <a:solidFill>
+              <a:srgbClr val="0066FF"/>
+            </a:solidFill>
+            <a:ln>
+              <a:solidFill>
+                <a:schemeClr val="tx1"/>
+              </a:solidFill>
+            </a:ln>
+          </p:spPr>
+          <p:style>
+            <a:lnRef idx="2">
+              <a:schemeClr val="accent1">
+                <a:shade val="50000"/>
+              </a:schemeClr>
+            </a:lnRef>
+            <a:fillRef idx="1">
+              <a:schemeClr val="accent1"/>
+            </a:fillRef>
+            <a:effectRef idx="0">
+              <a:schemeClr val="accent1"/>
+            </a:effectRef>
+            <a:fontRef idx="minor">
+              <a:schemeClr val="lt1"/>
+            </a:fontRef>
+          </p:style>
+          <p:txBody>
+            <a:bodyPr rtlCol="0" anchor="ctr"/>
+            <a:lstStyle/>
+            <a:p>
+              <a:pPr algn="ctr"/>
+              <a:endParaRPr lang="ca-ES" dirty="0"/>
+            </a:p>
+          </p:txBody>
+        </p:sp>
+        <p:sp>
+          <p:nvSpPr>
+            <p:cNvPr id="77" name="Rectangle 76">
+              <a:extLst>
+                <a:ext uri="{FF2B5EF4-FFF2-40B4-BE49-F238E27FC236}">
+                  <a16:creationId xmlns:a16="http://schemas.microsoft.com/office/drawing/2014/main" id="{6A35788C-41C9-407F-815E-A3008EF12007}"/>
+                </a:ext>
+              </a:extLst>
+            </p:cNvPr>
+            <p:cNvSpPr/>
+            <p:nvPr/>
+          </p:nvSpPr>
+          <p:spPr>
+            <a:xfrm>
+              <a:off x="3771900" y="1371600"/>
+              <a:ext cx="609600" cy="914400"/>
+            </a:xfrm>
+            <a:prstGeom prst="rect">
+              <a:avLst/>
+            </a:prstGeom>
+            <a:solidFill>
+              <a:srgbClr val="FF0000"/>
+            </a:solidFill>
+            <a:ln>
+              <a:solidFill>
+                <a:schemeClr val="tx1"/>
+              </a:solidFill>
+            </a:ln>
+          </p:spPr>
+          <p:style>
+            <a:lnRef idx="2">
+              <a:schemeClr val="accent1">
+                <a:shade val="50000"/>
+              </a:schemeClr>
+            </a:lnRef>
+            <a:fillRef idx="1">
+              <a:schemeClr val="accent1"/>
+            </a:fillRef>
+            <a:effectRef idx="0">
+              <a:schemeClr val="accent1"/>
+            </a:effectRef>
+            <a:fontRef idx="minor">
+              <a:schemeClr val="lt1"/>
+            </a:fontRef>
+          </p:style>
+          <p:txBody>
+            <a:bodyPr rtlCol="0" anchor="ctr"/>
+            <a:lstStyle/>
+            <a:p>
+              <a:pPr algn="ctr"/>
+              <a:endParaRPr lang="ca-ES"/>
+            </a:p>
+          </p:txBody>
+        </p:sp>
+        <p:sp>
+          <p:nvSpPr>
+            <p:cNvPr id="79" name="Rectangle 78">
+              <a:extLst>
+                <a:ext uri="{FF2B5EF4-FFF2-40B4-BE49-F238E27FC236}">
+                  <a16:creationId xmlns:a16="http://schemas.microsoft.com/office/drawing/2014/main" id="{E4D8A768-E364-4851-80E2-2EA800947768}"/>
+                </a:ext>
+              </a:extLst>
+            </p:cNvPr>
+            <p:cNvSpPr/>
+            <p:nvPr/>
+          </p:nvSpPr>
+          <p:spPr>
+            <a:xfrm>
+              <a:off x="5372100" y="1371600"/>
+              <a:ext cx="685800" cy="1371600"/>
+            </a:xfrm>
+            <a:prstGeom prst="rect">
+              <a:avLst/>
+            </a:prstGeom>
+            <a:solidFill>
+              <a:srgbClr val="FF0000"/>
+            </a:solidFill>
+            <a:ln>
+              <a:noFill/>
+            </a:ln>
+          </p:spPr>
+          <p:style>
+            <a:lnRef idx="2">
+              <a:schemeClr val="accent1">
+                <a:shade val="50000"/>
+              </a:schemeClr>
+            </a:lnRef>
+            <a:fillRef idx="1">
+              <a:schemeClr val="accent1"/>
+            </a:fillRef>
+            <a:effectRef idx="0">
+              <a:schemeClr val="accent1"/>
+            </a:effectRef>
+            <a:fontRef idx="minor">
+              <a:schemeClr val="lt1"/>
+            </a:fontRef>
+          </p:style>
+          <p:txBody>
+            <a:bodyPr rtlCol="0" anchor="ctr"/>
+            <a:lstStyle/>
+            <a:p>
+              <a:pPr algn="ctr"/>
+              <a:endParaRPr lang="ca-ES"/>
+            </a:p>
+          </p:txBody>
+        </p:sp>
+        <p:sp>
+          <p:nvSpPr>
+            <p:cNvPr id="80" name="Rectangle 79">
+              <a:extLst>
+                <a:ext uri="{FF2B5EF4-FFF2-40B4-BE49-F238E27FC236}">
+                  <a16:creationId xmlns:a16="http://schemas.microsoft.com/office/drawing/2014/main" id="{752AB083-FCEB-4754-B5D0-15CC513397CA}"/>
+                </a:ext>
+              </a:extLst>
+            </p:cNvPr>
+            <p:cNvSpPr/>
+            <p:nvPr/>
+          </p:nvSpPr>
+          <p:spPr>
+            <a:xfrm>
+              <a:off x="6057900" y="1371600"/>
+              <a:ext cx="609600" cy="914400"/>
+            </a:xfrm>
+            <a:prstGeom prst="rect">
+              <a:avLst/>
+            </a:prstGeom>
+            <a:solidFill>
+              <a:srgbClr val="FF0000"/>
+            </a:solidFill>
+            <a:ln>
+              <a:noFill/>
+            </a:ln>
+          </p:spPr>
+          <p:style>
+            <a:lnRef idx="2">
+              <a:schemeClr val="accent1">
+                <a:shade val="50000"/>
+              </a:schemeClr>
+            </a:lnRef>
+            <a:fillRef idx="1">
+              <a:schemeClr val="accent1"/>
+            </a:fillRef>
+            <a:effectRef idx="0">
+              <a:schemeClr val="accent1"/>
+            </a:effectRef>
+            <a:fontRef idx="minor">
+              <a:schemeClr val="lt1"/>
+            </a:fontRef>
+          </p:style>
+          <p:txBody>
+            <a:bodyPr rtlCol="0" anchor="ctr"/>
+            <a:lstStyle/>
+            <a:p>
+              <a:pPr algn="ctr"/>
+              <a:endParaRPr lang="ca-ES"/>
+            </a:p>
+          </p:txBody>
+        </p:sp>
+        <p:sp>
+          <p:nvSpPr>
+            <p:cNvPr id="81" name="Rectangle 80">
+              <a:extLst>
+                <a:ext uri="{FF2B5EF4-FFF2-40B4-BE49-F238E27FC236}">
+                  <a16:creationId xmlns:a16="http://schemas.microsoft.com/office/drawing/2014/main" id="{3C6DE5FC-86D5-4A63-A569-8E58809B1A4C}"/>
+                </a:ext>
+              </a:extLst>
+            </p:cNvPr>
+            <p:cNvSpPr/>
+            <p:nvPr/>
+          </p:nvSpPr>
+          <p:spPr>
+            <a:xfrm>
+              <a:off x="4800600" y="2283835"/>
+              <a:ext cx="571500" cy="276801"/>
+            </a:xfrm>
+            <a:prstGeom prst="rect">
+              <a:avLst/>
+            </a:prstGeom>
+            <a:solidFill>
+              <a:srgbClr val="FF0000"/>
+            </a:solidFill>
+            <a:ln>
+              <a:solidFill>
+                <a:schemeClr val="tx1"/>
+              </a:solidFill>
+            </a:ln>
+          </p:spPr>
+          <p:style>
+            <a:lnRef idx="2">
+              <a:schemeClr val="accent1">
+                <a:shade val="50000"/>
+              </a:schemeClr>
+            </a:lnRef>
+            <a:fillRef idx="1">
+              <a:schemeClr val="accent1"/>
+            </a:fillRef>
+            <a:effectRef idx="0">
+              <a:schemeClr val="accent1"/>
+            </a:effectRef>
+            <a:fontRef idx="minor">
+              <a:schemeClr val="lt1"/>
+            </a:fontRef>
+          </p:style>
+          <p:txBody>
+            <a:bodyPr rtlCol="0" anchor="ctr"/>
+            <a:lstStyle/>
+            <a:p>
+              <a:pPr algn="ctr"/>
+              <a:endParaRPr lang="ca-ES"/>
+            </a:p>
+          </p:txBody>
+        </p:sp>
+        <p:sp>
+          <p:nvSpPr>
+            <p:cNvPr id="82" name="Rectangle 81">
+              <a:extLst>
+                <a:ext uri="{FF2B5EF4-FFF2-40B4-BE49-F238E27FC236}">
+                  <a16:creationId xmlns:a16="http://schemas.microsoft.com/office/drawing/2014/main" id="{0C12969D-9B13-4261-83AE-9CC88C7A53D6}"/>
+                </a:ext>
+              </a:extLst>
+            </p:cNvPr>
+            <p:cNvSpPr/>
+            <p:nvPr/>
+          </p:nvSpPr>
+          <p:spPr>
+            <a:xfrm>
+              <a:off x="4800600" y="1645085"/>
+              <a:ext cx="1866900" cy="640915"/>
+            </a:xfrm>
+            <a:prstGeom prst="rect">
+              <a:avLst/>
+            </a:prstGeom>
+            <a:solidFill>
+              <a:srgbClr val="0066FF"/>
+            </a:solidFill>
+            <a:ln>
+              <a:noFill/>
+            </a:ln>
+          </p:spPr>
+          <p:style>
+            <a:lnRef idx="2">
+              <a:schemeClr val="accent1">
+                <a:shade val="50000"/>
+              </a:schemeClr>
+            </a:lnRef>
+            <a:fillRef idx="1">
+              <a:schemeClr val="accent1"/>
+            </a:fillRef>
+            <a:effectRef idx="0">
+              <a:schemeClr val="accent1"/>
+            </a:effectRef>
+            <a:fontRef idx="minor">
+              <a:schemeClr val="lt1"/>
+            </a:fontRef>
+          </p:style>
+          <p:txBody>
+            <a:bodyPr rtlCol="0" anchor="ctr"/>
+            <a:lstStyle/>
+            <a:p>
+              <a:pPr algn="ctr"/>
+              <a:endParaRPr lang="ca-ES" dirty="0"/>
+            </a:p>
+          </p:txBody>
+        </p:sp>
+        <p:sp>
+          <p:nvSpPr>
+            <p:cNvPr id="88" name="Rectangle 87">
+              <a:extLst>
+                <a:ext uri="{FF2B5EF4-FFF2-40B4-BE49-F238E27FC236}">
+                  <a16:creationId xmlns:a16="http://schemas.microsoft.com/office/drawing/2014/main" id="{F76F1264-754A-403D-B770-CF8AC6410B35}"/>
+                </a:ext>
+              </a:extLst>
+            </p:cNvPr>
+            <p:cNvSpPr/>
+            <p:nvPr/>
+          </p:nvSpPr>
+          <p:spPr>
+            <a:xfrm>
+              <a:off x="7048500" y="1646237"/>
+              <a:ext cx="571500" cy="914400"/>
+            </a:xfrm>
+            <a:prstGeom prst="rect">
+              <a:avLst/>
+            </a:prstGeom>
+            <a:solidFill>
+              <a:srgbClr val="FF0000"/>
+            </a:solidFill>
+            <a:ln>
+              <a:solidFill>
+                <a:schemeClr val="tx1"/>
+              </a:solidFill>
+            </a:ln>
+          </p:spPr>
+          <p:style>
+            <a:lnRef idx="2">
+              <a:schemeClr val="accent1">
+                <a:shade val="50000"/>
+              </a:schemeClr>
+            </a:lnRef>
+            <a:fillRef idx="1">
+              <a:schemeClr val="accent1"/>
+            </a:fillRef>
+            <a:effectRef idx="0">
+              <a:schemeClr val="accent1"/>
+            </a:effectRef>
+            <a:fontRef idx="minor">
+              <a:schemeClr val="lt1"/>
+            </a:fontRef>
+          </p:style>
+          <p:txBody>
+            <a:bodyPr rtlCol="0" anchor="ctr"/>
+            <a:lstStyle/>
+            <a:p>
+              <a:pPr algn="ctr"/>
+              <a:endParaRPr lang="ca-ES"/>
+            </a:p>
+          </p:txBody>
+        </p:sp>
+        <p:sp>
+          <p:nvSpPr>
+            <p:cNvPr id="86" name="Rectangle 85">
+              <a:extLst>
+                <a:ext uri="{FF2B5EF4-FFF2-40B4-BE49-F238E27FC236}">
+                  <a16:creationId xmlns:a16="http://schemas.microsoft.com/office/drawing/2014/main" id="{943B835C-D7B1-41AC-A89B-0BC004D3BE18}"/>
+                </a:ext>
+              </a:extLst>
+            </p:cNvPr>
+            <p:cNvSpPr/>
+            <p:nvPr/>
+          </p:nvSpPr>
+          <p:spPr>
+            <a:xfrm>
+              <a:off x="7620000" y="1371600"/>
+              <a:ext cx="685800" cy="1371600"/>
+            </a:xfrm>
+            <a:prstGeom prst="rect">
+              <a:avLst/>
+            </a:prstGeom>
+            <a:solidFill>
+              <a:srgbClr val="0066FF"/>
+            </a:solidFill>
+            <a:ln>
+              <a:solidFill>
+                <a:schemeClr val="tx1"/>
+              </a:solidFill>
+            </a:ln>
+          </p:spPr>
+          <p:style>
+            <a:lnRef idx="2">
+              <a:schemeClr val="accent1">
+                <a:shade val="50000"/>
+              </a:schemeClr>
+            </a:lnRef>
+            <a:fillRef idx="1">
+              <a:schemeClr val="accent1"/>
+            </a:fillRef>
+            <a:effectRef idx="0">
+              <a:schemeClr val="accent1"/>
+            </a:effectRef>
+            <a:fontRef idx="minor">
+              <a:schemeClr val="lt1"/>
+            </a:fontRef>
+          </p:style>
+          <p:txBody>
+            <a:bodyPr rtlCol="0" anchor="ctr"/>
+            <a:lstStyle/>
+            <a:p>
+              <a:pPr algn="ctr"/>
+              <a:endParaRPr lang="ca-ES"/>
+            </a:p>
+          </p:txBody>
+        </p:sp>
+        <p:sp>
+          <p:nvSpPr>
+            <p:cNvPr id="87" name="Rectangle 86">
+              <a:extLst>
+                <a:ext uri="{FF2B5EF4-FFF2-40B4-BE49-F238E27FC236}">
+                  <a16:creationId xmlns:a16="http://schemas.microsoft.com/office/drawing/2014/main" id="{190A1F03-1F13-4461-BACD-505DB591F604}"/>
+                </a:ext>
+              </a:extLst>
+            </p:cNvPr>
+            <p:cNvSpPr/>
+            <p:nvPr/>
+          </p:nvSpPr>
+          <p:spPr>
+            <a:xfrm>
+              <a:off x="8305800" y="1371600"/>
+              <a:ext cx="609600" cy="914400"/>
+            </a:xfrm>
+            <a:prstGeom prst="rect">
+              <a:avLst/>
+            </a:prstGeom>
+            <a:solidFill>
+              <a:srgbClr val="0066FF"/>
+            </a:solidFill>
+            <a:ln>
+              <a:noFill/>
+            </a:ln>
+          </p:spPr>
+          <p:style>
+            <a:lnRef idx="2">
+              <a:schemeClr val="accent1">
+                <a:shade val="50000"/>
+              </a:schemeClr>
+            </a:lnRef>
+            <a:fillRef idx="1">
+              <a:schemeClr val="accent1"/>
+            </a:fillRef>
+            <a:effectRef idx="0">
+              <a:schemeClr val="accent1"/>
+            </a:effectRef>
+            <a:fontRef idx="minor">
+              <a:schemeClr val="lt1"/>
+            </a:fontRef>
+          </p:style>
+          <p:txBody>
+            <a:bodyPr rtlCol="0" anchor="ctr"/>
+            <a:lstStyle/>
+            <a:p>
+              <a:pPr algn="ctr"/>
+              <a:endParaRPr lang="ca-ES"/>
+            </a:p>
+          </p:txBody>
+        </p:sp>
+        <p:sp>
+          <p:nvSpPr>
+            <p:cNvPr id="90" name="Rectangle 89">
+              <a:extLst>
+                <a:ext uri="{FF2B5EF4-FFF2-40B4-BE49-F238E27FC236}">
+                  <a16:creationId xmlns:a16="http://schemas.microsoft.com/office/drawing/2014/main" id="{7CD73A74-40E6-4776-8082-E98CBADA16DD}"/>
+                </a:ext>
+              </a:extLst>
+            </p:cNvPr>
+            <p:cNvSpPr/>
+            <p:nvPr/>
+          </p:nvSpPr>
+          <p:spPr>
+            <a:xfrm>
+              <a:off x="8039100" y="1524000"/>
+              <a:ext cx="266700" cy="1219200"/>
+            </a:xfrm>
+            <a:prstGeom prst="rect">
+              <a:avLst/>
+            </a:prstGeom>
+            <a:solidFill>
+              <a:srgbClr val="FF0000"/>
+            </a:solidFill>
+            <a:ln>
+              <a:noFill/>
+            </a:ln>
+          </p:spPr>
+          <p:style>
+            <a:lnRef idx="2">
+              <a:schemeClr val="accent1">
+                <a:shade val="50000"/>
+              </a:schemeClr>
+            </a:lnRef>
+            <a:fillRef idx="1">
+              <a:schemeClr val="accent1"/>
+            </a:fillRef>
+            <a:effectRef idx="0">
+              <a:schemeClr val="accent1"/>
+            </a:effectRef>
+            <a:fontRef idx="minor">
+              <a:schemeClr val="lt1"/>
+            </a:fontRef>
+          </p:style>
+          <p:txBody>
+            <a:bodyPr rtlCol="0" anchor="ctr"/>
+            <a:lstStyle/>
+            <a:p>
+              <a:pPr algn="ctr"/>
+              <a:endParaRPr lang="ca-ES"/>
+            </a:p>
+          </p:txBody>
+        </p:sp>
+        <p:sp>
+          <p:nvSpPr>
+            <p:cNvPr id="91" name="Rectangle 90">
+              <a:extLst>
+                <a:ext uri="{FF2B5EF4-FFF2-40B4-BE49-F238E27FC236}">
+                  <a16:creationId xmlns:a16="http://schemas.microsoft.com/office/drawing/2014/main" id="{764C3888-6D03-4E7A-878D-8B856109C547}"/>
+                </a:ext>
+              </a:extLst>
+            </p:cNvPr>
+            <p:cNvSpPr/>
+            <p:nvPr/>
+          </p:nvSpPr>
+          <p:spPr>
+            <a:xfrm>
+              <a:off x="5352912" y="1371600"/>
+              <a:ext cx="1314588" cy="273485"/>
+            </a:xfrm>
+            <a:prstGeom prst="rect">
+              <a:avLst/>
+            </a:prstGeom>
+            <a:solidFill>
+              <a:srgbClr val="FF0000"/>
+            </a:solidFill>
+            <a:ln>
+              <a:solidFill>
+                <a:schemeClr val="tx1"/>
+              </a:solidFill>
+            </a:ln>
+          </p:spPr>
+          <p:style>
+            <a:lnRef idx="2">
+              <a:schemeClr val="accent1">
+                <a:shade val="50000"/>
+              </a:schemeClr>
+            </a:lnRef>
+            <a:fillRef idx="1">
+              <a:schemeClr val="accent1"/>
+            </a:fillRef>
+            <a:effectRef idx="0">
+              <a:schemeClr val="accent1"/>
+            </a:effectRef>
+            <a:fontRef idx="minor">
+              <a:schemeClr val="lt1"/>
+            </a:fontRef>
+          </p:style>
+          <p:txBody>
+            <a:bodyPr rtlCol="0" anchor="ctr"/>
+            <a:lstStyle/>
+            <a:p>
+              <a:pPr algn="ctr"/>
+              <a:endParaRPr lang="ca-ES"/>
+            </a:p>
+          </p:txBody>
+        </p:sp>
+        <p:sp>
+          <p:nvSpPr>
+            <p:cNvPr id="92" name="Rectangle 91">
+              <a:extLst>
+                <a:ext uri="{FF2B5EF4-FFF2-40B4-BE49-F238E27FC236}">
+                  <a16:creationId xmlns:a16="http://schemas.microsoft.com/office/drawing/2014/main" id="{2871BF67-FDBE-4457-9593-05B05C582E2C}"/>
+                </a:ext>
+              </a:extLst>
+            </p:cNvPr>
+            <p:cNvSpPr/>
+            <p:nvPr/>
+          </p:nvSpPr>
+          <p:spPr>
+            <a:xfrm>
+              <a:off x="5372100" y="2286000"/>
+              <a:ext cx="685800" cy="457200"/>
+            </a:xfrm>
+            <a:prstGeom prst="rect">
+              <a:avLst/>
+            </a:prstGeom>
+            <a:solidFill>
+              <a:srgbClr val="FF0000"/>
+            </a:solidFill>
+            <a:ln>
+              <a:solidFill>
+                <a:schemeClr val="tx1"/>
+              </a:solidFill>
+            </a:ln>
+          </p:spPr>
+          <p:style>
+            <a:lnRef idx="2">
+              <a:schemeClr val="accent1">
+                <a:shade val="50000"/>
+              </a:schemeClr>
+            </a:lnRef>
+            <a:fillRef idx="1">
+              <a:schemeClr val="accent1"/>
+            </a:fillRef>
+            <a:effectRef idx="0">
+              <a:schemeClr val="accent1"/>
+            </a:effectRef>
+            <a:fontRef idx="minor">
+              <a:schemeClr val="lt1"/>
+            </a:fontRef>
+          </p:style>
+          <p:txBody>
+            <a:bodyPr rtlCol="0" anchor="ctr"/>
+            <a:lstStyle/>
+            <a:p>
+              <a:pPr algn="ctr"/>
+              <a:endParaRPr lang="ca-ES"/>
+            </a:p>
+          </p:txBody>
+        </p:sp>
+        <p:sp>
+          <p:nvSpPr>
+            <p:cNvPr id="93" name="Rectangle 92">
+              <a:extLst>
+                <a:ext uri="{FF2B5EF4-FFF2-40B4-BE49-F238E27FC236}">
+                  <a16:creationId xmlns:a16="http://schemas.microsoft.com/office/drawing/2014/main" id="{ACDF19A5-C7B0-4BE5-AB8D-763AB6302F95}"/>
+                </a:ext>
+              </a:extLst>
+            </p:cNvPr>
+            <p:cNvSpPr/>
+            <p:nvPr/>
+          </p:nvSpPr>
+          <p:spPr>
+            <a:xfrm>
+              <a:off x="4800600" y="1645085"/>
+              <a:ext cx="1866900" cy="643080"/>
+            </a:xfrm>
+            <a:prstGeom prst="rect">
+              <a:avLst/>
+            </a:prstGeom>
+            <a:solidFill>
+              <a:srgbClr val="0066FF"/>
+            </a:solidFill>
+            <a:ln>
+              <a:solidFill>
+                <a:schemeClr val="tx1"/>
+              </a:solidFill>
+            </a:ln>
+          </p:spPr>
+          <p:style>
+            <a:lnRef idx="2">
+              <a:schemeClr val="accent1">
+                <a:shade val="50000"/>
+              </a:schemeClr>
+            </a:lnRef>
+            <a:fillRef idx="1">
+              <a:schemeClr val="accent1"/>
+            </a:fillRef>
+            <a:effectRef idx="0">
+              <a:schemeClr val="accent1"/>
+            </a:effectRef>
+            <a:fontRef idx="minor">
+              <a:schemeClr val="lt1"/>
+            </a:fontRef>
+          </p:style>
+          <p:txBody>
+            <a:bodyPr rtlCol="0" anchor="ctr"/>
+            <a:lstStyle/>
+            <a:p>
+              <a:pPr algn="ctr"/>
+              <a:endParaRPr lang="ca-ES"/>
+            </a:p>
+          </p:txBody>
+        </p:sp>
+        <p:sp>
+          <p:nvSpPr>
+            <p:cNvPr id="89" name="Rectangle 88">
+              <a:extLst>
+                <a:ext uri="{FF2B5EF4-FFF2-40B4-BE49-F238E27FC236}">
+                  <a16:creationId xmlns:a16="http://schemas.microsoft.com/office/drawing/2014/main" id="{A0C74CC4-483F-4778-8D31-BFC23209A19F}"/>
+                </a:ext>
+              </a:extLst>
+            </p:cNvPr>
+            <p:cNvSpPr/>
+            <p:nvPr/>
+          </p:nvSpPr>
+          <p:spPr>
+            <a:xfrm>
+              <a:off x="8039100" y="1371600"/>
+              <a:ext cx="876300" cy="914400"/>
+            </a:xfrm>
+            <a:prstGeom prst="rect">
+              <a:avLst/>
+            </a:prstGeom>
+            <a:solidFill>
+              <a:srgbClr val="FF0000"/>
+            </a:solidFill>
+            <a:ln>
+              <a:solidFill>
+                <a:schemeClr val="tx1"/>
+              </a:solidFill>
+            </a:ln>
+          </p:spPr>
+          <p:style>
+            <a:lnRef idx="2">
+              <a:schemeClr val="accent1">
+                <a:shade val="50000"/>
+              </a:schemeClr>
+            </a:lnRef>
+            <a:fillRef idx="1">
+              <a:schemeClr val="accent1"/>
+            </a:fillRef>
+            <a:effectRef idx="0">
+              <a:schemeClr val="accent1"/>
+            </a:effectRef>
+            <a:fontRef idx="minor">
+              <a:schemeClr val="lt1"/>
+            </a:fontRef>
+          </p:style>
+          <p:txBody>
+            <a:bodyPr rtlCol="0" anchor="ctr"/>
+            <a:lstStyle/>
+            <a:p>
+              <a:pPr algn="ctr"/>
+              <a:endParaRPr lang="ca-ES"/>
+            </a:p>
+          </p:txBody>
+        </p:sp>
+        <p:sp>
+          <p:nvSpPr>
+            <p:cNvPr id="94" name="Rectangle 93">
+              <a:extLst>
+                <a:ext uri="{FF2B5EF4-FFF2-40B4-BE49-F238E27FC236}">
+                  <a16:creationId xmlns:a16="http://schemas.microsoft.com/office/drawing/2014/main" id="{E0D64C5A-B1F8-4AA3-9BB8-20F57BCB01B1}"/>
+                </a:ext>
+              </a:extLst>
+            </p:cNvPr>
+            <p:cNvSpPr/>
+            <p:nvPr/>
+          </p:nvSpPr>
+          <p:spPr>
+            <a:xfrm>
+              <a:off x="8039100" y="2283835"/>
+              <a:ext cx="266700" cy="459365"/>
+            </a:xfrm>
+            <a:prstGeom prst="rect">
+              <a:avLst/>
+            </a:prstGeom>
+            <a:solidFill>
+              <a:srgbClr val="FF0000"/>
+            </a:solidFill>
+            <a:ln>
+              <a:solidFill>
+                <a:schemeClr val="tx1"/>
+              </a:solidFill>
+            </a:ln>
+          </p:spPr>
+          <p:style>
+            <a:lnRef idx="2">
+              <a:schemeClr val="accent1">
+                <a:shade val="50000"/>
+              </a:schemeClr>
+            </a:lnRef>
+            <a:fillRef idx="1">
+              <a:schemeClr val="accent1"/>
+            </a:fillRef>
+            <a:effectRef idx="0">
+              <a:schemeClr val="accent1"/>
+            </a:effectRef>
+            <a:fontRef idx="minor">
+              <a:schemeClr val="lt1"/>
+            </a:fontRef>
+          </p:style>
+          <p:txBody>
+            <a:bodyPr rtlCol="0" anchor="ctr"/>
+            <a:lstStyle/>
+            <a:p>
+              <a:pPr algn="ctr"/>
+              <a:endParaRPr lang="ca-ES"/>
+            </a:p>
+          </p:txBody>
+        </p:sp>
+      </p:grpSp>
+    </p:spTree>
+    <p:extLst>
+      <p:ext uri="{BB962C8B-B14F-4D97-AF65-F5344CB8AC3E}">
+        <p14:creationId xmlns:p14="http://schemas.microsoft.com/office/powerpoint/2010/main" val="11626257"/>
       </p:ext>
     </p:extLst>
   </p:cSld>

</xml_diff>

<commit_message>
updating hanan and strop
</commit_message>
<xml_diff>
--- a/doc/Floorplan_picts.pptx
+++ b/doc/Floorplan_picts.pptx
@@ -5,10 +5,10 @@
     <p:sldMasterId id="2147483662" r:id="rId1"/>
   </p:sldMasterIdLst>
   <p:notesMasterIdLst>
-    <p:notesMasterId r:id="rId15"/>
+    <p:notesMasterId r:id="rId16"/>
   </p:notesMasterIdLst>
   <p:handoutMasterIdLst>
-    <p:handoutMasterId r:id="rId16"/>
+    <p:handoutMasterId r:id="rId17"/>
   </p:handoutMasterIdLst>
   <p:sldIdLst>
     <p:sldId id="613" r:id="rId2"/>
@@ -24,6 +24,7 @@
     <p:sldId id="616" r:id="rId12"/>
     <p:sldId id="619" r:id="rId13"/>
     <p:sldId id="620" r:id="rId14"/>
+    <p:sldId id="621" r:id="rId15"/>
   </p:sldIdLst>
   <p:sldSz cx="12192000" cy="6858000"/>
   <p:notesSz cx="7315200" cy="9601200"/>
@@ -5678,7 +5679,7 @@
           <a:p>
             <a:fld id="{847A9C85-7208-4140-9A1B-482E74B6EC70}" type="datetimeFigureOut">
               <a:rPr lang="en-US" smtClean="0"/>
-              <a:t>7/23/2025</a:t>
+              <a:t>8/1/2025</a:t>
             </a:fld>
             <a:endParaRPr lang="en-US"/>
           </a:p>
@@ -5838,7 +5839,7 @@
           <a:p>
             <a:fld id="{9EAA3D3F-CA47-4B9D-B6BA-678D85410C0A}" type="datetimeFigureOut">
               <a:rPr lang="en-US" smtClean="0"/>
-              <a:t>7/23/2025</a:t>
+              <a:t>8/1/2025</a:t>
             </a:fld>
             <a:endParaRPr lang="en-US"/>
           </a:p>
@@ -23754,6 +23755,795 @@
     <p:extLst>
       <p:ext uri="{BB962C8B-B14F-4D97-AF65-F5344CB8AC3E}">
         <p14:creationId xmlns:p14="http://schemas.microsoft.com/office/powerpoint/2010/main" val="3113656257"/>
+      </p:ext>
+    </p:extLst>
+  </p:cSld>
+  <p:clrMapOvr>
+    <a:masterClrMapping/>
+  </p:clrMapOvr>
+</p:sld>
+</file>
+
+<file path=ppt/slides/slide14.xml><?xml version="1.0" encoding="utf-8"?>
+<p:sld xmlns:a="http://schemas.openxmlformats.org/drawingml/2006/main" xmlns:r="http://schemas.openxmlformats.org/officeDocument/2006/relationships" xmlns:p="http://schemas.openxmlformats.org/presentationml/2006/main">
+  <p:cSld>
+    <p:spTree>
+      <p:nvGrpSpPr>
+        <p:cNvPr id="1" name=""/>
+        <p:cNvGrpSpPr/>
+        <p:nvPr/>
+      </p:nvGrpSpPr>
+      <p:grpSpPr>
+        <a:xfrm>
+          <a:off x="0" y="0"/>
+          <a:ext cx="0" cy="0"/>
+          <a:chOff x="0" y="0"/>
+          <a:chExt cx="0" cy="0"/>
+        </a:xfrm>
+      </p:grpSpPr>
+      <p:sp>
+        <p:nvSpPr>
+          <p:cNvPr id="2" name="Slide Number Placeholder 1">
+            <a:extLst>
+              <a:ext uri="{FF2B5EF4-FFF2-40B4-BE49-F238E27FC236}">
+                <a16:creationId xmlns:a16="http://schemas.microsoft.com/office/drawing/2014/main" id="{9DDB00C0-94D6-4CCA-A989-D31C104B3DDA}"/>
+              </a:ext>
+            </a:extLst>
+          </p:cNvPr>
+          <p:cNvSpPr>
+            <a:spLocks noGrp="1"/>
+          </p:cNvSpPr>
+          <p:nvPr>
+            <p:ph type="sldNum" sz="quarter" idx="12"/>
+          </p:nvPr>
+        </p:nvSpPr>
+        <p:spPr/>
+        <p:txBody>
+          <a:bodyPr/>
+          <a:lstStyle/>
+          <a:p>
+            <a:fld id="{B6F15528-21DE-4FAA-801E-634DDDAF4B2B}" type="slidenum">
+              <a:rPr lang="en-US" smtClean="0"/>
+              <a:t>14</a:t>
+            </a:fld>
+            <a:endParaRPr lang="en-US"/>
+          </a:p>
+        </p:txBody>
+      </p:sp>
+      <p:sp>
+        <p:nvSpPr>
+          <p:cNvPr id="3" name="Rectangle 2">
+            <a:extLst>
+              <a:ext uri="{FF2B5EF4-FFF2-40B4-BE49-F238E27FC236}">
+                <a16:creationId xmlns:a16="http://schemas.microsoft.com/office/drawing/2014/main" id="{D197B088-9AC0-4E7E-B936-9D04482FF714}"/>
+              </a:ext>
+            </a:extLst>
+          </p:cNvPr>
+          <p:cNvSpPr/>
+          <p:nvPr/>
+        </p:nvSpPr>
+        <p:spPr>
+          <a:xfrm>
+            <a:off x="1295400" y="2057400"/>
+            <a:ext cx="1371600" cy="1371600"/>
+          </a:xfrm>
+          <a:prstGeom prst="rect">
+            <a:avLst/>
+          </a:prstGeom>
+          <a:noFill/>
+          <a:ln w="38100">
+            <a:solidFill>
+              <a:srgbClr val="0066FF"/>
+            </a:solidFill>
+          </a:ln>
+        </p:spPr>
+        <p:style>
+          <a:lnRef idx="2">
+            <a:schemeClr val="accent1">
+              <a:shade val="50000"/>
+            </a:schemeClr>
+          </a:lnRef>
+          <a:fillRef idx="1">
+            <a:schemeClr val="accent1"/>
+          </a:fillRef>
+          <a:effectRef idx="0">
+            <a:schemeClr val="accent1"/>
+          </a:effectRef>
+          <a:fontRef idx="minor">
+            <a:schemeClr val="lt1"/>
+          </a:fontRef>
+        </p:style>
+        <p:txBody>
+          <a:bodyPr rtlCol="0" anchor="ctr"/>
+          <a:lstStyle/>
+          <a:p>
+            <a:pPr algn="ctr"/>
+            <a:endParaRPr lang="ca-ES"/>
+          </a:p>
+        </p:txBody>
+      </p:sp>
+      <p:sp>
+        <p:nvSpPr>
+          <p:cNvPr id="4" name="Rectangle 3">
+            <a:extLst>
+              <a:ext uri="{FF2B5EF4-FFF2-40B4-BE49-F238E27FC236}">
+                <a16:creationId xmlns:a16="http://schemas.microsoft.com/office/drawing/2014/main" id="{A6592760-DD21-4F83-AE68-FACD26D6F75B}"/>
+              </a:ext>
+            </a:extLst>
+          </p:cNvPr>
+          <p:cNvSpPr/>
+          <p:nvPr/>
+        </p:nvSpPr>
+        <p:spPr>
+          <a:xfrm>
+            <a:off x="1524000" y="3124200"/>
+            <a:ext cx="838200" cy="1371600"/>
+          </a:xfrm>
+          <a:prstGeom prst="rect">
+            <a:avLst/>
+          </a:prstGeom>
+          <a:noFill/>
+          <a:ln w="38100">
+            <a:solidFill>
+              <a:srgbClr val="FF0000"/>
+            </a:solidFill>
+          </a:ln>
+        </p:spPr>
+        <p:style>
+          <a:lnRef idx="2">
+            <a:schemeClr val="accent1">
+              <a:shade val="50000"/>
+            </a:schemeClr>
+          </a:lnRef>
+          <a:fillRef idx="1">
+            <a:schemeClr val="accent1"/>
+          </a:fillRef>
+          <a:effectRef idx="0">
+            <a:schemeClr val="accent1"/>
+          </a:effectRef>
+          <a:fontRef idx="minor">
+            <a:schemeClr val="lt1"/>
+          </a:fontRef>
+        </p:style>
+        <p:txBody>
+          <a:bodyPr rtlCol="0" anchor="ctr"/>
+          <a:lstStyle/>
+          <a:p>
+            <a:pPr algn="ctr"/>
+            <a:endParaRPr lang="ca-ES"/>
+          </a:p>
+        </p:txBody>
+      </p:sp>
+      <p:sp>
+        <p:nvSpPr>
+          <p:cNvPr id="5" name="Rectangle 4">
+            <a:extLst>
+              <a:ext uri="{FF2B5EF4-FFF2-40B4-BE49-F238E27FC236}">
+                <a16:creationId xmlns:a16="http://schemas.microsoft.com/office/drawing/2014/main" id="{5A4FD7E7-8FEF-4ABD-90E7-8C49C9EDC04B}"/>
+              </a:ext>
+            </a:extLst>
+          </p:cNvPr>
+          <p:cNvSpPr/>
+          <p:nvPr/>
+        </p:nvSpPr>
+        <p:spPr>
+          <a:xfrm>
+            <a:off x="762000" y="2819400"/>
+            <a:ext cx="1073063" cy="1219200"/>
+          </a:xfrm>
+          <a:prstGeom prst="rect">
+            <a:avLst/>
+          </a:prstGeom>
+          <a:noFill/>
+          <a:ln w="38100">
+            <a:solidFill>
+              <a:srgbClr val="00B050"/>
+            </a:solidFill>
+          </a:ln>
+        </p:spPr>
+        <p:style>
+          <a:lnRef idx="2">
+            <a:schemeClr val="accent1">
+              <a:shade val="50000"/>
+            </a:schemeClr>
+          </a:lnRef>
+          <a:fillRef idx="1">
+            <a:schemeClr val="accent1"/>
+          </a:fillRef>
+          <a:effectRef idx="0">
+            <a:schemeClr val="accent1"/>
+          </a:effectRef>
+          <a:fontRef idx="minor">
+            <a:schemeClr val="lt1"/>
+          </a:fontRef>
+        </p:style>
+        <p:txBody>
+          <a:bodyPr rtlCol="0" anchor="ctr"/>
+          <a:lstStyle/>
+          <a:p>
+            <a:pPr algn="ctr"/>
+            <a:endParaRPr lang="ca-ES"/>
+          </a:p>
+        </p:txBody>
+      </p:sp>
+      <p:sp>
+        <p:nvSpPr>
+          <p:cNvPr id="6" name="Rectangle 5">
+            <a:extLst>
+              <a:ext uri="{FF2B5EF4-FFF2-40B4-BE49-F238E27FC236}">
+                <a16:creationId xmlns:a16="http://schemas.microsoft.com/office/drawing/2014/main" id="{6D7409DD-E0E6-49F4-B7D3-0FF61FE8E4AE}"/>
+              </a:ext>
+            </a:extLst>
+          </p:cNvPr>
+          <p:cNvSpPr/>
+          <p:nvPr/>
+        </p:nvSpPr>
+        <p:spPr>
+          <a:xfrm>
+            <a:off x="1689970" y="983293"/>
+            <a:ext cx="596030" cy="1371600"/>
+          </a:xfrm>
+          <a:prstGeom prst="rect">
+            <a:avLst/>
+          </a:prstGeom>
+          <a:noFill/>
+          <a:ln w="38100">
+            <a:solidFill>
+              <a:schemeClr val="accent2">
+                <a:lumMod val="75000"/>
+              </a:schemeClr>
+            </a:solidFill>
+          </a:ln>
+        </p:spPr>
+        <p:style>
+          <a:lnRef idx="2">
+            <a:schemeClr val="accent1">
+              <a:shade val="50000"/>
+            </a:schemeClr>
+          </a:lnRef>
+          <a:fillRef idx="1">
+            <a:schemeClr val="accent1"/>
+          </a:fillRef>
+          <a:effectRef idx="0">
+            <a:schemeClr val="accent1"/>
+          </a:effectRef>
+          <a:fontRef idx="minor">
+            <a:schemeClr val="lt1"/>
+          </a:fontRef>
+        </p:style>
+        <p:txBody>
+          <a:bodyPr rtlCol="0" anchor="ctr"/>
+          <a:lstStyle/>
+          <a:p>
+            <a:pPr algn="ctr"/>
+            <a:endParaRPr lang="ca-ES"/>
+          </a:p>
+        </p:txBody>
+      </p:sp>
+      <p:sp>
+        <p:nvSpPr>
+          <p:cNvPr id="8" name="Rectangle 7">
+            <a:extLst>
+              <a:ext uri="{FF2B5EF4-FFF2-40B4-BE49-F238E27FC236}">
+                <a16:creationId xmlns:a16="http://schemas.microsoft.com/office/drawing/2014/main" id="{EB2A8774-F151-4378-8676-FC098CA6ED97}"/>
+              </a:ext>
+            </a:extLst>
+          </p:cNvPr>
+          <p:cNvSpPr/>
+          <p:nvPr/>
+        </p:nvSpPr>
+        <p:spPr>
+          <a:xfrm>
+            <a:off x="4959262" y="3428999"/>
+            <a:ext cx="527137" cy="1074107"/>
+          </a:xfrm>
+          <a:prstGeom prst="rect">
+            <a:avLst/>
+          </a:prstGeom>
+          <a:solidFill>
+            <a:srgbClr val="FF0000"/>
+          </a:solidFill>
+          <a:ln w="38100">
+            <a:noFill/>
+          </a:ln>
+        </p:spPr>
+        <p:style>
+          <a:lnRef idx="2">
+            <a:schemeClr val="accent1">
+              <a:shade val="50000"/>
+            </a:schemeClr>
+          </a:lnRef>
+          <a:fillRef idx="1">
+            <a:schemeClr val="accent1"/>
+          </a:fillRef>
+          <a:effectRef idx="0">
+            <a:schemeClr val="accent1"/>
+          </a:effectRef>
+          <a:fontRef idx="minor">
+            <a:schemeClr val="lt1"/>
+          </a:fontRef>
+        </p:style>
+        <p:txBody>
+          <a:bodyPr rtlCol="0" anchor="ctr"/>
+          <a:lstStyle/>
+          <a:p>
+            <a:pPr algn="ctr"/>
+            <a:endParaRPr lang="ca-ES"/>
+          </a:p>
+        </p:txBody>
+      </p:sp>
+      <p:sp>
+        <p:nvSpPr>
+          <p:cNvPr id="9" name="Rectangle 8">
+            <a:extLst>
+              <a:ext uri="{FF2B5EF4-FFF2-40B4-BE49-F238E27FC236}">
+                <a16:creationId xmlns:a16="http://schemas.microsoft.com/office/drawing/2014/main" id="{1D6DE0C2-E0FC-48DA-BC50-D9DDBDE215C7}"/>
+              </a:ext>
+            </a:extLst>
+          </p:cNvPr>
+          <p:cNvSpPr/>
+          <p:nvPr/>
+        </p:nvSpPr>
+        <p:spPr>
+          <a:xfrm>
+            <a:off x="3886200" y="2826707"/>
+            <a:ext cx="525049" cy="1219203"/>
+          </a:xfrm>
+          <a:prstGeom prst="rect">
+            <a:avLst/>
+          </a:prstGeom>
+          <a:solidFill>
+            <a:srgbClr val="00B050"/>
+          </a:solidFill>
+          <a:ln w="38100">
+            <a:noFill/>
+          </a:ln>
+        </p:spPr>
+        <p:style>
+          <a:lnRef idx="2">
+            <a:schemeClr val="accent1">
+              <a:shade val="50000"/>
+            </a:schemeClr>
+          </a:lnRef>
+          <a:fillRef idx="1">
+            <a:schemeClr val="accent1"/>
+          </a:fillRef>
+          <a:effectRef idx="0">
+            <a:schemeClr val="accent1"/>
+          </a:effectRef>
+          <a:fontRef idx="minor">
+            <a:schemeClr val="lt1"/>
+          </a:fontRef>
+        </p:style>
+        <p:txBody>
+          <a:bodyPr rtlCol="0" anchor="ctr"/>
+          <a:lstStyle/>
+          <a:p>
+            <a:pPr algn="ctr"/>
+            <a:endParaRPr lang="ca-ES"/>
+          </a:p>
+        </p:txBody>
+      </p:sp>
+      <p:sp>
+        <p:nvSpPr>
+          <p:cNvPr id="10" name="Rectangle 9">
+            <a:extLst>
+              <a:ext uri="{FF2B5EF4-FFF2-40B4-BE49-F238E27FC236}">
+                <a16:creationId xmlns:a16="http://schemas.microsoft.com/office/drawing/2014/main" id="{1890FE5E-7891-4CC7-8DE9-8FF6E3162A32}"/>
+              </a:ext>
+            </a:extLst>
+          </p:cNvPr>
+          <p:cNvSpPr/>
+          <p:nvPr/>
+        </p:nvSpPr>
+        <p:spPr>
+          <a:xfrm>
+            <a:off x="4814170" y="990600"/>
+            <a:ext cx="596030" cy="1066800"/>
+          </a:xfrm>
+          <a:prstGeom prst="rect">
+            <a:avLst/>
+          </a:prstGeom>
+          <a:solidFill>
+            <a:srgbClr val="FF9933"/>
+          </a:solidFill>
+          <a:ln w="38100">
+            <a:noFill/>
+          </a:ln>
+        </p:spPr>
+        <p:style>
+          <a:lnRef idx="2">
+            <a:schemeClr val="accent1">
+              <a:shade val="50000"/>
+            </a:schemeClr>
+          </a:lnRef>
+          <a:fillRef idx="1">
+            <a:schemeClr val="accent1"/>
+          </a:fillRef>
+          <a:effectRef idx="0">
+            <a:schemeClr val="accent1"/>
+          </a:effectRef>
+          <a:fontRef idx="minor">
+            <a:schemeClr val="lt1"/>
+          </a:fontRef>
+        </p:style>
+        <p:txBody>
+          <a:bodyPr rtlCol="0" anchor="ctr"/>
+          <a:lstStyle/>
+          <a:p>
+            <a:pPr algn="ctr"/>
+            <a:endParaRPr lang="ca-ES"/>
+          </a:p>
+        </p:txBody>
+      </p:sp>
+      <p:sp>
+        <p:nvSpPr>
+          <p:cNvPr id="12" name="Rectangle 11">
+            <a:extLst>
+              <a:ext uri="{FF2B5EF4-FFF2-40B4-BE49-F238E27FC236}">
+                <a16:creationId xmlns:a16="http://schemas.microsoft.com/office/drawing/2014/main" id="{82904D4D-A851-422E-A773-6CD2B420B3EE}"/>
+              </a:ext>
+            </a:extLst>
+          </p:cNvPr>
+          <p:cNvSpPr/>
+          <p:nvPr/>
+        </p:nvSpPr>
+        <p:spPr>
+          <a:xfrm>
+            <a:off x="4724401" y="4038600"/>
+            <a:ext cx="607382" cy="464925"/>
+          </a:xfrm>
+          <a:prstGeom prst="rect">
+            <a:avLst/>
+          </a:prstGeom>
+          <a:solidFill>
+            <a:srgbClr val="FF0000"/>
+          </a:solidFill>
+          <a:ln w="38100">
+            <a:noFill/>
+          </a:ln>
+        </p:spPr>
+        <p:style>
+          <a:lnRef idx="2">
+            <a:schemeClr val="accent1">
+              <a:shade val="50000"/>
+            </a:schemeClr>
+          </a:lnRef>
+          <a:fillRef idx="1">
+            <a:schemeClr val="accent1"/>
+          </a:fillRef>
+          <a:effectRef idx="0">
+            <a:schemeClr val="accent1"/>
+          </a:effectRef>
+          <a:fontRef idx="minor">
+            <a:schemeClr val="lt1"/>
+          </a:fontRef>
+        </p:style>
+        <p:txBody>
+          <a:bodyPr rtlCol="0" anchor="ctr"/>
+          <a:lstStyle/>
+          <a:p>
+            <a:pPr algn="ctr"/>
+            <a:endParaRPr lang="ca-ES"/>
+          </a:p>
+        </p:txBody>
+      </p:sp>
+      <p:sp>
+        <p:nvSpPr>
+          <p:cNvPr id="13" name="Rectangle 12">
+            <a:extLst>
+              <a:ext uri="{FF2B5EF4-FFF2-40B4-BE49-F238E27FC236}">
+                <a16:creationId xmlns:a16="http://schemas.microsoft.com/office/drawing/2014/main" id="{2C90B2ED-BFD3-470E-A85F-6B516F2F5F8E}"/>
+              </a:ext>
+            </a:extLst>
+          </p:cNvPr>
+          <p:cNvSpPr/>
+          <p:nvPr/>
+        </p:nvSpPr>
+        <p:spPr>
+          <a:xfrm>
+            <a:off x="4411249" y="3428998"/>
+            <a:ext cx="313152" cy="616912"/>
+          </a:xfrm>
+          <a:prstGeom prst="rect">
+            <a:avLst/>
+          </a:prstGeom>
+          <a:solidFill>
+            <a:srgbClr val="00B050"/>
+          </a:solidFill>
+          <a:ln w="38100">
+            <a:noFill/>
+          </a:ln>
+        </p:spPr>
+        <p:style>
+          <a:lnRef idx="2">
+            <a:schemeClr val="accent1">
+              <a:shade val="50000"/>
+            </a:schemeClr>
+          </a:lnRef>
+          <a:fillRef idx="1">
+            <a:schemeClr val="accent1"/>
+          </a:fillRef>
+          <a:effectRef idx="0">
+            <a:schemeClr val="accent1"/>
+          </a:effectRef>
+          <a:fontRef idx="minor">
+            <a:schemeClr val="lt1"/>
+          </a:fontRef>
+        </p:style>
+        <p:txBody>
+          <a:bodyPr rtlCol="0" anchor="ctr"/>
+          <a:lstStyle/>
+          <a:p>
+            <a:pPr algn="ctr"/>
+            <a:endParaRPr lang="ca-ES"/>
+          </a:p>
+        </p:txBody>
+      </p:sp>
+      <p:sp>
+        <p:nvSpPr>
+          <p:cNvPr id="14" name="Rectangle 13">
+            <a:extLst>
+              <a:ext uri="{FF2B5EF4-FFF2-40B4-BE49-F238E27FC236}">
+                <a16:creationId xmlns:a16="http://schemas.microsoft.com/office/drawing/2014/main" id="{FE2B98EB-944D-4EB2-9B67-172D4AE7DC6A}"/>
+              </a:ext>
+            </a:extLst>
+          </p:cNvPr>
+          <p:cNvSpPr/>
+          <p:nvPr/>
+        </p:nvSpPr>
+        <p:spPr>
+          <a:xfrm>
+            <a:off x="4411249" y="2361784"/>
+            <a:ext cx="1371600" cy="464924"/>
+          </a:xfrm>
+          <a:prstGeom prst="rect">
+            <a:avLst/>
+          </a:prstGeom>
+          <a:solidFill>
+            <a:srgbClr val="0066FF"/>
+          </a:solidFill>
+          <a:ln>
+            <a:noFill/>
+          </a:ln>
+        </p:spPr>
+        <p:style>
+          <a:lnRef idx="2">
+            <a:schemeClr val="accent1">
+              <a:shade val="50000"/>
+            </a:schemeClr>
+          </a:lnRef>
+          <a:fillRef idx="1">
+            <a:schemeClr val="accent1"/>
+          </a:fillRef>
+          <a:effectRef idx="0">
+            <a:schemeClr val="accent1"/>
+          </a:effectRef>
+          <a:fontRef idx="minor">
+            <a:schemeClr val="lt1"/>
+          </a:fontRef>
+        </p:style>
+        <p:txBody>
+          <a:bodyPr rtlCol="0" anchor="ctr"/>
+          <a:lstStyle/>
+          <a:p>
+            <a:pPr algn="ctr"/>
+            <a:endParaRPr lang="ca-ES"/>
+          </a:p>
+        </p:txBody>
+      </p:sp>
+      <p:sp>
+        <p:nvSpPr>
+          <p:cNvPr id="15" name="Rectangle 14">
+            <a:extLst>
+              <a:ext uri="{FF2B5EF4-FFF2-40B4-BE49-F238E27FC236}">
+                <a16:creationId xmlns:a16="http://schemas.microsoft.com/office/drawing/2014/main" id="{E7AB0042-4568-47C7-A38D-323F35B634EF}"/>
+              </a:ext>
+            </a:extLst>
+          </p:cNvPr>
+          <p:cNvSpPr/>
+          <p:nvPr/>
+        </p:nvSpPr>
+        <p:spPr>
+          <a:xfrm>
+            <a:off x="4411249" y="2057401"/>
+            <a:ext cx="402921" cy="311692"/>
+          </a:xfrm>
+          <a:prstGeom prst="rect">
+            <a:avLst/>
+          </a:prstGeom>
+          <a:solidFill>
+            <a:srgbClr val="0066FF"/>
+          </a:solidFill>
+          <a:ln>
+            <a:noFill/>
+          </a:ln>
+        </p:spPr>
+        <p:style>
+          <a:lnRef idx="2">
+            <a:schemeClr val="accent1">
+              <a:shade val="50000"/>
+            </a:schemeClr>
+          </a:lnRef>
+          <a:fillRef idx="1">
+            <a:schemeClr val="accent1"/>
+          </a:fillRef>
+          <a:effectRef idx="0">
+            <a:schemeClr val="accent1"/>
+          </a:effectRef>
+          <a:fontRef idx="minor">
+            <a:schemeClr val="lt1"/>
+          </a:fontRef>
+        </p:style>
+        <p:txBody>
+          <a:bodyPr rtlCol="0" anchor="ctr"/>
+          <a:lstStyle/>
+          <a:p>
+            <a:pPr algn="ctr"/>
+            <a:endParaRPr lang="ca-ES"/>
+          </a:p>
+        </p:txBody>
+      </p:sp>
+      <p:sp>
+        <p:nvSpPr>
+          <p:cNvPr id="16" name="Rectangle 15">
+            <a:extLst>
+              <a:ext uri="{FF2B5EF4-FFF2-40B4-BE49-F238E27FC236}">
+                <a16:creationId xmlns:a16="http://schemas.microsoft.com/office/drawing/2014/main" id="{2750CBCA-9E25-48BD-945B-CCDEF21C229E}"/>
+              </a:ext>
+            </a:extLst>
+          </p:cNvPr>
+          <p:cNvSpPr/>
+          <p:nvPr/>
+        </p:nvSpPr>
+        <p:spPr>
+          <a:xfrm>
+            <a:off x="5410200" y="2058508"/>
+            <a:ext cx="372649" cy="311692"/>
+          </a:xfrm>
+          <a:prstGeom prst="rect">
+            <a:avLst/>
+          </a:prstGeom>
+          <a:solidFill>
+            <a:srgbClr val="0066FF"/>
+          </a:solidFill>
+          <a:ln>
+            <a:noFill/>
+          </a:ln>
+        </p:spPr>
+        <p:style>
+          <a:lnRef idx="2">
+            <a:schemeClr val="accent1">
+              <a:shade val="50000"/>
+            </a:schemeClr>
+          </a:lnRef>
+          <a:fillRef idx="1">
+            <a:schemeClr val="accent1"/>
+          </a:fillRef>
+          <a:effectRef idx="0">
+            <a:schemeClr val="accent1"/>
+          </a:effectRef>
+          <a:fontRef idx="minor">
+            <a:schemeClr val="lt1"/>
+          </a:fontRef>
+        </p:style>
+        <p:txBody>
+          <a:bodyPr rtlCol="0" anchor="ctr"/>
+          <a:lstStyle/>
+          <a:p>
+            <a:pPr algn="ctr"/>
+            <a:endParaRPr lang="ca-ES"/>
+          </a:p>
+        </p:txBody>
+      </p:sp>
+      <p:sp>
+        <p:nvSpPr>
+          <p:cNvPr id="17" name="Rectangle 16">
+            <a:extLst>
+              <a:ext uri="{FF2B5EF4-FFF2-40B4-BE49-F238E27FC236}">
+                <a16:creationId xmlns:a16="http://schemas.microsoft.com/office/drawing/2014/main" id="{E60C2A75-EAA6-4A8A-B6A7-7BF190D42450}"/>
+              </a:ext>
+            </a:extLst>
+          </p:cNvPr>
+          <p:cNvSpPr/>
+          <p:nvPr/>
+        </p:nvSpPr>
+        <p:spPr>
+          <a:xfrm>
+            <a:off x="4724400" y="2812088"/>
+            <a:ext cx="1058449" cy="311692"/>
+          </a:xfrm>
+          <a:prstGeom prst="rect">
+            <a:avLst/>
+          </a:prstGeom>
+          <a:solidFill>
+            <a:srgbClr val="0066FF"/>
+          </a:solidFill>
+          <a:ln>
+            <a:noFill/>
+          </a:ln>
+        </p:spPr>
+        <p:style>
+          <a:lnRef idx="2">
+            <a:schemeClr val="accent1">
+              <a:shade val="50000"/>
+            </a:schemeClr>
+          </a:lnRef>
+          <a:fillRef idx="1">
+            <a:schemeClr val="accent1"/>
+          </a:fillRef>
+          <a:effectRef idx="0">
+            <a:schemeClr val="accent1"/>
+          </a:effectRef>
+          <a:fontRef idx="minor">
+            <a:schemeClr val="lt1"/>
+          </a:fontRef>
+        </p:style>
+        <p:txBody>
+          <a:bodyPr rtlCol="0" anchor="ctr"/>
+          <a:lstStyle/>
+          <a:p>
+            <a:pPr algn="ctr"/>
+            <a:endParaRPr lang="ca-ES"/>
+          </a:p>
+        </p:txBody>
+      </p:sp>
+      <p:sp>
+        <p:nvSpPr>
+          <p:cNvPr id="18" name="Rectangle 17">
+            <a:extLst>
+              <a:ext uri="{FF2B5EF4-FFF2-40B4-BE49-F238E27FC236}">
+                <a16:creationId xmlns:a16="http://schemas.microsoft.com/office/drawing/2014/main" id="{3D2EB876-025A-4908-8E70-DAD19480EC1A}"/>
+              </a:ext>
+            </a:extLst>
+          </p:cNvPr>
+          <p:cNvSpPr/>
+          <p:nvPr/>
+        </p:nvSpPr>
+        <p:spPr>
+          <a:xfrm>
+            <a:off x="5482223" y="3123568"/>
+            <a:ext cx="300625" cy="305011"/>
+          </a:xfrm>
+          <a:prstGeom prst="rect">
+            <a:avLst/>
+          </a:prstGeom>
+          <a:solidFill>
+            <a:srgbClr val="0066FF"/>
+          </a:solidFill>
+          <a:ln>
+            <a:noFill/>
+          </a:ln>
+        </p:spPr>
+        <p:style>
+          <a:lnRef idx="2">
+            <a:schemeClr val="accent1">
+              <a:shade val="50000"/>
+            </a:schemeClr>
+          </a:lnRef>
+          <a:fillRef idx="1">
+            <a:schemeClr val="accent1"/>
+          </a:fillRef>
+          <a:effectRef idx="0">
+            <a:schemeClr val="accent1"/>
+          </a:effectRef>
+          <a:fontRef idx="minor">
+            <a:schemeClr val="lt1"/>
+          </a:fontRef>
+        </p:style>
+        <p:txBody>
+          <a:bodyPr rtlCol="0" anchor="ctr"/>
+          <a:lstStyle/>
+          <a:p>
+            <a:pPr algn="ctr"/>
+            <a:endParaRPr lang="ca-ES"/>
+          </a:p>
+        </p:txBody>
+      </p:sp>
+    </p:spTree>
+    <p:extLst>
+      <p:ext uri="{BB962C8B-B14F-4D97-AF65-F5344CB8AC3E}">
+        <p14:creationId xmlns:p14="http://schemas.microsoft.com/office/powerpoint/2010/main" val="2097645429"/>
       </p:ext>
     </p:extLst>
   </p:cSld>

</xml_diff>